<commit_message>
As of the the end of the zoom
</commit_message>
<xml_diff>
--- a/docs/MLOps Final Project.pptx
+++ b/docs/MLOps Final Project.pptx
@@ -5,23 +5,30 @@
     <p:sldMasterId id="2147483648" r:id="rId1"/>
   </p:sldMasterIdLst>
   <p:notesMasterIdLst>
-    <p:notesMasterId r:id="rId16"/>
+    <p:notesMasterId r:id="rId23"/>
   </p:notesMasterIdLst>
   <p:sldIdLst>
     <p:sldId id="256" r:id="rId2"/>
     <p:sldId id="263" r:id="rId3"/>
-    <p:sldId id="258" r:id="rId4"/>
-    <p:sldId id="264" r:id="rId5"/>
-    <p:sldId id="257" r:id="rId6"/>
-    <p:sldId id="259" r:id="rId7"/>
-    <p:sldId id="260" r:id="rId8"/>
-    <p:sldId id="261" r:id="rId9"/>
-    <p:sldId id="262" r:id="rId10"/>
-    <p:sldId id="266" r:id="rId11"/>
-    <p:sldId id="267" r:id="rId12"/>
-    <p:sldId id="265" r:id="rId13"/>
-    <p:sldId id="268" r:id="rId14"/>
-    <p:sldId id="269" r:id="rId15"/>
+    <p:sldId id="271" r:id="rId4"/>
+    <p:sldId id="273" r:id="rId5"/>
+    <p:sldId id="258" r:id="rId6"/>
+    <p:sldId id="264" r:id="rId7"/>
+    <p:sldId id="257" r:id="rId8"/>
+    <p:sldId id="259" r:id="rId9"/>
+    <p:sldId id="260" r:id="rId10"/>
+    <p:sldId id="261" r:id="rId11"/>
+    <p:sldId id="262" r:id="rId12"/>
+    <p:sldId id="270" r:id="rId13"/>
+    <p:sldId id="266" r:id="rId14"/>
+    <p:sldId id="267" r:id="rId15"/>
+    <p:sldId id="265" r:id="rId16"/>
+    <p:sldId id="268" r:id="rId17"/>
+    <p:sldId id="269" r:id="rId18"/>
+    <p:sldId id="274" r:id="rId19"/>
+    <p:sldId id="277" r:id="rId20"/>
+    <p:sldId id="276" r:id="rId21"/>
+    <p:sldId id="275" r:id="rId22"/>
   </p:sldIdLst>
   <p:sldSz cx="12192000" cy="6858000"/>
   <p:notesSz cx="6858000" cy="9144000"/>
@@ -213,7 +220,7 @@
           <a:p>
             <a:fld id="{7C27A723-51FE-45AC-AC04-AE77775347B3}" type="datetimeFigureOut">
               <a:rPr lang="he-IL" smtClean="0"/>
-              <a:t>ל'.שבט.תשפ"ד</a:t>
+              <a:t>א'/אדר א/תשפ"ד</a:t>
             </a:fld>
             <a:endParaRPr lang="he-IL"/>
           </a:p>
@@ -651,7 +658,7 @@
           <a:p>
             <a:fld id="{48A87A34-81AB-432B-8DAE-1953F412C126}" type="datetimeFigureOut">
               <a:rPr lang="en-US" dirty="0"/>
-              <a:t>2/9/24</a:t>
+              <a:t>10-Feb-24</a:t>
             </a:fld>
             <a:endParaRPr lang="en-US" dirty="0"/>
           </a:p>
@@ -958,7 +965,7 @@
           <a:p>
             <a:fld id="{48A87A34-81AB-432B-8DAE-1953F412C126}" type="datetimeFigureOut">
               <a:rPr lang="en-US" dirty="0"/>
-              <a:t>2/9/24</a:t>
+              <a:t>10-Feb-24</a:t>
             </a:fld>
             <a:endParaRPr lang="en-US" dirty="0"/>
           </a:p>
@@ -1175,7 +1182,7 @@
           <a:p>
             <a:fld id="{48A87A34-81AB-432B-8DAE-1953F412C126}" type="datetimeFigureOut">
               <a:rPr lang="en-US" dirty="0"/>
-              <a:t>2/9/24</a:t>
+              <a:t>10-Feb-24</a:t>
             </a:fld>
             <a:endParaRPr lang="en-US" dirty="0"/>
           </a:p>
@@ -1461,7 +1468,7 @@
           <a:p>
             <a:fld id="{48A87A34-81AB-432B-8DAE-1953F412C126}" type="datetimeFigureOut">
               <a:rPr lang="en-US" dirty="0"/>
-              <a:t>2/9/24</a:t>
+              <a:t>10-Feb-24</a:t>
             </a:fld>
             <a:endParaRPr lang="en-US" dirty="0"/>
           </a:p>
@@ -1910,7 +1917,7 @@
           <a:p>
             <a:fld id="{48A87A34-81AB-432B-8DAE-1953F412C126}" type="datetimeFigureOut">
               <a:rPr lang="en-US" dirty="0"/>
-              <a:t>2/9/24</a:t>
+              <a:t>10-Feb-24</a:t>
             </a:fld>
             <a:endParaRPr lang="en-US" dirty="0"/>
           </a:p>
@@ -2481,7 +2488,7 @@
           <a:p>
             <a:fld id="{48A87A34-81AB-432B-8DAE-1953F412C126}" type="datetimeFigureOut">
               <a:rPr lang="en-US" dirty="0"/>
-              <a:t>2/9/24</a:t>
+              <a:t>10-Feb-24</a:t>
             </a:fld>
             <a:endParaRPr lang="en-US" dirty="0"/>
           </a:p>
@@ -3328,7 +3335,7 @@
           <a:p>
             <a:fld id="{48A87A34-81AB-432B-8DAE-1953F412C126}" type="datetimeFigureOut">
               <a:rPr lang="en-US" dirty="0"/>
-              <a:t>2/9/24</a:t>
+              <a:t>10-Feb-24</a:t>
             </a:fld>
             <a:endParaRPr lang="en-US" dirty="0"/>
           </a:p>
@@ -3528,7 +3535,7 @@
           <a:p>
             <a:fld id="{48A87A34-81AB-432B-8DAE-1953F412C126}" type="datetimeFigureOut">
               <a:rPr lang="en-US" dirty="0"/>
-              <a:t>2/9/24</a:t>
+              <a:t>10-Feb-24</a:t>
             </a:fld>
             <a:endParaRPr lang="en-US" dirty="0"/>
           </a:p>
@@ -3737,7 +3744,7 @@
           <a:p>
             <a:fld id="{48A87A34-81AB-432B-8DAE-1953F412C126}" type="datetimeFigureOut">
               <a:rPr lang="en-US" dirty="0"/>
-              <a:t>2/9/24</a:t>
+              <a:t>10-Feb-24</a:t>
             </a:fld>
             <a:endParaRPr lang="en-US" dirty="0"/>
           </a:p>
@@ -3937,7 +3944,7 @@
           <a:p>
             <a:fld id="{48A87A34-81AB-432B-8DAE-1953F412C126}" type="datetimeFigureOut">
               <a:rPr lang="en-US" dirty="0"/>
-              <a:t>2/9/24</a:t>
+              <a:t>10-Feb-24</a:t>
             </a:fld>
             <a:endParaRPr lang="en-US" dirty="0"/>
           </a:p>
@@ -4212,7 +4219,7 @@
           <a:p>
             <a:fld id="{48A87A34-81AB-432B-8DAE-1953F412C126}" type="datetimeFigureOut">
               <a:rPr lang="en-US" dirty="0"/>
-              <a:t>2/9/24</a:t>
+              <a:t>10-Feb-24</a:t>
             </a:fld>
             <a:endParaRPr lang="en-US" dirty="0"/>
           </a:p>
@@ -4474,7 +4481,7 @@
           <a:p>
             <a:fld id="{48A87A34-81AB-432B-8DAE-1953F412C126}" type="datetimeFigureOut">
               <a:rPr lang="en-US" dirty="0"/>
-              <a:t>2/9/24</a:t>
+              <a:t>10-Feb-24</a:t>
             </a:fld>
             <a:endParaRPr lang="en-US" dirty="0"/>
           </a:p>
@@ -4884,7 +4891,7 @@
           <a:p>
             <a:fld id="{48A87A34-81AB-432B-8DAE-1953F412C126}" type="datetimeFigureOut">
               <a:rPr lang="en-US" dirty="0"/>
-              <a:t>2/9/24</a:t>
+              <a:t>10-Feb-24</a:t>
             </a:fld>
             <a:endParaRPr lang="en-US" dirty="0"/>
           </a:p>
@@ -5027,7 +5034,7 @@
           <a:p>
             <a:fld id="{48A87A34-81AB-432B-8DAE-1953F412C126}" type="datetimeFigureOut">
               <a:rPr lang="en-US" dirty="0"/>
-              <a:t>2/9/24</a:t>
+              <a:t>10-Feb-24</a:t>
             </a:fld>
             <a:endParaRPr lang="en-US" dirty="0"/>
           </a:p>
@@ -5147,7 +5154,7 @@
           <a:p>
             <a:fld id="{48A87A34-81AB-432B-8DAE-1953F412C126}" type="datetimeFigureOut">
               <a:rPr lang="en-US" dirty="0"/>
-              <a:t>2/9/24</a:t>
+              <a:t>10-Feb-24</a:t>
             </a:fld>
             <a:endParaRPr lang="en-US" dirty="0"/>
           </a:p>
@@ -5421,7 +5428,7 @@
           <a:p>
             <a:fld id="{48A87A34-81AB-432B-8DAE-1953F412C126}" type="datetimeFigureOut">
               <a:rPr lang="en-US" dirty="0"/>
-              <a:t>2/9/24</a:t>
+              <a:t>10-Feb-24</a:t>
             </a:fld>
             <a:endParaRPr lang="en-US" dirty="0"/>
           </a:p>
@@ -5728,7 +5735,7 @@
           <a:p>
             <a:fld id="{48A87A34-81AB-432B-8DAE-1953F412C126}" type="datetimeFigureOut">
               <a:rPr lang="en-US" dirty="0"/>
-              <a:t>2/9/24</a:t>
+              <a:t>10-Feb-24</a:t>
             </a:fld>
             <a:endParaRPr lang="en-US" dirty="0"/>
           </a:p>
@@ -5975,7 +5982,7 @@
             <a:fld id="{48A87A34-81AB-432B-8DAE-1953F412C126}" type="datetimeFigureOut">
               <a:rPr lang="en-US" dirty="0"/>
               <a:pPr/>
-              <a:t>2/9/24</a:t>
+              <a:t>10-Feb-24</a:t>
             </a:fld>
             <a:endParaRPr lang="en-US" dirty="0"/>
           </a:p>
@@ -6436,10 +6443,14 @@
           <a:bodyPr/>
           <a:lstStyle/>
           <a:p>
+            <a:pPr algn="l" rtl="0"/>
             <a:r>
               <a:rPr lang="en-US" dirty="0"/>
-              <a:t>MLOps Final Project</a:t>
-            </a:r>
+              <a:t>Discovering data slices for improvement </a:t>
+            </a:r>
+            <a:br>
+              <a:rPr lang="en-US" dirty="0"/>
+            </a:br>
             <a:endParaRPr lang="he-IL" dirty="0"/>
           </a:p>
         </p:txBody>
@@ -6465,22 +6476,17 @@
           <a:bodyPr/>
           <a:lstStyle/>
           <a:p>
-            <a:pPr rtl="0"/>
-            <a:r>
-              <a:rPr lang="en-US" dirty="0" err="1"/>
-              <a:t>Nitay</a:t>
-            </a:r>
+            <a:pPr algn="l" rtl="0"/>
             <a:r>
               <a:rPr lang="en-US" dirty="0"/>
-              <a:t> Cohen, Stav Cohen, </a:t>
-            </a:r>
-            <a:r>
-              <a:rPr lang="en-US" dirty="0" err="1"/>
-              <a:t>Kiliemah</a:t>
-            </a:r>
+              <a:t>MLOps course Final Project</a:t>
+            </a:r>
+          </a:p>
+          <a:p>
+            <a:pPr algn="l" rtl="0"/>
             <a:r>
               <a:rPr lang="en-US" dirty="0"/>
-              <a:t>, Natalia Meergus</a:t>
+              <a:t>Nitay Cohen, Stav Cohen, Kilièmah Ouattara, Natalia Meergus</a:t>
             </a:r>
             <a:endParaRPr lang="he-IL" dirty="0"/>
           </a:p>
@@ -6521,7 +6527,7 @@
           <p:cNvPr id="2" name="Title 1">
             <a:extLst>
               <a:ext uri="{FF2B5EF4-FFF2-40B4-BE49-F238E27FC236}">
-                <a16:creationId xmlns:a16="http://schemas.microsoft.com/office/drawing/2014/main" id="{3E2365AF-46C2-3616-1532-D71DEC709133}"/>
+                <a16:creationId xmlns:a16="http://schemas.microsoft.com/office/drawing/2014/main" id="{007DBD3D-6969-0A2D-4588-65BADF920EC4}"/>
               </a:ext>
             </a:extLst>
           </p:cNvPr>
@@ -6537,19 +6543,11 @@
           <a:bodyPr/>
           <a:lstStyle/>
           <a:p>
-            <a:pPr algn="ctr" defTabSz="914400" rtl="0" eaLnBrk="1" latinLnBrk="0" hangingPunct="1">
-              <a:lnSpc>
-                <a:spcPct val="90000"/>
-              </a:lnSpc>
-              <a:spcBef>
-                <a:spcPct val="0"/>
-              </a:spcBef>
-              <a:buNone/>
-            </a:pPr>
-            <a:r>
-              <a:rPr lang="en-IL" dirty="0"/>
-              <a:t>Architecture - Overall</a:t>
-            </a:r>
+            <a:r>
+              <a:rPr lang="en-US" dirty="0"/>
+              <a:t>Decision Trees as a feature analysis heuristic</a:t>
+            </a:r>
+            <a:endParaRPr lang="he-IL" dirty="0"/>
           </a:p>
         </p:txBody>
       </p:sp>
@@ -6558,7 +6556,7 @@
           <p:cNvPr id="3" name="Content Placeholder 2">
             <a:extLst>
               <a:ext uri="{FF2B5EF4-FFF2-40B4-BE49-F238E27FC236}">
-                <a16:creationId xmlns:a16="http://schemas.microsoft.com/office/drawing/2014/main" id="{E6EF5898-C934-4F56-A10A-009A01A21DA2}"/>
+                <a16:creationId xmlns:a16="http://schemas.microsoft.com/office/drawing/2014/main" id="{1617FA47-36B5-06F4-62F0-E63065DCFC86}"/>
               </a:ext>
             </a:extLst>
           </p:cNvPr>
@@ -6569,93 +6567,45 @@
             <p:ph sz="quarter" idx="13"/>
           </p:nvPr>
         </p:nvSpPr>
-        <p:spPr>
-          <a:xfrm>
-            <a:off x="913774" y="1828800"/>
-            <a:ext cx="10363826" cy="3962399"/>
-          </a:xfrm>
-        </p:spPr>
-        <p:txBody>
-          <a:bodyPr>
-            <a:normAutofit/>
-          </a:bodyPr>
-          <a:lstStyle/>
-          <a:p>
-            <a:pPr marL="228600" indent="-228600" algn="l" defTabSz="914400" rtl="0" eaLnBrk="1" latinLnBrk="0" hangingPunct="1">
-              <a:lnSpc>
-                <a:spcPct val="120000"/>
-              </a:lnSpc>
-              <a:spcBef>
-                <a:spcPts val="1000"/>
-              </a:spcBef>
-              <a:buClr>
-                <a:schemeClr val="tx1"/>
-              </a:buClr>
-              <a:buFont typeface="Arial" panose="020B0604020202020204" pitchFamily="34" charset="0"/>
-              <a:buChar char="•"/>
-            </a:pPr>
-            <a:r>
-              <a:rPr lang="en-IL" dirty="0"/>
-              <a:t>Runtime environment: We use our laptops as the runtime environment, with the following installed:</a:t>
-            </a:r>
-          </a:p>
-          <a:p>
-            <a:pPr lvl="1" algn="l" rtl="0">
-              <a:spcBef>
-                <a:spcPts val="1000"/>
-              </a:spcBef>
-            </a:pPr>
-            <a:r>
-              <a:rPr lang="en-IL" sz="2000" dirty="0"/>
-              <a:t>OS: MacOS M1 / M2 or Windows 10+ supported</a:t>
-            </a:r>
-          </a:p>
-          <a:p>
-            <a:pPr lvl="1" algn="l" rtl="0">
-              <a:spcBef>
-                <a:spcPts val="1000"/>
-              </a:spcBef>
-            </a:pPr>
-            <a:r>
-              <a:rPr lang="en-IL" sz="2000" dirty="0"/>
-              <a:t>Python 3.11 with Anaconda / Miniconda installed</a:t>
-            </a:r>
-          </a:p>
-          <a:p>
-            <a:pPr lvl="1" algn="l" rtl="0">
-              <a:spcBef>
-                <a:spcPts val="1000"/>
-              </a:spcBef>
-            </a:pPr>
-            <a:r>
-              <a:rPr lang="en-IL" sz="2000" dirty="0"/>
-              <a:t>The requirements Python packages specified in requirements.txt files installed using pip or conda</a:t>
-            </a:r>
-          </a:p>
-          <a:p>
-            <a:pPr lvl="1" algn="l" rtl="0">
-              <a:spcBef>
-                <a:spcPts val="1000"/>
-              </a:spcBef>
-            </a:pPr>
-            <a:r>
-              <a:rPr lang="en-IL" sz="2000" dirty="0"/>
-              <a:t>In a real scenario the runtime environment should be run on an Instance in the cloud</a:t>
-            </a:r>
-          </a:p>
+        <p:spPr/>
+        <p:txBody>
+          <a:bodyPr/>
+          <a:lstStyle/>
           <a:p>
             <a:pPr algn="l" rtl="0"/>
             <a:r>
-              <a:rPr lang="en-IL" dirty="0"/>
-              <a:t>Model registry: We use Databricks SaaS platform to register and store our trained models. The Databricks platform is hosted in AWS cloud</a:t>
-            </a:r>
+              <a:rPr lang="en-US" dirty="0"/>
+              <a:t>X: single feature or subset of features of the original dataset</a:t>
+            </a:r>
+          </a:p>
+          <a:p>
+            <a:pPr algn="l" rtl="0"/>
+            <a:r>
+              <a:rPr lang="en-US" dirty="0"/>
+              <a:t>Y:</a:t>
+            </a:r>
+          </a:p>
+          <a:p>
+            <a:pPr lvl="1" algn="l" rtl="0"/>
+            <a:r>
+              <a:rPr lang="en-US" dirty="0"/>
+              <a:t>‘True’ = original model predicted the original output successfully</a:t>
+            </a:r>
+          </a:p>
+          <a:p>
+            <a:pPr lvl="1" algn="l" rtl="0"/>
+            <a:r>
+              <a:rPr lang="en-US" dirty="0"/>
+              <a:t>‘False’ = original model failed in its prediction</a:t>
+            </a:r>
+            <a:endParaRPr lang="he-IL" dirty="0"/>
           </a:p>
         </p:txBody>
       </p:sp>
     </p:spTree>
     <p:extLst>
       <p:ext uri="{BB962C8B-B14F-4D97-AF65-F5344CB8AC3E}">
-        <p14:creationId xmlns:p14="http://schemas.microsoft.com/office/powerpoint/2010/main" val="810456341"/>
+        <p14:creationId xmlns:p14="http://schemas.microsoft.com/office/powerpoint/2010/main" val="1503145248"/>
       </p:ext>
     </p:extLst>
   </p:cSld>
@@ -6666,7 +6616,7 @@
 </file>
 
 <file path=ppt/slides/slide11.xml><?xml version="1.0" encoding="utf-8"?>
-<p:sld xmlns:a="http://schemas.openxmlformats.org/drawingml/2006/main" xmlns:r="http://schemas.openxmlformats.org/officeDocument/2006/relationships" xmlns:p="http://schemas.openxmlformats.org/presentationml/2006/main">
+<p:sld xmlns:a="http://schemas.openxmlformats.org/drawingml/2006/main" xmlns:r="http://schemas.openxmlformats.org/officeDocument/2006/relationships" xmlns:p="http://schemas.openxmlformats.org/presentationml/2006/main" show="0">
   <p:cSld>
     <p:spTree>
       <p:nvGrpSpPr>
@@ -6687,7 +6637,7 @@
           <p:cNvPr id="2" name="Title 1">
             <a:extLst>
               <a:ext uri="{FF2B5EF4-FFF2-40B4-BE49-F238E27FC236}">
-                <a16:creationId xmlns:a16="http://schemas.microsoft.com/office/drawing/2014/main" id="{1992D947-AC74-53B5-5D6B-12BA87E6572D}"/>
+                <a16:creationId xmlns:a16="http://schemas.microsoft.com/office/drawing/2014/main" id="{007DBD3D-6969-0A2D-4588-65BADF920EC4}"/>
               </a:ext>
             </a:extLst>
           </p:cNvPr>
@@ -6703,19 +6653,12 @@
           <a:bodyPr/>
           <a:lstStyle/>
           <a:p>
-            <a:pPr algn="ctr" defTabSz="914400" rtl="0" eaLnBrk="1" latinLnBrk="0" hangingPunct="1">
-              <a:lnSpc>
-                <a:spcPct val="90000"/>
-              </a:lnSpc>
-              <a:spcBef>
-                <a:spcPct val="0"/>
-              </a:spcBef>
-              <a:buNone/>
-            </a:pPr>
-            <a:r>
-              <a:rPr lang="en-IL" dirty="0"/>
-              <a:t>Architecture - Process</a:t>
-            </a:r>
+            <a:pPr rtl="0"/>
+            <a:r>
+              <a:rPr lang="en-US" dirty="0"/>
+              <a:t>Our FreaAI modification</a:t>
+            </a:r>
+            <a:endParaRPr lang="he-IL" dirty="0"/>
           </a:p>
         </p:txBody>
       </p:sp>
@@ -6724,7 +6667,7 @@
           <p:cNvPr id="3" name="Content Placeholder 2">
             <a:extLst>
               <a:ext uri="{FF2B5EF4-FFF2-40B4-BE49-F238E27FC236}">
-                <a16:creationId xmlns:a16="http://schemas.microsoft.com/office/drawing/2014/main" id="{16B8136E-200E-3148-DE13-5E3FEC8D9D65}"/>
+                <a16:creationId xmlns:a16="http://schemas.microsoft.com/office/drawing/2014/main" id="{1617FA47-36B5-06F4-62F0-E63065DCFC86}"/>
               </a:ext>
             </a:extLst>
           </p:cNvPr>
@@ -6735,156 +6678,53 @@
             <p:ph sz="quarter" idx="13"/>
           </p:nvPr>
         </p:nvSpPr>
-        <p:spPr>
-          <a:xfrm>
-            <a:off x="659774" y="1794934"/>
-            <a:ext cx="10363826" cy="4614333"/>
-          </a:xfrm>
-        </p:spPr>
-        <p:txBody>
-          <a:bodyPr>
-            <a:normAutofit fontScale="92500" lnSpcReduction="10000"/>
-          </a:bodyPr>
-          <a:lstStyle/>
-          <a:p>
-            <a:pPr marL="457200" indent="-457200" algn="l" defTabSz="914400" rtl="0" eaLnBrk="1" latinLnBrk="0" hangingPunct="1">
-              <a:lnSpc>
-                <a:spcPct val="120000"/>
-              </a:lnSpc>
-              <a:spcBef>
-                <a:spcPts val="1000"/>
-              </a:spcBef>
-              <a:buClr>
-                <a:schemeClr val="tx1"/>
-              </a:buClr>
-              <a:buFont typeface="+mj-lt"/>
-              <a:buAutoNum type="arabicPeriod"/>
-            </a:pPr>
-            <a:r>
-              <a:rPr lang="en-IL" dirty="0"/>
-              <a:t>Load the dataset from a set of CSV files and concatinate them into a Dataframe object</a:t>
-            </a:r>
-          </a:p>
-          <a:p>
-            <a:pPr marL="457200" indent="-457200" algn="l" defTabSz="914400" rtl="0" eaLnBrk="1" latinLnBrk="0" hangingPunct="1">
-              <a:lnSpc>
-                <a:spcPct val="120000"/>
-              </a:lnSpc>
-              <a:spcBef>
-                <a:spcPts val="1000"/>
-              </a:spcBef>
-              <a:buClr>
-                <a:schemeClr val="tx1"/>
-              </a:buClr>
-              <a:buFont typeface="+mj-lt"/>
-              <a:buAutoNum type="arabicPeriod"/>
-            </a:pPr>
-            <a:r>
-              <a:rPr lang="en-IL" dirty="0"/>
-              <a:t>By the selected algorithm (LightGBM / ConvAE):</a:t>
-            </a:r>
-          </a:p>
-          <a:p>
-            <a:pPr marL="914400" lvl="1" indent="-457200" algn="l" rtl="0">
-              <a:spcBef>
-                <a:spcPts val="1000"/>
-              </a:spcBef>
-              <a:buFont typeface="+mj-lt"/>
-              <a:buAutoNum type="arabicPeriod"/>
-            </a:pPr>
-            <a:r>
-              <a:rPr lang="en-IL" dirty="0"/>
-              <a:t>Split the dataset into train / valid / test sets</a:t>
-            </a:r>
-          </a:p>
-          <a:p>
-            <a:pPr marL="914400" lvl="1" indent="-457200" algn="l" rtl="0">
-              <a:spcBef>
-                <a:spcPts val="1000"/>
-              </a:spcBef>
-              <a:buFont typeface="+mj-lt"/>
-              <a:buAutoNum type="arabicPeriod"/>
-            </a:pPr>
-            <a:r>
-              <a:rPr lang="en-IL" dirty="0"/>
-              <a:t>Run a training using the train set and validate it with the valid set</a:t>
-            </a:r>
-          </a:p>
-          <a:p>
-            <a:pPr marL="914400" lvl="1" indent="-457200" algn="l" rtl="0">
-              <a:spcBef>
-                <a:spcPts val="1000"/>
-              </a:spcBef>
-              <a:buFont typeface="+mj-lt"/>
-              <a:buAutoNum type="arabicPeriod"/>
-            </a:pPr>
-            <a:r>
-              <a:rPr lang="en-IL" dirty="0"/>
-              <a:t>Make a test using the test set in order to calculate our desired metrics</a:t>
-            </a:r>
-          </a:p>
-          <a:p>
-            <a:pPr marL="457200" indent="-457200" algn="l" rtl="0">
-              <a:buFont typeface="+mj-lt"/>
-              <a:buAutoNum type="arabicPeriod"/>
-            </a:pPr>
-            <a:r>
-              <a:rPr lang="en-IL" dirty="0"/>
-              <a:t>Run a </a:t>
-            </a:r>
-            <a:r>
-              <a:rPr lang="en-US" dirty="0" err="1"/>
-              <a:t>FraeAI</a:t>
-            </a:r>
+        <p:spPr/>
+        <p:txBody>
+          <a:bodyPr/>
+          <a:lstStyle/>
+          <a:p>
+            <a:pPr algn="l" rtl="0"/>
             <a:r>
               <a:rPr lang="en-US" dirty="0"/>
-              <a:t> algorithm based on a single feature of the original dataset and compare between the predicted vs actual test results (In our use-case it’s anomaly)</a:t>
-            </a:r>
-          </a:p>
-          <a:p>
-            <a:pPr marL="457200" indent="-457200" algn="l" rtl="0">
-              <a:buFont typeface="+mj-lt"/>
-              <a:buAutoNum type="arabicPeriod"/>
-            </a:pPr>
+              <a:t>X: single feature or subset of features of </a:t>
+            </a:r>
+            <a:r>
+              <a:rPr lang="en-US" b="1" u="sng" dirty="0"/>
+              <a:t>anomalies</a:t>
+            </a:r>
             <a:r>
               <a:rPr lang="en-US" dirty="0"/>
-              <a:t>Calculate our desired metrics based on the </a:t>
-            </a:r>
-            <a:r>
-              <a:rPr lang="en-US" dirty="0" err="1"/>
-              <a:t>FraeAI</a:t>
-            </a:r>
+              <a:t> in the original dataset</a:t>
+            </a:r>
+          </a:p>
+          <a:p>
+            <a:pPr algn="l" rtl="0"/>
             <a:r>
               <a:rPr lang="en-US" dirty="0"/>
-              <a:t> algorithm</a:t>
-            </a:r>
-          </a:p>
-          <a:p>
-            <a:pPr marL="457200" indent="-457200" algn="l" rtl="0">
-              <a:buFont typeface="+mj-lt"/>
-              <a:buAutoNum type="arabicPeriod"/>
-            </a:pPr>
+              <a:t>Y:</a:t>
+            </a:r>
+          </a:p>
+          <a:p>
+            <a:pPr lvl="1" algn="l" rtl="0"/>
             <a:r>
               <a:rPr lang="en-US" dirty="0"/>
-              <a:t>Register our model into Databricks platform</a:t>
-            </a:r>
-          </a:p>
-          <a:p>
-            <a:pPr marL="457200" indent="-457200" algn="l" rtl="0">
-              <a:buFont typeface="+mj-lt"/>
-              <a:buAutoNum type="arabicPeriod"/>
-            </a:pPr>
-            <a:r>
-              <a:rPr lang="en-IL" dirty="0"/>
-              <a:t>Load the model from Databricks and make a test using the test set in order to calculate our desired metrics</a:t>
-            </a:r>
+              <a:t>‘True’ =  original model predicted the original output successfully = True Positive</a:t>
+            </a:r>
+          </a:p>
+          <a:p>
+            <a:pPr lvl="1" algn="l" rtl="0"/>
+            <a:r>
+              <a:rPr lang="en-US" dirty="0"/>
+              <a:t>‘False’ = original model failed in its prediction = False Negative</a:t>
+            </a:r>
+            <a:endParaRPr lang="he-IL" dirty="0"/>
           </a:p>
         </p:txBody>
       </p:sp>
     </p:spTree>
     <p:extLst>
       <p:ext uri="{BB962C8B-B14F-4D97-AF65-F5344CB8AC3E}">
-        <p14:creationId xmlns:p14="http://schemas.microsoft.com/office/powerpoint/2010/main" val="1757092679"/>
+        <p14:creationId xmlns:p14="http://schemas.microsoft.com/office/powerpoint/2010/main" val="230825914"/>
       </p:ext>
     </p:extLst>
   </p:cSld>
@@ -6913,10 +6753,96 @@
       </p:grpSpPr>
       <p:sp>
         <p:nvSpPr>
+          <p:cNvPr id="4" name="Title 3">
+            <a:extLst>
+              <a:ext uri="{FF2B5EF4-FFF2-40B4-BE49-F238E27FC236}">
+                <a16:creationId xmlns:a16="http://schemas.microsoft.com/office/drawing/2014/main" id="{0164B796-02E6-2CF2-AD58-6BA0FF61E8C3}"/>
+              </a:ext>
+            </a:extLst>
+          </p:cNvPr>
+          <p:cNvSpPr>
+            <a:spLocks noGrp="1"/>
+          </p:cNvSpPr>
+          <p:nvPr>
+            <p:ph type="title"/>
+          </p:nvPr>
+        </p:nvSpPr>
+        <p:spPr/>
+        <p:txBody>
+          <a:bodyPr/>
+          <a:lstStyle/>
+          <a:p>
+            <a:pPr rtl="0"/>
+            <a:r>
+              <a:rPr lang="en-US" cap="all" dirty="0"/>
+              <a:t>The architecture</a:t>
+            </a:r>
+            <a:endParaRPr lang="he-IL" cap="all" dirty="0"/>
+          </a:p>
+        </p:txBody>
+      </p:sp>
+      <p:sp>
+        <p:nvSpPr>
+          <p:cNvPr id="5" name="Text Placeholder 4">
+            <a:extLst>
+              <a:ext uri="{FF2B5EF4-FFF2-40B4-BE49-F238E27FC236}">
+                <a16:creationId xmlns:a16="http://schemas.microsoft.com/office/drawing/2014/main" id="{49087E06-C5E1-41C3-1F28-1C6A2EEE3E22}"/>
+              </a:ext>
+            </a:extLst>
+          </p:cNvPr>
+          <p:cNvSpPr>
+            <a:spLocks noGrp="1"/>
+          </p:cNvSpPr>
+          <p:nvPr>
+            <p:ph type="body" idx="1"/>
+          </p:nvPr>
+        </p:nvSpPr>
+        <p:spPr/>
+        <p:txBody>
+          <a:bodyPr/>
+          <a:lstStyle/>
+          <a:p>
+            <a:pPr rtl="0"/>
+            <a:endParaRPr lang="he-IL" dirty="0"/>
+          </a:p>
+        </p:txBody>
+      </p:sp>
+    </p:spTree>
+    <p:extLst>
+      <p:ext uri="{BB962C8B-B14F-4D97-AF65-F5344CB8AC3E}">
+        <p14:creationId xmlns:p14="http://schemas.microsoft.com/office/powerpoint/2010/main" val="2039371253"/>
+      </p:ext>
+    </p:extLst>
+  </p:cSld>
+  <p:clrMapOvr>
+    <a:masterClrMapping/>
+  </p:clrMapOvr>
+</p:sld>
+</file>
+
+<file path=ppt/slides/slide13.xml><?xml version="1.0" encoding="utf-8"?>
+<p:sld xmlns:a="http://schemas.openxmlformats.org/drawingml/2006/main" xmlns:r="http://schemas.openxmlformats.org/officeDocument/2006/relationships" xmlns:p="http://schemas.openxmlformats.org/presentationml/2006/main">
+  <p:cSld>
+    <p:spTree>
+      <p:nvGrpSpPr>
+        <p:cNvPr id="1" name=""/>
+        <p:cNvGrpSpPr/>
+        <p:nvPr/>
+      </p:nvGrpSpPr>
+      <p:grpSpPr>
+        <a:xfrm>
+          <a:off x="0" y="0"/>
+          <a:ext cx="0" cy="0"/>
+          <a:chOff x="0" y="0"/>
+          <a:chExt cx="0" cy="0"/>
+        </a:xfrm>
+      </p:grpSpPr>
+      <p:sp>
+        <p:nvSpPr>
           <p:cNvPr id="2" name="Title 1">
             <a:extLst>
               <a:ext uri="{FF2B5EF4-FFF2-40B4-BE49-F238E27FC236}">
-                <a16:creationId xmlns:a16="http://schemas.microsoft.com/office/drawing/2014/main" id="{0D2CA2B8-C3E4-9CCB-39B6-3632459C9DBE}"/>
+                <a16:creationId xmlns:a16="http://schemas.microsoft.com/office/drawing/2014/main" id="{3E2365AF-46C2-3616-1532-D71DEC709133}"/>
               </a:ext>
             </a:extLst>
           </p:cNvPr>
@@ -6943,7 +6869,7 @@
             </a:pPr>
             <a:r>
               <a:rPr lang="en-IL" dirty="0"/>
-              <a:t>Architecture – MLFlow</a:t>
+              <a:t>Architecture - Overall</a:t>
             </a:r>
           </a:p>
         </p:txBody>
@@ -6953,7 +6879,7 @@
           <p:cNvPr id="3" name="Content Placeholder 2">
             <a:extLst>
               <a:ext uri="{FF2B5EF4-FFF2-40B4-BE49-F238E27FC236}">
-                <a16:creationId xmlns:a16="http://schemas.microsoft.com/office/drawing/2014/main" id="{043E4208-15B2-8B64-720E-70C7E9DBB450}"/>
+                <a16:creationId xmlns:a16="http://schemas.microsoft.com/office/drawing/2014/main" id="{E6EF5898-C934-4F56-A10A-009A01A21DA2}"/>
               </a:ext>
             </a:extLst>
           </p:cNvPr>
@@ -6964,9 +6890,16 @@
             <p:ph sz="quarter" idx="13"/>
           </p:nvPr>
         </p:nvSpPr>
-        <p:spPr/>
-        <p:txBody>
-          <a:bodyPr/>
+        <p:spPr>
+          <a:xfrm>
+            <a:off x="913774" y="1828800"/>
+            <a:ext cx="10363826" cy="3962399"/>
+          </a:xfrm>
+        </p:spPr>
+        <p:txBody>
+          <a:bodyPr>
+            <a:normAutofit/>
+          </a:bodyPr>
           <a:lstStyle/>
           <a:p>
             <a:pPr marL="228600" indent="-228600" algn="l" defTabSz="914400" rtl="0" eaLnBrk="1" latinLnBrk="0" hangingPunct="1">
@@ -6984,9 +6917,374 @@
             </a:pPr>
             <a:r>
               <a:rPr lang="en-IL" dirty="0"/>
-              <a:t>MLFlow is a MLOps library provider by Databricks, a MLOps software company</a:t>
-            </a:r>
-          </a:p>
+              <a:t>Runtime environment: We use our laptops as the runtime environment, with the following installed:</a:t>
+            </a:r>
+          </a:p>
+          <a:p>
+            <a:pPr lvl="1" algn="l" rtl="0">
+              <a:spcBef>
+                <a:spcPts val="1000"/>
+              </a:spcBef>
+            </a:pPr>
+            <a:r>
+              <a:rPr lang="en-IL" sz="2000" dirty="0"/>
+              <a:t>OS: MacOS M1 / M2 or Windows 10+ supported</a:t>
+            </a:r>
+          </a:p>
+          <a:p>
+            <a:pPr lvl="1" algn="l" rtl="0">
+              <a:spcBef>
+                <a:spcPts val="1000"/>
+              </a:spcBef>
+            </a:pPr>
+            <a:r>
+              <a:rPr lang="en-IL" sz="2000" dirty="0"/>
+              <a:t>Python 3.11 with Anaconda / Miniconda installed</a:t>
+            </a:r>
+          </a:p>
+          <a:p>
+            <a:pPr lvl="1" algn="l" rtl="0">
+              <a:spcBef>
+                <a:spcPts val="1000"/>
+              </a:spcBef>
+            </a:pPr>
+            <a:r>
+              <a:rPr lang="en-IL" sz="2000" dirty="0"/>
+              <a:t>The requirements Python packages specified in requirements.txt files installed using pip or conda</a:t>
+            </a:r>
+          </a:p>
+          <a:p>
+            <a:pPr lvl="1" algn="l" rtl="0">
+              <a:spcBef>
+                <a:spcPts val="1000"/>
+              </a:spcBef>
+            </a:pPr>
+            <a:r>
+              <a:rPr lang="en-IL" sz="2000" dirty="0"/>
+              <a:t>In a real scenario the runtime environment should be run on an Instance in the cloud</a:t>
+            </a:r>
+          </a:p>
+          <a:p>
+            <a:pPr algn="l" rtl="0"/>
+            <a:r>
+              <a:rPr lang="en-IL" dirty="0"/>
+              <a:t>Model registry: We use Databricks SaaS platform to register and store our trained models. The Databricks platform is hosted in AWS cloud</a:t>
+            </a:r>
+          </a:p>
+        </p:txBody>
+      </p:sp>
+    </p:spTree>
+    <p:extLst>
+      <p:ext uri="{BB962C8B-B14F-4D97-AF65-F5344CB8AC3E}">
+        <p14:creationId xmlns:p14="http://schemas.microsoft.com/office/powerpoint/2010/main" val="810456341"/>
+      </p:ext>
+    </p:extLst>
+  </p:cSld>
+  <p:clrMapOvr>
+    <a:masterClrMapping/>
+  </p:clrMapOvr>
+</p:sld>
+</file>
+
+<file path=ppt/slides/slide14.xml><?xml version="1.0" encoding="utf-8"?>
+<p:sld xmlns:a="http://schemas.openxmlformats.org/drawingml/2006/main" xmlns:r="http://schemas.openxmlformats.org/officeDocument/2006/relationships" xmlns:p="http://schemas.openxmlformats.org/presentationml/2006/main">
+  <p:cSld>
+    <p:spTree>
+      <p:nvGrpSpPr>
+        <p:cNvPr id="1" name=""/>
+        <p:cNvGrpSpPr/>
+        <p:nvPr/>
+      </p:nvGrpSpPr>
+      <p:grpSpPr>
+        <a:xfrm>
+          <a:off x="0" y="0"/>
+          <a:ext cx="0" cy="0"/>
+          <a:chOff x="0" y="0"/>
+          <a:chExt cx="0" cy="0"/>
+        </a:xfrm>
+      </p:grpSpPr>
+      <p:sp>
+        <p:nvSpPr>
+          <p:cNvPr id="2" name="Title 1">
+            <a:extLst>
+              <a:ext uri="{FF2B5EF4-FFF2-40B4-BE49-F238E27FC236}">
+                <a16:creationId xmlns:a16="http://schemas.microsoft.com/office/drawing/2014/main" id="{1992D947-AC74-53B5-5D6B-12BA87E6572D}"/>
+              </a:ext>
+            </a:extLst>
+          </p:cNvPr>
+          <p:cNvSpPr>
+            <a:spLocks noGrp="1"/>
+          </p:cNvSpPr>
+          <p:nvPr>
+            <p:ph type="title"/>
+          </p:nvPr>
+        </p:nvSpPr>
+        <p:spPr/>
+        <p:txBody>
+          <a:bodyPr/>
+          <a:lstStyle/>
+          <a:p>
+            <a:pPr algn="ctr" defTabSz="914400" rtl="0" eaLnBrk="1" latinLnBrk="0" hangingPunct="1">
+              <a:lnSpc>
+                <a:spcPct val="90000"/>
+              </a:lnSpc>
+              <a:spcBef>
+                <a:spcPct val="0"/>
+              </a:spcBef>
+              <a:buNone/>
+            </a:pPr>
+            <a:r>
+              <a:rPr lang="en-IL" dirty="0"/>
+              <a:t>Architecture - Process</a:t>
+            </a:r>
+          </a:p>
+        </p:txBody>
+      </p:sp>
+      <p:sp>
+        <p:nvSpPr>
+          <p:cNvPr id="3" name="Content Placeholder 2">
+            <a:extLst>
+              <a:ext uri="{FF2B5EF4-FFF2-40B4-BE49-F238E27FC236}">
+                <a16:creationId xmlns:a16="http://schemas.microsoft.com/office/drawing/2014/main" id="{16B8136E-200E-3148-DE13-5E3FEC8D9D65}"/>
+              </a:ext>
+            </a:extLst>
+          </p:cNvPr>
+          <p:cNvSpPr>
+            <a:spLocks noGrp="1"/>
+          </p:cNvSpPr>
+          <p:nvPr>
+            <p:ph sz="quarter" idx="13"/>
+          </p:nvPr>
+        </p:nvSpPr>
+        <p:spPr>
+          <a:xfrm>
+            <a:off x="659774" y="1794934"/>
+            <a:ext cx="10363826" cy="4614333"/>
+          </a:xfrm>
+        </p:spPr>
+        <p:txBody>
+          <a:bodyPr>
+            <a:normAutofit fontScale="92500" lnSpcReduction="10000"/>
+          </a:bodyPr>
+          <a:lstStyle/>
+          <a:p>
+            <a:pPr marL="457200" indent="-457200" algn="l" defTabSz="914400" rtl="0" eaLnBrk="1" latinLnBrk="0" hangingPunct="1">
+              <a:lnSpc>
+                <a:spcPct val="120000"/>
+              </a:lnSpc>
+              <a:spcBef>
+                <a:spcPts val="1000"/>
+              </a:spcBef>
+              <a:buClr>
+                <a:schemeClr val="tx1"/>
+              </a:buClr>
+              <a:buFont typeface="+mj-lt"/>
+              <a:buAutoNum type="arabicPeriod"/>
+            </a:pPr>
+            <a:r>
+              <a:rPr lang="en-IL" dirty="0"/>
+              <a:t>Load the dataset from a set of CSV files and concatinate them into a Dataframe object</a:t>
+            </a:r>
+          </a:p>
+          <a:p>
+            <a:pPr marL="457200" indent="-457200" algn="l" defTabSz="914400" rtl="0" eaLnBrk="1" latinLnBrk="0" hangingPunct="1">
+              <a:lnSpc>
+                <a:spcPct val="120000"/>
+              </a:lnSpc>
+              <a:spcBef>
+                <a:spcPts val="1000"/>
+              </a:spcBef>
+              <a:buClr>
+                <a:schemeClr val="tx1"/>
+              </a:buClr>
+              <a:buFont typeface="+mj-lt"/>
+              <a:buAutoNum type="arabicPeriod"/>
+            </a:pPr>
+            <a:r>
+              <a:rPr lang="en-IL" dirty="0"/>
+              <a:t>By the selected algorithm (LightGBM / ConvAE):</a:t>
+            </a:r>
+          </a:p>
+          <a:p>
+            <a:pPr marL="914400" lvl="1" indent="-457200" algn="l" rtl="0">
+              <a:spcBef>
+                <a:spcPts val="1000"/>
+              </a:spcBef>
+              <a:buFont typeface="+mj-lt"/>
+              <a:buAutoNum type="arabicPeriod"/>
+            </a:pPr>
+            <a:r>
+              <a:rPr lang="en-IL" dirty="0"/>
+              <a:t>Split the dataset into train / valid</a:t>
+            </a:r>
+            <a:r>
+              <a:rPr lang="en-US" dirty="0" err="1"/>
+              <a:t>ation</a:t>
+            </a:r>
+            <a:r>
+              <a:rPr lang="en-IL" dirty="0"/>
+              <a:t> / test sets</a:t>
+            </a:r>
+          </a:p>
+          <a:p>
+            <a:pPr marL="914400" lvl="1" indent="-457200" algn="l" rtl="0">
+              <a:spcBef>
+                <a:spcPts val="1000"/>
+              </a:spcBef>
+              <a:buFont typeface="+mj-lt"/>
+              <a:buAutoNum type="arabicPeriod"/>
+            </a:pPr>
+            <a:r>
+              <a:rPr lang="en-IL" dirty="0"/>
+              <a:t>Run a training using the train set and validate it with the valid set</a:t>
+            </a:r>
+          </a:p>
+          <a:p>
+            <a:pPr marL="914400" lvl="1" indent="-457200" algn="l" rtl="0">
+              <a:spcBef>
+                <a:spcPts val="1000"/>
+              </a:spcBef>
+              <a:buFont typeface="+mj-lt"/>
+              <a:buAutoNum type="arabicPeriod"/>
+            </a:pPr>
+            <a:r>
+              <a:rPr lang="en-IL" dirty="0"/>
+              <a:t>Make a test using the test set in order to calculate our desired metrics</a:t>
+            </a:r>
+          </a:p>
+          <a:p>
+            <a:pPr marL="457200" indent="-457200" algn="l" rtl="0">
+              <a:buFont typeface="+mj-lt"/>
+              <a:buAutoNum type="arabicPeriod"/>
+            </a:pPr>
+            <a:r>
+              <a:rPr lang="en-IL" dirty="0"/>
+              <a:t>Run a </a:t>
+            </a:r>
+            <a:r>
+              <a:rPr lang="en-US" dirty="0"/>
+              <a:t>FreaAI algorithm based on a single feature of the original dataset and compare between the predicted vs actual test results (In our use-case it’s anomaly)</a:t>
+            </a:r>
+          </a:p>
+          <a:p>
+            <a:pPr marL="457200" indent="-457200" algn="l" rtl="0">
+              <a:buFont typeface="+mj-lt"/>
+              <a:buAutoNum type="arabicPeriod"/>
+            </a:pPr>
+            <a:r>
+              <a:rPr lang="en-US" dirty="0"/>
+              <a:t>Calculate our desired metrics based on the FreaAI algorithm</a:t>
+            </a:r>
+          </a:p>
+          <a:p>
+            <a:pPr marL="457200" indent="-457200" algn="l" rtl="0">
+              <a:buFont typeface="+mj-lt"/>
+              <a:buAutoNum type="arabicPeriod"/>
+            </a:pPr>
+            <a:r>
+              <a:rPr lang="en-US" dirty="0"/>
+              <a:t>Register our model into Databricks platform</a:t>
+            </a:r>
+          </a:p>
+          <a:p>
+            <a:pPr marL="457200" indent="-457200" algn="l" rtl="0">
+              <a:buFont typeface="+mj-lt"/>
+              <a:buAutoNum type="arabicPeriod"/>
+            </a:pPr>
+            <a:r>
+              <a:rPr lang="en-IL" dirty="0"/>
+              <a:t>Load the model from Databricks and make a test using the test set in order to calculate our desired metrics</a:t>
+            </a:r>
+          </a:p>
+        </p:txBody>
+      </p:sp>
+    </p:spTree>
+    <p:extLst>
+      <p:ext uri="{BB962C8B-B14F-4D97-AF65-F5344CB8AC3E}">
+        <p14:creationId xmlns:p14="http://schemas.microsoft.com/office/powerpoint/2010/main" val="1757092679"/>
+      </p:ext>
+    </p:extLst>
+  </p:cSld>
+  <p:clrMapOvr>
+    <a:masterClrMapping/>
+  </p:clrMapOvr>
+</p:sld>
+</file>
+
+<file path=ppt/slides/slide15.xml><?xml version="1.0" encoding="utf-8"?>
+<p:sld xmlns:a="http://schemas.openxmlformats.org/drawingml/2006/main" xmlns:r="http://schemas.openxmlformats.org/officeDocument/2006/relationships" xmlns:p="http://schemas.openxmlformats.org/presentationml/2006/main">
+  <p:cSld>
+    <p:spTree>
+      <p:nvGrpSpPr>
+        <p:cNvPr id="1" name=""/>
+        <p:cNvGrpSpPr/>
+        <p:nvPr/>
+      </p:nvGrpSpPr>
+      <p:grpSpPr>
+        <a:xfrm>
+          <a:off x="0" y="0"/>
+          <a:ext cx="0" cy="0"/>
+          <a:chOff x="0" y="0"/>
+          <a:chExt cx="0" cy="0"/>
+        </a:xfrm>
+      </p:grpSpPr>
+      <p:sp>
+        <p:nvSpPr>
+          <p:cNvPr id="2" name="Title 1">
+            <a:extLst>
+              <a:ext uri="{FF2B5EF4-FFF2-40B4-BE49-F238E27FC236}">
+                <a16:creationId xmlns:a16="http://schemas.microsoft.com/office/drawing/2014/main" id="{0D2CA2B8-C3E4-9CCB-39B6-3632459C9DBE}"/>
+              </a:ext>
+            </a:extLst>
+          </p:cNvPr>
+          <p:cNvSpPr>
+            <a:spLocks noGrp="1"/>
+          </p:cNvSpPr>
+          <p:nvPr>
+            <p:ph type="title"/>
+          </p:nvPr>
+        </p:nvSpPr>
+        <p:spPr/>
+        <p:txBody>
+          <a:bodyPr/>
+          <a:lstStyle/>
+          <a:p>
+            <a:pPr algn="ctr" defTabSz="914400" rtl="0" eaLnBrk="1" latinLnBrk="0" hangingPunct="1">
+              <a:lnSpc>
+                <a:spcPct val="90000"/>
+              </a:lnSpc>
+              <a:spcBef>
+                <a:spcPct val="0"/>
+              </a:spcBef>
+              <a:buNone/>
+            </a:pPr>
+            <a:r>
+              <a:rPr lang="en-IL" dirty="0"/>
+              <a:t>Architecture – MLFlow</a:t>
+            </a:r>
+          </a:p>
+        </p:txBody>
+      </p:sp>
+      <p:sp>
+        <p:nvSpPr>
+          <p:cNvPr id="3" name="Content Placeholder 2">
+            <a:extLst>
+              <a:ext uri="{FF2B5EF4-FFF2-40B4-BE49-F238E27FC236}">
+                <a16:creationId xmlns:a16="http://schemas.microsoft.com/office/drawing/2014/main" id="{043E4208-15B2-8B64-720E-70C7E9DBB450}"/>
+              </a:ext>
+            </a:extLst>
+          </p:cNvPr>
+          <p:cNvSpPr>
+            <a:spLocks noGrp="1"/>
+          </p:cNvSpPr>
+          <p:nvPr>
+            <p:ph sz="quarter" idx="13"/>
+          </p:nvPr>
+        </p:nvSpPr>
+        <p:spPr/>
+        <p:txBody>
+          <a:bodyPr/>
+          <a:lstStyle/>
           <a:p>
             <a:pPr marL="228600" indent="-228600" algn="l" defTabSz="914400" rtl="0" eaLnBrk="1" latinLnBrk="0" hangingPunct="1">
               <a:lnSpc>
@@ -7003,7 +7301,7 @@
             </a:pPr>
             <a:r>
               <a:rPr lang="en-IL" dirty="0"/>
-              <a:t>We use MLFlow to register our trained model in the Databricks cloud SaaS platform</a:t>
+              <a:t>MLFlow is a MLOps library provider by Databricks, a MLOps software company</a:t>
             </a:r>
           </a:p>
           <a:p>
@@ -7022,7 +7320,7 @@
             </a:pPr>
             <a:r>
               <a:rPr lang="en-IL" dirty="0"/>
-              <a:t>Using MLFlow, we can handle versions of the trained model</a:t>
+              <a:t>We use MLFlow to register our trained model in the Databricks cloud SaaS platform</a:t>
             </a:r>
           </a:p>
           <a:p>
@@ -7041,6 +7339,25 @@
             </a:pPr>
             <a:r>
               <a:rPr lang="en-IL" dirty="0"/>
+              <a:t>Using MLFlow, we can handle versions of the trained model</a:t>
+            </a:r>
+          </a:p>
+          <a:p>
+            <a:pPr marL="228600" indent="-228600" algn="l" defTabSz="914400" rtl="0" eaLnBrk="1" latinLnBrk="0" hangingPunct="1">
+              <a:lnSpc>
+                <a:spcPct val="120000"/>
+              </a:lnSpc>
+              <a:spcBef>
+                <a:spcPts val="1000"/>
+              </a:spcBef>
+              <a:buClr>
+                <a:schemeClr val="tx1"/>
+              </a:buClr>
+              <a:buFont typeface="Arial" panose="020B0604020202020204" pitchFamily="34" charset="0"/>
+              <a:buChar char="•"/>
+            </a:pPr>
+            <a:r>
+              <a:rPr lang="en-IL" dirty="0"/>
               <a:t>In production scenario, we can load the model from the platform and run a prediction against a test set in order to calculate our metrics </a:t>
             </a:r>
           </a:p>
@@ -7059,7 +7376,7 @@
 </p:sld>
 </file>
 
-<file path=ppt/slides/slide13.xml><?xml version="1.0" encoding="utf-8"?>
+<file path=ppt/slides/slide16.xml><?xml version="1.0" encoding="utf-8"?>
 <p:sld xmlns:a="http://schemas.openxmlformats.org/drawingml/2006/main" xmlns:r="http://schemas.openxmlformats.org/officeDocument/2006/relationships" xmlns:p="http://schemas.openxmlformats.org/presentationml/2006/main">
   <p:cSld>
     <p:spTree>
@@ -7156,7 +7473,7 @@
 </p:sld>
 </file>
 
-<file path=ppt/slides/slide14.xml><?xml version="1.0" encoding="utf-8"?>
+<file path=ppt/slides/slide17.xml><?xml version="1.0" encoding="utf-8"?>
 <p:sld xmlns:a="http://schemas.openxmlformats.org/drawingml/2006/main" xmlns:r="http://schemas.openxmlformats.org/officeDocument/2006/relationships" xmlns:p="http://schemas.openxmlformats.org/presentationml/2006/main">
   <p:cSld>
     <p:spTree>
@@ -7253,6 +7570,178 @@
 </p:sld>
 </file>
 
+<file path=ppt/slides/slide18.xml><?xml version="1.0" encoding="utf-8"?>
+<p:sld xmlns:a="http://schemas.openxmlformats.org/drawingml/2006/main" xmlns:r="http://schemas.openxmlformats.org/officeDocument/2006/relationships" xmlns:p="http://schemas.openxmlformats.org/presentationml/2006/main">
+  <p:cSld>
+    <p:spTree>
+      <p:nvGrpSpPr>
+        <p:cNvPr id="1" name=""/>
+        <p:cNvGrpSpPr/>
+        <p:nvPr/>
+      </p:nvGrpSpPr>
+      <p:grpSpPr>
+        <a:xfrm>
+          <a:off x="0" y="0"/>
+          <a:ext cx="0" cy="0"/>
+          <a:chOff x="0" y="0"/>
+          <a:chExt cx="0" cy="0"/>
+        </a:xfrm>
+      </p:grpSpPr>
+      <p:sp>
+        <p:nvSpPr>
+          <p:cNvPr id="4" name="Title 3">
+            <a:extLst>
+              <a:ext uri="{FF2B5EF4-FFF2-40B4-BE49-F238E27FC236}">
+                <a16:creationId xmlns:a16="http://schemas.microsoft.com/office/drawing/2014/main" id="{0164B796-02E6-2CF2-AD58-6BA0FF61E8C3}"/>
+              </a:ext>
+            </a:extLst>
+          </p:cNvPr>
+          <p:cNvSpPr>
+            <a:spLocks noGrp="1"/>
+          </p:cNvSpPr>
+          <p:nvPr>
+            <p:ph type="title"/>
+          </p:nvPr>
+        </p:nvSpPr>
+        <p:spPr/>
+        <p:txBody>
+          <a:bodyPr/>
+          <a:lstStyle/>
+          <a:p>
+            <a:pPr rtl="0"/>
+            <a:r>
+              <a:rPr lang="en-US" cap="all" dirty="0"/>
+              <a:t>DEMO</a:t>
+            </a:r>
+            <a:endParaRPr lang="he-IL" cap="all" dirty="0"/>
+          </a:p>
+        </p:txBody>
+      </p:sp>
+      <p:sp>
+        <p:nvSpPr>
+          <p:cNvPr id="5" name="Text Placeholder 4">
+            <a:extLst>
+              <a:ext uri="{FF2B5EF4-FFF2-40B4-BE49-F238E27FC236}">
+                <a16:creationId xmlns:a16="http://schemas.microsoft.com/office/drawing/2014/main" id="{49087E06-C5E1-41C3-1F28-1C6A2EEE3E22}"/>
+              </a:ext>
+            </a:extLst>
+          </p:cNvPr>
+          <p:cNvSpPr>
+            <a:spLocks noGrp="1"/>
+          </p:cNvSpPr>
+          <p:nvPr>
+            <p:ph type="body" idx="1"/>
+          </p:nvPr>
+        </p:nvSpPr>
+        <p:spPr/>
+        <p:txBody>
+          <a:bodyPr/>
+          <a:lstStyle/>
+          <a:p>
+            <a:pPr rtl="0"/>
+            <a:endParaRPr lang="he-IL" dirty="0"/>
+          </a:p>
+        </p:txBody>
+      </p:sp>
+    </p:spTree>
+    <p:extLst>
+      <p:ext uri="{BB962C8B-B14F-4D97-AF65-F5344CB8AC3E}">
+        <p14:creationId xmlns:p14="http://schemas.microsoft.com/office/powerpoint/2010/main" val="3522007243"/>
+      </p:ext>
+    </p:extLst>
+  </p:cSld>
+  <p:clrMapOvr>
+    <a:masterClrMapping/>
+  </p:clrMapOvr>
+</p:sld>
+</file>
+
+<file path=ppt/slides/slide19.xml><?xml version="1.0" encoding="utf-8"?>
+<p:sld xmlns:a="http://schemas.openxmlformats.org/drawingml/2006/main" xmlns:r="http://schemas.openxmlformats.org/officeDocument/2006/relationships" xmlns:p="http://schemas.openxmlformats.org/presentationml/2006/main">
+  <p:cSld>
+    <p:spTree>
+      <p:nvGrpSpPr>
+        <p:cNvPr id="1" name=""/>
+        <p:cNvGrpSpPr/>
+        <p:nvPr/>
+      </p:nvGrpSpPr>
+      <p:grpSpPr>
+        <a:xfrm>
+          <a:off x="0" y="0"/>
+          <a:ext cx="0" cy="0"/>
+          <a:chOff x="0" y="0"/>
+          <a:chExt cx="0" cy="0"/>
+        </a:xfrm>
+      </p:grpSpPr>
+      <p:sp>
+        <p:nvSpPr>
+          <p:cNvPr id="4" name="Title 3">
+            <a:extLst>
+              <a:ext uri="{FF2B5EF4-FFF2-40B4-BE49-F238E27FC236}">
+                <a16:creationId xmlns:a16="http://schemas.microsoft.com/office/drawing/2014/main" id="{0164B796-02E6-2CF2-AD58-6BA0FF61E8C3}"/>
+              </a:ext>
+            </a:extLst>
+          </p:cNvPr>
+          <p:cNvSpPr>
+            <a:spLocks noGrp="1"/>
+          </p:cNvSpPr>
+          <p:nvPr>
+            <p:ph type="title"/>
+          </p:nvPr>
+        </p:nvSpPr>
+        <p:spPr/>
+        <p:txBody>
+          <a:bodyPr/>
+          <a:lstStyle/>
+          <a:p>
+            <a:pPr rtl="0"/>
+            <a:r>
+              <a:rPr lang="en-US" cap="all" dirty="0"/>
+              <a:t>THE report</a:t>
+            </a:r>
+            <a:endParaRPr lang="he-IL" cap="all" dirty="0"/>
+          </a:p>
+        </p:txBody>
+      </p:sp>
+      <p:sp>
+        <p:nvSpPr>
+          <p:cNvPr id="5" name="Text Placeholder 4">
+            <a:extLst>
+              <a:ext uri="{FF2B5EF4-FFF2-40B4-BE49-F238E27FC236}">
+                <a16:creationId xmlns:a16="http://schemas.microsoft.com/office/drawing/2014/main" id="{49087E06-C5E1-41C3-1F28-1C6A2EEE3E22}"/>
+              </a:ext>
+            </a:extLst>
+          </p:cNvPr>
+          <p:cNvSpPr>
+            <a:spLocks noGrp="1"/>
+          </p:cNvSpPr>
+          <p:nvPr>
+            <p:ph type="body" idx="1"/>
+          </p:nvPr>
+        </p:nvSpPr>
+        <p:spPr/>
+        <p:txBody>
+          <a:bodyPr/>
+          <a:lstStyle/>
+          <a:p>
+            <a:pPr rtl="0"/>
+            <a:endParaRPr lang="he-IL" dirty="0"/>
+          </a:p>
+        </p:txBody>
+      </p:sp>
+    </p:spTree>
+    <p:extLst>
+      <p:ext uri="{BB962C8B-B14F-4D97-AF65-F5344CB8AC3E}">
+        <p14:creationId xmlns:p14="http://schemas.microsoft.com/office/powerpoint/2010/main" val="3978710713"/>
+      </p:ext>
+    </p:extLst>
+  </p:cSld>
+  <p:clrMapOvr>
+    <a:masterClrMapping/>
+  </p:clrMapOvr>
+</p:sld>
+</file>
+
 <file path=ppt/slides/slide2.xml><?xml version="1.0" encoding="utf-8"?>
 <p:sld xmlns:a="http://schemas.openxmlformats.org/drawingml/2006/main" xmlns:r="http://schemas.openxmlformats.org/officeDocument/2006/relationships" xmlns:p="http://schemas.openxmlformats.org/presentationml/2006/main" show="0">
   <p:cSld>
@@ -7295,14 +7784,7 @@
               <a:rPr lang="en-US" dirty="0">
                 <a:cs typeface="Calibri" panose="020F0502020204030204" pitchFamily="34" charset="0"/>
               </a:rPr>
-              <a:t>Internal: Required p</a:t>
-            </a:r>
-            <a:r>
-              <a:rPr lang="en-US" sz="3600" dirty="0">
-                <a:effectLst/>
-                <a:cs typeface="Calibri" panose="020F0502020204030204" pitchFamily="34" charset="0"/>
-              </a:rPr>
-              <a:t>resentation content</a:t>
+              <a:t>Agenda</a:t>
             </a:r>
             <a:endParaRPr lang="he-IL" dirty="0"/>
           </a:p>
@@ -7326,217 +7808,161 @@
         </p:nvSpPr>
         <p:spPr/>
         <p:txBody>
-          <a:bodyPr/>
-          <a:lstStyle/>
-          <a:p>
-            <a:pPr algn="l" rtl="0" fontAlgn="ctr">
+          <a:bodyPr>
+            <a:normAutofit fontScale="92500" lnSpcReduction="20000"/>
+          </a:bodyPr>
+          <a:lstStyle/>
+          <a:p>
+            <a:pPr marL="514350" indent="-514350" algn="l" rtl="0" fontAlgn="ctr">
+              <a:lnSpc>
+                <a:spcPct val="160000"/>
+              </a:lnSpc>
               <a:spcBef>
                 <a:spcPts val="0"/>
               </a:spcBef>
               <a:spcAft>
                 <a:spcPts val="0"/>
               </a:spcAft>
-              <a:buFont typeface="Arial" panose="020B0604020202020204" pitchFamily="34" charset="0"/>
-              <a:buChar char="•"/>
+              <a:buFont typeface="+mj-lt"/>
+              <a:buAutoNum type="arabicPeriod"/>
             </a:pPr>
             <a:r>
-              <a:rPr lang="en-US" sz="1800" dirty="0">
+              <a:rPr lang="en-US" sz="2800" dirty="0">
                 <a:effectLst/>
                 <a:latin typeface="Calibri" panose="020F0502020204030204" pitchFamily="34" charset="0"/>
                 <a:cs typeface="Calibri" panose="020F0502020204030204" pitchFamily="34" charset="0"/>
               </a:rPr>
-              <a:t>target metric,</a:t>
-            </a:r>
-            <a:endParaRPr lang="en-US" sz="1800" dirty="0">
+              <a:t>Business objectives &amp; target metric</a:t>
+            </a:r>
+            <a:endParaRPr lang="en-US" sz="2800" dirty="0">
               <a:effectLst/>
               <a:cs typeface="Calibri" panose="020F0502020204030204" pitchFamily="34" charset="0"/>
             </a:endParaRPr>
           </a:p>
           <a:p>
-            <a:pPr algn="l" rtl="0" fontAlgn="ctr">
+            <a:pPr marL="514350" indent="-514350" algn="l" rtl="0" fontAlgn="ctr">
+              <a:lnSpc>
+                <a:spcPct val="160000"/>
+              </a:lnSpc>
               <a:spcBef>
                 <a:spcPts val="0"/>
               </a:spcBef>
+              <a:buFont typeface="+mj-lt"/>
+              <a:buAutoNum type="arabicPeriod"/>
             </a:pPr>
             <a:r>
-              <a:rPr lang="en-US" sz="1800" dirty="0">
+              <a:rPr lang="en-US" sz="2800" dirty="0">
                 <a:effectLst/>
                 <a:latin typeface="Calibri" panose="020F0502020204030204" pitchFamily="34" charset="0"/>
                 <a:cs typeface="Calibri" panose="020F0502020204030204" pitchFamily="34" charset="0"/>
               </a:rPr>
-              <a:t>theory behind the step </a:t>
-            </a:r>
-            <a:r>
-              <a:rPr lang="en-US" sz="1800" dirty="0" err="1">
-                <a:effectLst/>
-                <a:latin typeface="Calibri" panose="020F0502020204030204" pitchFamily="34" charset="0"/>
-                <a:cs typeface="Calibri" panose="020F0502020204030204" pitchFamily="34" charset="0"/>
-              </a:rPr>
-              <a:t>FreaAI</a:t>
-            </a:r>
-            <a:r>
-              <a:rPr lang="en-US" sz="1800" dirty="0">
-                <a:effectLst/>
-                <a:latin typeface="Calibri" panose="020F0502020204030204" pitchFamily="34" charset="0"/>
-                <a:cs typeface="Calibri" panose="020F0502020204030204" pitchFamily="34" charset="0"/>
-              </a:rPr>
-              <a:t>,</a:t>
-            </a:r>
-            <a:endParaRPr lang="en-US" sz="1800" dirty="0">
+              <a:t>FreaAI - the theory behind the step</a:t>
+            </a:r>
+            <a:endParaRPr lang="en-US" sz="2800" dirty="0">
               <a:effectLst/>
               <a:cs typeface="Calibri" panose="020F0502020204030204" pitchFamily="34" charset="0"/>
             </a:endParaRPr>
           </a:p>
           <a:p>
-            <a:pPr algn="l" rtl="0" fontAlgn="ctr">
+            <a:pPr marL="514350" indent="-514350" algn="l" rtl="0" fontAlgn="ctr">
+              <a:lnSpc>
+                <a:spcPct val="160000"/>
+              </a:lnSpc>
               <a:spcBef>
                 <a:spcPts val="0"/>
               </a:spcBef>
               <a:spcAft>
                 <a:spcPts val="0"/>
               </a:spcAft>
-              <a:buFont typeface="Arial" panose="020B0604020202020204" pitchFamily="34" charset="0"/>
-              <a:buChar char="•"/>
+              <a:buFont typeface="+mj-lt"/>
+              <a:buAutoNum type="arabicPeriod"/>
             </a:pPr>
             <a:r>
-              <a:rPr lang="en-US" sz="1800" dirty="0">
+              <a:rPr lang="en-US" sz="2800" dirty="0">
                 <a:effectLst/>
                 <a:latin typeface="Calibri" panose="020F0502020204030204" pitchFamily="34" charset="0"/>
                 <a:cs typeface="Calibri" panose="020F0502020204030204" pitchFamily="34" charset="0"/>
               </a:rPr>
-              <a:t>Architecture – </a:t>
-            </a:r>
-            <a:r>
-              <a:rPr lang="en-US" sz="1800" dirty="0" err="1">
+              <a:t>Architecture</a:t>
+            </a:r>
+            <a:endParaRPr lang="en-US" sz="2800" dirty="0">
+              <a:effectLst/>
+              <a:cs typeface="Calibri" panose="020F0502020204030204" pitchFamily="34" charset="0"/>
+            </a:endParaRPr>
+          </a:p>
+          <a:p>
+            <a:pPr marL="514350" indent="-514350" algn="l" rtl="0" fontAlgn="ctr">
+              <a:lnSpc>
+                <a:spcPct val="160000"/>
+              </a:lnSpc>
+              <a:spcBef>
+                <a:spcPts val="0"/>
+              </a:spcBef>
+              <a:buFont typeface="+mj-lt"/>
+              <a:buAutoNum type="arabicPeriod"/>
+            </a:pPr>
+            <a:r>
+              <a:rPr lang="en-US" sz="2800" dirty="0">
                 <a:effectLst/>
                 <a:latin typeface="Calibri" panose="020F0502020204030204" pitchFamily="34" charset="0"/>
                 <a:cs typeface="Calibri" panose="020F0502020204030204" pitchFamily="34" charset="0"/>
               </a:rPr>
-              <a:t>MLFlow</a:t>
-            </a:r>
-            <a:r>
-              <a:rPr lang="en-US" sz="1800" dirty="0">
-                <a:effectLst/>
-                <a:latin typeface="Calibri" panose="020F0502020204030204" pitchFamily="34" charset="0"/>
-                <a:cs typeface="Calibri" panose="020F0502020204030204" pitchFamily="34" charset="0"/>
-              </a:rPr>
-              <a:t> ++ the flow,</a:t>
-            </a:r>
-            <a:endParaRPr lang="en-US" sz="1800" dirty="0">
+              <a:t>Demo</a:t>
+            </a:r>
+            <a:endParaRPr lang="en-US" sz="2800" dirty="0">
               <a:effectLst/>
               <a:cs typeface="Calibri" panose="020F0502020204030204" pitchFamily="34" charset="0"/>
             </a:endParaRPr>
           </a:p>
           <a:p>
-            <a:pPr algn="l" rtl="0" fontAlgn="ctr">
+            <a:pPr marL="514350" indent="-514350" algn="l" rtl="0" fontAlgn="ctr">
+              <a:lnSpc>
+                <a:spcPct val="160000"/>
+              </a:lnSpc>
               <a:spcBef>
                 <a:spcPts val="0"/>
               </a:spcBef>
               <a:spcAft>
                 <a:spcPts val="0"/>
               </a:spcAft>
-              <a:buFont typeface="Arial" panose="020B0604020202020204" pitchFamily="34" charset="0"/>
-              <a:buChar char="•"/>
+              <a:buFont typeface="+mj-lt"/>
+              <a:buAutoNum type="arabicPeriod"/>
             </a:pPr>
             <a:r>
-              <a:rPr lang="en-US" sz="1800" dirty="0">
+              <a:rPr lang="en-US" sz="2800" dirty="0">
                 <a:effectLst/>
                 <a:latin typeface="Calibri" panose="020F0502020204030204" pitchFamily="34" charset="0"/>
                 <a:cs typeface="Calibri" panose="020F0502020204030204" pitchFamily="34" charset="0"/>
               </a:rPr>
-              <a:t>comparison of both datasets with the baseline models,</a:t>
-            </a:r>
-            <a:endParaRPr lang="en-US" sz="1800" dirty="0">
+              <a:t>The report</a:t>
+            </a:r>
+            <a:endParaRPr lang="en-US" sz="2800" dirty="0">
               <a:effectLst/>
               <a:cs typeface="Calibri" panose="020F0502020204030204" pitchFamily="34" charset="0"/>
             </a:endParaRPr>
           </a:p>
           <a:p>
-            <a:pPr algn="l" rtl="0" fontAlgn="ctr">
+            <a:pPr marL="514350" indent="-514350" algn="l" rtl="0" fontAlgn="ctr">
+              <a:lnSpc>
+                <a:spcPct val="160000"/>
+              </a:lnSpc>
               <a:spcBef>
                 <a:spcPts val="0"/>
               </a:spcBef>
               <a:spcAft>
                 <a:spcPts val="0"/>
               </a:spcAft>
-              <a:buFont typeface="Arial" panose="020B0604020202020204" pitchFamily="34" charset="0"/>
-              <a:buChar char="•"/>
+              <a:buFont typeface="+mj-lt"/>
+              <a:buAutoNum type="arabicPeriod"/>
             </a:pPr>
             <a:r>
-              <a:rPr lang="en-US" sz="1800" dirty="0">
+              <a:rPr lang="en-US" sz="2800" dirty="0">
                 <a:effectLst/>
                 <a:latin typeface="Calibri" panose="020F0502020204030204" pitchFamily="34" charset="0"/>
                 <a:cs typeface="Calibri" panose="020F0502020204030204" pitchFamily="34" charset="0"/>
               </a:rPr>
-              <a:t>live/recorder run of automatic step,</a:t>
-            </a:r>
-            <a:endParaRPr lang="en-US" sz="1800" dirty="0">
-              <a:effectLst/>
-              <a:cs typeface="Calibri" panose="020F0502020204030204" pitchFamily="34" charset="0"/>
-            </a:endParaRPr>
-          </a:p>
-          <a:p>
-            <a:pPr algn="l" rtl="0" fontAlgn="ctr">
-              <a:spcBef>
-                <a:spcPts val="0"/>
-              </a:spcBef>
-              <a:spcAft>
-                <a:spcPts val="0"/>
-              </a:spcAft>
-              <a:buFont typeface="Arial" panose="020B0604020202020204" pitchFamily="34" charset="0"/>
-              <a:buChar char="•"/>
-            </a:pPr>
-            <a:r>
-              <a:rPr lang="en-US" sz="1800" dirty="0">
-                <a:effectLst/>
-                <a:latin typeface="Calibri" panose="020F0502020204030204" pitchFamily="34" charset="0"/>
-                <a:cs typeface="Calibri" panose="020F0502020204030204" pitchFamily="34" charset="0"/>
-              </a:rPr>
-              <a:t>suggested future steps for further improvement based on the current results.</a:t>
-            </a:r>
-          </a:p>
-          <a:p>
-            <a:pPr lvl="1" algn="l" rtl="0" fontAlgn="ctr">
-              <a:spcBef>
-                <a:spcPts val="0"/>
-              </a:spcBef>
-            </a:pPr>
-            <a:r>
-              <a:rPr lang="en-US" sz="1600" dirty="0">
-                <a:latin typeface="Calibri" panose="020F0502020204030204" pitchFamily="34" charset="0"/>
-                <a:cs typeface="Calibri" panose="020F0502020204030204" pitchFamily="34" charset="0"/>
-              </a:rPr>
-              <a:t>Phase 2: </a:t>
-            </a:r>
-            <a:r>
-              <a:rPr lang="en-US" sz="1600" dirty="0" err="1">
-                <a:latin typeface="Calibri" panose="020F0502020204030204" pitchFamily="34" charset="0"/>
-                <a:cs typeface="Calibri" panose="020F0502020204030204" pitchFamily="34" charset="0"/>
-              </a:rPr>
-              <a:t>generain</a:t>
-            </a:r>
-            <a:r>
-              <a:rPr lang="en-US" sz="1600" dirty="0">
-                <a:latin typeface="Calibri" panose="020F0502020204030204" pitchFamily="34" charset="0"/>
-                <a:cs typeface="Calibri" panose="020F0502020204030204" pitchFamily="34" charset="0"/>
-              </a:rPr>
-              <a:t> more samples for </a:t>
-            </a:r>
-            <a:r>
-              <a:rPr lang="en-US" sz="1600">
-                <a:latin typeface="Calibri" panose="020F0502020204030204" pitchFamily="34" charset="0"/>
-                <a:cs typeface="Calibri" panose="020F0502020204030204" pitchFamily="34" charset="0"/>
-              </a:rPr>
-              <a:t>underperforming slices - simulating</a:t>
-            </a:r>
-            <a:endParaRPr lang="en-US" sz="1600" dirty="0">
-              <a:effectLst/>
-              <a:cs typeface="Calibri" panose="020F0502020204030204" pitchFamily="34" charset="0"/>
-            </a:endParaRPr>
-          </a:p>
-          <a:p>
-            <a:pPr algn="l" rtl="0"/>
-            <a:endParaRPr lang="he-IL" dirty="0"/>
+              <a:t>Suggested future steps</a:t>
+            </a:r>
           </a:p>
         </p:txBody>
       </p:sp>
@@ -7544,6 +7970,227 @@
     <p:extLst>
       <p:ext uri="{BB962C8B-B14F-4D97-AF65-F5344CB8AC3E}">
         <p14:creationId xmlns:p14="http://schemas.microsoft.com/office/powerpoint/2010/main" val="3576737281"/>
+      </p:ext>
+    </p:extLst>
+  </p:cSld>
+  <p:clrMapOvr>
+    <a:masterClrMapping/>
+  </p:clrMapOvr>
+</p:sld>
+</file>
+
+<file path=ppt/slides/slide20.xml><?xml version="1.0" encoding="utf-8"?>
+<p:sld xmlns:a="http://schemas.openxmlformats.org/drawingml/2006/main" xmlns:r="http://schemas.openxmlformats.org/officeDocument/2006/relationships" xmlns:p="http://schemas.openxmlformats.org/presentationml/2006/main">
+  <p:cSld>
+    <p:spTree>
+      <p:nvGrpSpPr>
+        <p:cNvPr id="1" name=""/>
+        <p:cNvGrpSpPr/>
+        <p:nvPr/>
+      </p:nvGrpSpPr>
+      <p:grpSpPr>
+        <a:xfrm>
+          <a:off x="0" y="0"/>
+          <a:ext cx="0" cy="0"/>
+          <a:chOff x="0" y="0"/>
+          <a:chExt cx="0" cy="0"/>
+        </a:xfrm>
+      </p:grpSpPr>
+      <p:sp>
+        <p:nvSpPr>
+          <p:cNvPr id="4" name="Title 3">
+            <a:extLst>
+              <a:ext uri="{FF2B5EF4-FFF2-40B4-BE49-F238E27FC236}">
+                <a16:creationId xmlns:a16="http://schemas.microsoft.com/office/drawing/2014/main" id="{0164B796-02E6-2CF2-AD58-6BA0FF61E8C3}"/>
+              </a:ext>
+            </a:extLst>
+          </p:cNvPr>
+          <p:cNvSpPr>
+            <a:spLocks noGrp="1"/>
+          </p:cNvSpPr>
+          <p:nvPr>
+            <p:ph type="title"/>
+          </p:nvPr>
+        </p:nvSpPr>
+        <p:spPr/>
+        <p:txBody>
+          <a:bodyPr/>
+          <a:lstStyle/>
+          <a:p>
+            <a:pPr rtl="0"/>
+            <a:r>
+              <a:rPr lang="en-US" cap="all" dirty="0"/>
+              <a:t>SUGGESTED Phase 2</a:t>
+            </a:r>
+            <a:endParaRPr lang="he-IL" cap="all" dirty="0"/>
+          </a:p>
+        </p:txBody>
+      </p:sp>
+      <p:sp>
+        <p:nvSpPr>
+          <p:cNvPr id="5" name="Text Placeholder 4">
+            <a:extLst>
+              <a:ext uri="{FF2B5EF4-FFF2-40B4-BE49-F238E27FC236}">
+                <a16:creationId xmlns:a16="http://schemas.microsoft.com/office/drawing/2014/main" id="{49087E06-C5E1-41C3-1F28-1C6A2EEE3E22}"/>
+              </a:ext>
+            </a:extLst>
+          </p:cNvPr>
+          <p:cNvSpPr>
+            <a:spLocks noGrp="1"/>
+          </p:cNvSpPr>
+          <p:nvPr>
+            <p:ph type="body" idx="1"/>
+          </p:nvPr>
+        </p:nvSpPr>
+        <p:spPr/>
+        <p:txBody>
+          <a:bodyPr/>
+          <a:lstStyle/>
+          <a:p>
+            <a:pPr rtl="0"/>
+            <a:endParaRPr lang="he-IL" dirty="0"/>
+          </a:p>
+        </p:txBody>
+      </p:sp>
+    </p:spTree>
+    <p:extLst>
+      <p:ext uri="{BB962C8B-B14F-4D97-AF65-F5344CB8AC3E}">
+        <p14:creationId xmlns:p14="http://schemas.microsoft.com/office/powerpoint/2010/main" val="1172642734"/>
+      </p:ext>
+    </p:extLst>
+  </p:cSld>
+  <p:clrMapOvr>
+    <a:masterClrMapping/>
+  </p:clrMapOvr>
+</p:sld>
+</file>
+
+<file path=ppt/slides/slide21.xml><?xml version="1.0" encoding="utf-8"?>
+<p:sld xmlns:a="http://schemas.openxmlformats.org/drawingml/2006/main" xmlns:r="http://schemas.openxmlformats.org/officeDocument/2006/relationships" xmlns:p="http://schemas.openxmlformats.org/presentationml/2006/main">
+  <p:cSld>
+    <p:spTree>
+      <p:nvGrpSpPr>
+        <p:cNvPr id="1" name=""/>
+        <p:cNvGrpSpPr/>
+        <p:nvPr/>
+      </p:nvGrpSpPr>
+      <p:grpSpPr>
+        <a:xfrm>
+          <a:off x="0" y="0"/>
+          <a:ext cx="0" cy="0"/>
+          <a:chOff x="0" y="0"/>
+          <a:chExt cx="0" cy="0"/>
+        </a:xfrm>
+      </p:grpSpPr>
+      <p:sp>
+        <p:nvSpPr>
+          <p:cNvPr id="4" name="Title 3">
+            <a:extLst>
+              <a:ext uri="{FF2B5EF4-FFF2-40B4-BE49-F238E27FC236}">
+                <a16:creationId xmlns:a16="http://schemas.microsoft.com/office/drawing/2014/main" id="{3841DBFF-E78A-5E15-AE30-ADBCC1AA634C}"/>
+              </a:ext>
+            </a:extLst>
+          </p:cNvPr>
+          <p:cNvSpPr>
+            <a:spLocks noGrp="1"/>
+          </p:cNvSpPr>
+          <p:nvPr>
+            <p:ph type="title"/>
+          </p:nvPr>
+        </p:nvSpPr>
+        <p:spPr/>
+        <p:txBody>
+          <a:bodyPr/>
+          <a:lstStyle/>
+          <a:p>
+            <a:pPr rtl="0"/>
+            <a:r>
+              <a:rPr lang="en-US" dirty="0"/>
+              <a:t>Suggested future steps</a:t>
+            </a:r>
+            <a:endParaRPr lang="he-IL" dirty="0"/>
+          </a:p>
+        </p:txBody>
+      </p:sp>
+      <p:sp>
+        <p:nvSpPr>
+          <p:cNvPr id="5" name="Content Placeholder 4">
+            <a:extLst>
+              <a:ext uri="{FF2B5EF4-FFF2-40B4-BE49-F238E27FC236}">
+                <a16:creationId xmlns:a16="http://schemas.microsoft.com/office/drawing/2014/main" id="{63919A5D-9E9E-6F41-14A2-DB1A1BAECC5B}"/>
+              </a:ext>
+            </a:extLst>
+          </p:cNvPr>
+          <p:cNvSpPr>
+            <a:spLocks noGrp="1"/>
+          </p:cNvSpPr>
+          <p:nvPr>
+            <p:ph sz="quarter" idx="13"/>
+          </p:nvPr>
+        </p:nvSpPr>
+        <p:spPr/>
+        <p:txBody>
+          <a:bodyPr/>
+          <a:lstStyle/>
+          <a:p>
+            <a:pPr marL="0" indent="0" algn="l" rtl="0">
+              <a:buNone/>
+            </a:pPr>
+            <a:r>
+              <a:rPr lang="en-US" dirty="0"/>
+              <a:t>Improve models’ F2, addressing data slices recommended by Phase 1 report.</a:t>
+            </a:r>
+          </a:p>
+          <a:p>
+            <a:pPr marL="0" indent="0" algn="l" rtl="0">
+              <a:buNone/>
+            </a:pPr>
+            <a:r>
+              <a:rPr lang="en-US" dirty="0"/>
+              <a:t>For each data slice:</a:t>
+            </a:r>
+          </a:p>
+          <a:p>
+            <a:pPr marL="457200" indent="-457200" algn="l" rtl="0">
+              <a:buFont typeface="+mj-lt"/>
+              <a:buAutoNum type="arabicPeriod"/>
+            </a:pPr>
+            <a:r>
+              <a:rPr lang="en-US" dirty="0"/>
+              <a:t>Additionally train the model on a subset of original train set, specified by a data slice.</a:t>
+            </a:r>
+          </a:p>
+          <a:p>
+            <a:pPr marL="457200" indent="-457200" algn="l" rtl="0">
+              <a:buFont typeface="+mj-lt"/>
+              <a:buAutoNum type="arabicPeriod"/>
+            </a:pPr>
+            <a:r>
+              <a:rPr lang="en-US" dirty="0"/>
+              <a:t>For even more F2 improvement:</a:t>
+            </a:r>
+          </a:p>
+          <a:p>
+            <a:pPr marL="0" indent="0" algn="l" rtl="0">
+              <a:buNone/>
+            </a:pPr>
+            <a:r>
+              <a:rPr lang="en-US" dirty="0"/>
+              <a:t>       Augment train data by generation of additional synthetic data, specified by a data slice.</a:t>
+            </a:r>
+          </a:p>
+          <a:p>
+            <a:pPr marL="0" indent="0" algn="l" rtl="0">
+              <a:buNone/>
+            </a:pPr>
+            <a:endParaRPr lang="he-IL" dirty="0"/>
+          </a:p>
+        </p:txBody>
+      </p:sp>
+    </p:spTree>
+    <p:extLst>
+      <p:ext uri="{BB962C8B-B14F-4D97-AF65-F5344CB8AC3E}">
+        <p14:creationId xmlns:p14="http://schemas.microsoft.com/office/powerpoint/2010/main" val="4161401877"/>
       </p:ext>
     </p:extLst>
   </p:cSld>
@@ -7572,10 +8219,10 @@
       </p:grpSpPr>
       <p:sp>
         <p:nvSpPr>
-          <p:cNvPr id="2" name="Title 1">
+          <p:cNvPr id="4" name="Title 3">
             <a:extLst>
               <a:ext uri="{FF2B5EF4-FFF2-40B4-BE49-F238E27FC236}">
-                <a16:creationId xmlns:a16="http://schemas.microsoft.com/office/drawing/2014/main" id="{058B8347-6A32-E5FD-1763-9750102DD497}"/>
+                <a16:creationId xmlns:a16="http://schemas.microsoft.com/office/drawing/2014/main" id="{0164B796-02E6-2CF2-AD58-6BA0FF61E8C3}"/>
               </a:ext>
             </a:extLst>
           </p:cNvPr>
@@ -7593,19 +8240,26 @@
           <a:p>
             <a:pPr rtl="0"/>
             <a:r>
-              <a:rPr lang="en-US" dirty="0"/>
-              <a:t>Client’s business objective</a:t>
-            </a:r>
-            <a:endParaRPr lang="he-IL" dirty="0"/>
-          </a:p>
-        </p:txBody>
-      </p:sp>
-      <p:sp>
-        <p:nvSpPr>
-          <p:cNvPr id="3" name="Content Placeholder 2">
+              <a:rPr lang="en-US" cap="all" dirty="0"/>
+              <a:t>From business OBJECTIVE –</a:t>
+            </a:r>
+            <a:br>
+              <a:rPr lang="en-US" cap="all" dirty="0"/>
+            </a:br>
+            <a:r>
+              <a:rPr lang="en-US" cap="all" dirty="0"/>
+              <a:t>to TECHNICAL metric</a:t>
+            </a:r>
+            <a:endParaRPr lang="he-IL" cap="all" dirty="0"/>
+          </a:p>
+        </p:txBody>
+      </p:sp>
+      <p:sp>
+        <p:nvSpPr>
+          <p:cNvPr id="5" name="Text Placeholder 4">
             <a:extLst>
               <a:ext uri="{FF2B5EF4-FFF2-40B4-BE49-F238E27FC236}">
-                <a16:creationId xmlns:a16="http://schemas.microsoft.com/office/drawing/2014/main" id="{8721A247-8606-0AD0-8F8D-677EF8C43DDA}"/>
+                <a16:creationId xmlns:a16="http://schemas.microsoft.com/office/drawing/2014/main" id="{49087E06-C5E1-41C3-1F28-1C6A2EEE3E22}"/>
               </a:ext>
             </a:extLst>
           </p:cNvPr>
@@ -7613,69 +8267,23 @@
             <a:spLocks noGrp="1"/>
           </p:cNvSpPr>
           <p:nvPr>
-            <p:ph sz="quarter" idx="13"/>
+            <p:ph type="body" idx="1"/>
           </p:nvPr>
         </p:nvSpPr>
         <p:spPr/>
         <p:txBody>
-          <a:bodyPr>
-            <a:normAutofit/>
-          </a:bodyPr>
-          <a:lstStyle/>
-          <a:p>
-            <a:pPr marL="0" indent="0" algn="l" rtl="0">
-              <a:buNone/>
-            </a:pPr>
-            <a:r>
-              <a:rPr lang="en-US" sz="2400" dirty="0"/>
-              <a:t>Ensure uninterrupted and cost-effective water supply to consumers</a:t>
-            </a:r>
-          </a:p>
-          <a:p>
-            <a:pPr marL="0" indent="0" algn="l" rtl="0">
-              <a:buNone/>
-            </a:pPr>
-            <a:r>
-              <a:rPr lang="en-US" sz="2400" dirty="0"/>
-              <a:t>=&gt; Develop high level of sensitivity to </a:t>
-            </a:r>
-            <a:r>
-              <a:rPr lang="en-US" sz="2400" b="1" u="sng" dirty="0"/>
-              <a:t>all</a:t>
-            </a:r>
-            <a:r>
-              <a:rPr lang="en-US" sz="2400" dirty="0"/>
-              <a:t> variety of anomalies</a:t>
-            </a:r>
-          </a:p>
-          <a:p>
-            <a:pPr marL="0" indent="0" algn="l" rtl="0">
-              <a:buNone/>
-            </a:pPr>
-            <a:endParaRPr lang="en-US" sz="2400" dirty="0"/>
-          </a:p>
-          <a:p>
-            <a:pPr marL="0" indent="0" algn="l" rtl="0">
-              <a:buNone/>
-            </a:pPr>
-            <a:endParaRPr lang="en-US" sz="2400" dirty="0"/>
-          </a:p>
-          <a:p>
-            <a:pPr marL="0" indent="0" algn="l" rtl="0">
-              <a:buNone/>
-            </a:pPr>
-            <a:r>
-              <a:rPr lang="en-US" sz="2400" dirty="0"/>
-              <a:t>&lt;Add reasoning and story here&gt;</a:t>
-            </a:r>
-            <a:endParaRPr lang="he-IL" sz="2400" dirty="0"/>
+          <a:bodyPr/>
+          <a:lstStyle/>
+          <a:p>
+            <a:pPr rtl="0"/>
+            <a:endParaRPr lang="he-IL" dirty="0"/>
           </a:p>
         </p:txBody>
       </p:sp>
     </p:spTree>
     <p:extLst>
       <p:ext uri="{BB962C8B-B14F-4D97-AF65-F5344CB8AC3E}">
-        <p14:creationId xmlns:p14="http://schemas.microsoft.com/office/powerpoint/2010/main" val="106282545"/>
+        <p14:creationId xmlns:p14="http://schemas.microsoft.com/office/powerpoint/2010/main" val="3030595227"/>
       </p:ext>
     </p:extLst>
   </p:cSld>
@@ -7707,7 +8315,7 @@
           <p:cNvPr id="2" name="Title 1">
             <a:extLst>
               <a:ext uri="{FF2B5EF4-FFF2-40B4-BE49-F238E27FC236}">
-                <a16:creationId xmlns:a16="http://schemas.microsoft.com/office/drawing/2014/main" id="{AE1667FC-3734-7C4D-1E5A-67D379A349A8}"/>
+                <a16:creationId xmlns:a16="http://schemas.microsoft.com/office/drawing/2014/main" id="{058B8347-6A32-E5FD-1763-9750102DD497}"/>
               </a:ext>
             </a:extLst>
           </p:cNvPr>
@@ -7723,9 +8331,10 @@
           <a:bodyPr/>
           <a:lstStyle/>
           <a:p>
+            <a:pPr rtl="0"/>
             <a:r>
               <a:rPr lang="en-US" dirty="0"/>
-              <a:t>The phase of the project</a:t>
+              <a:t>Client background</a:t>
             </a:r>
             <a:endParaRPr lang="he-IL" dirty="0"/>
           </a:p>
@@ -7736,7 +8345,7 @@
           <p:cNvPr id="3" name="Content Placeholder 2">
             <a:extLst>
               <a:ext uri="{FF2B5EF4-FFF2-40B4-BE49-F238E27FC236}">
-                <a16:creationId xmlns:a16="http://schemas.microsoft.com/office/drawing/2014/main" id="{785BC5C6-4076-19BE-A933-C1043D0D544A}"/>
+                <a16:creationId xmlns:a16="http://schemas.microsoft.com/office/drawing/2014/main" id="{8721A247-8606-0AD0-8F8D-677EF8C43DDA}"/>
               </a:ext>
             </a:extLst>
           </p:cNvPr>
@@ -7749,26 +8358,127 @@
         </p:nvSpPr>
         <p:spPr/>
         <p:txBody>
-          <a:bodyPr/>
-          <a:lstStyle/>
-          <a:p>
-            <a:pPr algn="l" rtl="0"/>
-            <a:r>
-              <a:rPr lang="en-US" dirty="0"/>
-              <a:t>&lt;Model analysis&gt; and </a:t>
-            </a:r>
-            <a:r>
-              <a:rPr lang="en-US" dirty="0" err="1"/>
-              <a:t>insignts</a:t>
-            </a:r>
-            <a:endParaRPr lang="he-IL" dirty="0"/>
+          <a:bodyPr>
+            <a:normAutofit lnSpcReduction="10000"/>
+          </a:bodyPr>
+          <a:lstStyle/>
+          <a:p>
+            <a:pPr algn="l" rtl="0">
+              <a:lnSpc>
+                <a:spcPct val="150000"/>
+              </a:lnSpc>
+              <a:buBlip>
+                <a:blip r:embed="rId2">
+                  <a:extLst>
+                    <a:ext uri="{96DAC541-7B7A-43D3-8B79-37D633B846F1}">
+                      <asvg:svgBlip xmlns:asvg="http://schemas.microsoft.com/office/drawing/2016/SVG/main" r:embed="rId3"/>
+                    </a:ext>
+                  </a:extLst>
+                </a:blip>
+              </a:buBlip>
+            </a:pPr>
+            <a:r>
+              <a:rPr lang="en-US" sz="2400" dirty="0"/>
+              <a:t>Client: A water utility company</a:t>
+            </a:r>
+          </a:p>
+          <a:p>
+            <a:pPr algn="l" rtl="0">
+              <a:lnSpc>
+                <a:spcPct val="150000"/>
+              </a:lnSpc>
+              <a:buBlip>
+                <a:blip r:embed="rId2">
+                  <a:extLst>
+                    <a:ext uri="{96DAC541-7B7A-43D3-8B79-37D633B846F1}">
+                      <asvg:svgBlip xmlns:asvg="http://schemas.microsoft.com/office/drawing/2016/SVG/main" r:embed="rId3"/>
+                    </a:ext>
+                  </a:extLst>
+                </a:blip>
+              </a:buBlip>
+            </a:pPr>
+            <a:r>
+              <a:rPr lang="en-US" sz="2400" dirty="0"/>
+              <a:t>Business purpose: ensure uninterrupted supply of clean water to consumers</a:t>
+            </a:r>
+          </a:p>
+          <a:p>
+            <a:pPr algn="l" rtl="0">
+              <a:lnSpc>
+                <a:spcPct val="150000"/>
+              </a:lnSpc>
+              <a:buBlip>
+                <a:blip r:embed="rId2">
+                  <a:extLst>
+                    <a:ext uri="{96DAC541-7B7A-43D3-8B79-37D633B846F1}">
+                      <asvg:svgBlip xmlns:asvg="http://schemas.microsoft.com/office/drawing/2016/SVG/main" r:embed="rId3"/>
+                    </a:ext>
+                  </a:extLst>
+                </a:blip>
+              </a:buBlip>
+            </a:pPr>
+            <a:r>
+              <a:rPr lang="en-US" sz="2400" dirty="0"/>
+              <a:t>Major costs:</a:t>
+            </a:r>
+          </a:p>
+          <a:p>
+            <a:pPr lvl="1" algn="l" rtl="0">
+              <a:buBlip>
+                <a:blip r:embed="rId2">
+                  <a:extLst>
+                    <a:ext uri="{96DAC541-7B7A-43D3-8B79-37D633B846F1}">
+                      <asvg:svgBlip xmlns:asvg="http://schemas.microsoft.com/office/drawing/2016/SVG/main" r:embed="rId3"/>
+                    </a:ext>
+                  </a:extLst>
+                </a:blip>
+              </a:buBlip>
+            </a:pPr>
+            <a:r>
+              <a:rPr lang="en-US" sz="2200" dirty="0"/>
+              <a:t>developing and maintaining infrastructure of water pipes network</a:t>
+            </a:r>
+          </a:p>
+          <a:p>
+            <a:pPr lvl="1" algn="l" rtl="0">
+              <a:buBlip>
+                <a:blip r:embed="rId2">
+                  <a:extLst>
+                    <a:ext uri="{96DAC541-7B7A-43D3-8B79-37D633B846F1}">
+                      <asvg:svgBlip xmlns:asvg="http://schemas.microsoft.com/office/drawing/2016/SVG/main" r:embed="rId3"/>
+                    </a:ext>
+                  </a:extLst>
+                </a:blip>
+              </a:buBlip>
+            </a:pPr>
+            <a:r>
+              <a:rPr lang="en-US" sz="2200" dirty="0"/>
+              <a:t>fixing of infrastructure failures and repair of associated damage</a:t>
+            </a:r>
+          </a:p>
+          <a:p>
+            <a:pPr algn="l" rtl="0">
+              <a:buBlip>
+                <a:blip r:embed="rId2">
+                  <a:extLst>
+                    <a:ext uri="{96DAC541-7B7A-43D3-8B79-37D633B846F1}">
+                      <asvg:svgBlip xmlns:asvg="http://schemas.microsoft.com/office/drawing/2016/SVG/main" r:embed="rId3"/>
+                    </a:ext>
+                  </a:extLst>
+                </a:blip>
+              </a:buBlip>
+            </a:pPr>
+            <a:r>
+              <a:rPr lang="en-US" sz="2400" dirty="0"/>
+              <a:t>Preventive measures and servicing false alarms are considerably less expensive</a:t>
+            </a:r>
           </a:p>
         </p:txBody>
       </p:sp>
     </p:spTree>
     <p:extLst>
       <p:ext uri="{BB962C8B-B14F-4D97-AF65-F5344CB8AC3E}">
-        <p14:creationId xmlns:p14="http://schemas.microsoft.com/office/powerpoint/2010/main" val="3485616824"/>
+        <p14:creationId xmlns:p14="http://schemas.microsoft.com/office/powerpoint/2010/main" val="2507757791"/>
       </p:ext>
     </p:extLst>
   </p:cSld>
@@ -7800,7 +8510,7 @@
           <p:cNvPr id="2" name="Title 1">
             <a:extLst>
               <a:ext uri="{FF2B5EF4-FFF2-40B4-BE49-F238E27FC236}">
-                <a16:creationId xmlns:a16="http://schemas.microsoft.com/office/drawing/2014/main" id="{B25312DF-F229-EF9F-D7F0-A6C57FCC9B97}"/>
+                <a16:creationId xmlns:a16="http://schemas.microsoft.com/office/drawing/2014/main" id="{058B8347-6A32-E5FD-1763-9750102DD497}"/>
               </a:ext>
             </a:extLst>
           </p:cNvPr>
@@ -7816,9 +8526,10 @@
           <a:bodyPr/>
           <a:lstStyle/>
           <a:p>
+            <a:pPr rtl="0"/>
             <a:r>
               <a:rPr lang="en-US" dirty="0"/>
-              <a:t>Target technical metrics</a:t>
+              <a:t>Client’s challenge</a:t>
             </a:r>
             <a:endParaRPr lang="he-IL" dirty="0"/>
           </a:p>
@@ -7829,7 +8540,7 @@
           <p:cNvPr id="3" name="Content Placeholder 2">
             <a:extLst>
               <a:ext uri="{FF2B5EF4-FFF2-40B4-BE49-F238E27FC236}">
-                <a16:creationId xmlns:a16="http://schemas.microsoft.com/office/drawing/2014/main" id="{AE1648DB-5759-AF17-B6A3-738D1BC34328}"/>
+                <a16:creationId xmlns:a16="http://schemas.microsoft.com/office/drawing/2014/main" id="{8721A247-8606-0AD0-8F8D-677EF8C43DDA}"/>
               </a:ext>
             </a:extLst>
           </p:cNvPr>
@@ -7842,48 +8553,91 @@
         </p:nvSpPr>
         <p:spPr/>
         <p:txBody>
-          <a:bodyPr/>
+          <a:bodyPr>
+            <a:normAutofit/>
+          </a:bodyPr>
           <a:lstStyle/>
           <a:p>
             <a:pPr marL="457200" indent="-457200" algn="l" rtl="0">
+              <a:lnSpc>
+                <a:spcPct val="150000"/>
+              </a:lnSpc>
               <a:buFont typeface="+mj-lt"/>
               <a:buAutoNum type="arabicPeriod"/>
             </a:pPr>
             <a:r>
-              <a:rPr lang="en-US" dirty="0"/>
-              <a:t>True Positive Rate (</a:t>
-            </a:r>
-            <a:r>
-              <a:rPr lang="en-US" dirty="0" err="1"/>
-              <a:t>sensivity</a:t>
-            </a:r>
-            <a:r>
-              <a:rPr lang="en-US" dirty="0"/>
-              <a:t>)</a:t>
+              <a:rPr lang="en-US" sz="2400" dirty="0"/>
+              <a:t>Prevent failures as much as possible =&gt;</a:t>
+            </a:r>
+          </a:p>
+          <a:p>
+            <a:pPr lvl="1" algn="l" rtl="0">
+              <a:lnSpc>
+                <a:spcPct val="150000"/>
+              </a:lnSpc>
+              <a:buBlip>
+                <a:blip r:embed="rId2">
+                  <a:extLst>
+                    <a:ext uri="{96DAC541-7B7A-43D3-8B79-37D633B846F1}">
+                      <asvg:svgBlip xmlns:asvg="http://schemas.microsoft.com/office/drawing/2016/SVG/main" r:embed="rId3"/>
+                    </a:ext>
+                  </a:extLst>
+                </a:blip>
+              </a:buBlip>
+            </a:pPr>
+            <a:r>
+              <a:rPr lang="en-US" sz="2200" dirty="0"/>
+              <a:t>Proactively detect as much anomalies as possible</a:t>
+            </a:r>
+          </a:p>
+          <a:p>
+            <a:pPr lvl="1" algn="l" rtl="0">
+              <a:lnSpc>
+                <a:spcPct val="150000"/>
+              </a:lnSpc>
+              <a:buBlip>
+                <a:blip r:embed="rId2">
+                  <a:extLst>
+                    <a:ext uri="{96DAC541-7B7A-43D3-8B79-37D633B846F1}">
+                      <asvg:svgBlip xmlns:asvg="http://schemas.microsoft.com/office/drawing/2016/SVG/main" r:embed="rId3"/>
+                    </a:ext>
+                  </a:extLst>
+                </a:blip>
+              </a:buBlip>
+            </a:pPr>
+            <a:r>
+              <a:rPr lang="en-US" sz="2200" dirty="0"/>
+              <a:t>&lt;prioritize&gt; Missed anomalies costs more than false anomalies</a:t>
             </a:r>
           </a:p>
           <a:p>
             <a:pPr marL="457200" indent="-457200" algn="l" rtl="0">
+              <a:lnSpc>
+                <a:spcPct val="150000"/>
+              </a:lnSpc>
               <a:buFont typeface="+mj-lt"/>
               <a:buAutoNum type="arabicPeriod"/>
             </a:pPr>
             <a:r>
-              <a:rPr lang="en-US" dirty="0"/>
-              <a:t>“Grade-2 metric ?</a:t>
-            </a:r>
-          </a:p>
-          <a:p>
-            <a:pPr marL="0" indent="0" algn="l" rtl="0">
+              <a:rPr lang="en-US" sz="2400" dirty="0"/>
+              <a:t>Ensure balanced ability to detect to anomalies in all variety of situations</a:t>
+            </a:r>
+          </a:p>
+          <a:p>
+            <a:pPr marL="457200" lvl="1" indent="0" algn="l" rtl="0">
+              <a:lnSpc>
+                <a:spcPct val="150000"/>
+              </a:lnSpc>
               <a:buNone/>
             </a:pPr>
-            <a:endParaRPr lang="he-IL" dirty="0"/>
+            <a:endParaRPr lang="en-US" sz="2200" dirty="0"/>
           </a:p>
         </p:txBody>
       </p:sp>
     </p:spTree>
     <p:extLst>
       <p:ext uri="{BB962C8B-B14F-4D97-AF65-F5344CB8AC3E}">
-        <p14:creationId xmlns:p14="http://schemas.microsoft.com/office/powerpoint/2010/main" val="1647464561"/>
+        <p14:creationId xmlns:p14="http://schemas.microsoft.com/office/powerpoint/2010/main" val="106282545"/>
       </p:ext>
     </p:extLst>
   </p:cSld>
@@ -7912,10 +8666,10 @@
       </p:grpSpPr>
       <p:sp>
         <p:nvSpPr>
-          <p:cNvPr id="4" name="Title 3">
+          <p:cNvPr id="2" name="Title 1">
             <a:extLst>
               <a:ext uri="{FF2B5EF4-FFF2-40B4-BE49-F238E27FC236}">
-                <a16:creationId xmlns:a16="http://schemas.microsoft.com/office/drawing/2014/main" id="{0164B796-02E6-2CF2-AD58-6BA0FF61E8C3}"/>
+                <a16:creationId xmlns:a16="http://schemas.microsoft.com/office/drawing/2014/main" id="{AE1667FC-3734-7C4D-1E5A-67D379A349A8}"/>
               </a:ext>
             </a:extLst>
           </p:cNvPr>
@@ -7934,11 +8688,7 @@
             <a:pPr rtl="0"/>
             <a:r>
               <a:rPr lang="en-US" dirty="0"/>
-              <a:t>IBM </a:t>
-            </a:r>
-            <a:r>
-              <a:rPr lang="en-US" dirty="0" err="1"/>
-              <a:t>FreaAI</a:t>
+              <a:t>Phase 1 of the project</a:t>
             </a:r>
             <a:endParaRPr lang="he-IL" dirty="0"/>
           </a:p>
@@ -7946,10 +8696,10 @@
       </p:sp>
       <p:sp>
         <p:nvSpPr>
-          <p:cNvPr id="5" name="Text Placeholder 4">
+          <p:cNvPr id="3" name="Content Placeholder 2">
             <a:extLst>
               <a:ext uri="{FF2B5EF4-FFF2-40B4-BE49-F238E27FC236}">
-                <a16:creationId xmlns:a16="http://schemas.microsoft.com/office/drawing/2014/main" id="{49087E06-C5E1-41C3-1F28-1C6A2EEE3E22}"/>
+                <a16:creationId xmlns:a16="http://schemas.microsoft.com/office/drawing/2014/main" id="{785BC5C6-4076-19BE-A933-C1043D0D544A}"/>
               </a:ext>
             </a:extLst>
           </p:cNvPr>
@@ -7957,7 +8707,7 @@
             <a:spLocks noGrp="1"/>
           </p:cNvSpPr>
           <p:nvPr>
-            <p:ph type="body" idx="1"/>
+            <p:ph sz="quarter" idx="13"/>
           </p:nvPr>
         </p:nvSpPr>
         <p:spPr/>
@@ -7965,11 +8715,45 @@
           <a:bodyPr/>
           <a:lstStyle/>
           <a:p>
-            <a:pPr rtl="0"/>
+            <a:pPr marL="0" indent="0" algn="l" rtl="0">
+              <a:buNone/>
+            </a:pPr>
             <a:r>
               <a:rPr lang="en-US" dirty="0"/>
-              <a:t>“Automated extraction of data slices to test machine learning models”</a:t>
-            </a:r>
+              <a:t>Technical goals:</a:t>
+            </a:r>
+          </a:p>
+          <a:p>
+            <a:pPr algn="l" rtl="0"/>
+            <a:r>
+              <a:rPr lang="en-US" dirty="0"/>
+              <a:t>Discover F2 over variety of data slices</a:t>
+            </a:r>
+          </a:p>
+          <a:p>
+            <a:pPr algn="l" rtl="0"/>
+            <a:r>
+              <a:rPr lang="en-US" dirty="0"/>
+              <a:t>Detect data slices in which discovered F2 is worse</a:t>
+            </a:r>
+          </a:p>
+          <a:p>
+            <a:pPr algn="l" rtl="0"/>
+            <a:r>
+              <a:rPr lang="en-US" dirty="0"/>
+              <a:t>Provide values of possible improvement of F2</a:t>
+            </a:r>
+          </a:p>
+          <a:p>
+            <a:pPr algn="l" rtl="0"/>
+            <a:endParaRPr lang="en-US" dirty="0"/>
+          </a:p>
+          <a:p>
+            <a:pPr algn="l" rtl="0"/>
+            <a:endParaRPr lang="en-US" dirty="0"/>
+          </a:p>
+          <a:p>
+            <a:pPr algn="l" rtl="0"/>
             <a:endParaRPr lang="he-IL" dirty="0"/>
           </a:p>
         </p:txBody>
@@ -7977,7 +8761,7 @@
     </p:spTree>
     <p:extLst>
       <p:ext uri="{BB962C8B-B14F-4D97-AF65-F5344CB8AC3E}">
-        <p14:creationId xmlns:p14="http://schemas.microsoft.com/office/powerpoint/2010/main" val="2358774201"/>
+        <p14:creationId xmlns:p14="http://schemas.microsoft.com/office/powerpoint/2010/main" val="3485616824"/>
       </p:ext>
     </p:extLst>
   </p:cSld>
@@ -8006,10 +8790,10 @@
       </p:grpSpPr>
       <p:sp>
         <p:nvSpPr>
-          <p:cNvPr id="4" name="Title 3">
+          <p:cNvPr id="2" name="Title 1">
             <a:extLst>
               <a:ext uri="{FF2B5EF4-FFF2-40B4-BE49-F238E27FC236}">
-                <a16:creationId xmlns:a16="http://schemas.microsoft.com/office/drawing/2014/main" id="{307389B7-3B50-5AF5-789C-04E529B65851}"/>
+                <a16:creationId xmlns:a16="http://schemas.microsoft.com/office/drawing/2014/main" id="{B25312DF-F229-EF9F-D7F0-A6C57FCC9B97}"/>
               </a:ext>
             </a:extLst>
           </p:cNvPr>
@@ -8027,7 +8811,7 @@
           <a:p>
             <a:r>
               <a:rPr lang="en-US" dirty="0"/>
-              <a:t>Method’s purpose</a:t>
+              <a:t>Target technical metrics</a:t>
             </a:r>
             <a:endParaRPr lang="he-IL" dirty="0"/>
           </a:p>
@@ -8035,10 +8819,10 @@
       </p:sp>
       <p:sp>
         <p:nvSpPr>
-          <p:cNvPr id="5" name="Content Placeholder 4">
+          <p:cNvPr id="3" name="Content Placeholder 2">
             <a:extLst>
               <a:ext uri="{FF2B5EF4-FFF2-40B4-BE49-F238E27FC236}">
-                <a16:creationId xmlns:a16="http://schemas.microsoft.com/office/drawing/2014/main" id="{4014B7C8-595F-3C26-415A-30842CDAF552}"/>
+                <a16:creationId xmlns:a16="http://schemas.microsoft.com/office/drawing/2014/main" id="{AE1648DB-5759-AF17-B6A3-738D1BC34328}"/>
               </a:ext>
             </a:extLst>
           </p:cNvPr>
@@ -8054,18 +8838,84 @@
           <a:bodyPr/>
           <a:lstStyle/>
           <a:p>
-            <a:pPr algn="l" rtl="0"/>
+            <a:pPr marL="457200" indent="-457200" algn="l" rtl="0">
+              <a:buFont typeface="+mj-lt"/>
+              <a:buAutoNum type="arabicPeriod"/>
+            </a:pPr>
             <a:r>
               <a:rPr lang="en-US" dirty="0"/>
-              <a:t>Identify data slices with low accuracy</a:t>
-            </a:r>
-          </a:p>
-          <a:p>
-            <a:pPr algn="l" rtl="0"/>
+              <a:t>F2 &lt;add formula&gt;</a:t>
+            </a:r>
+          </a:p>
+          <a:p>
+            <a:pPr lvl="1" algn="l" rtl="0">
+              <a:buFont typeface="Courier New" panose="02070309020205020404" pitchFamily="49" charset="0"/>
+              <a:buChar char="o"/>
+            </a:pPr>
             <a:r>
               <a:rPr lang="en-US" dirty="0"/>
-              <a:t>Not talking about how to improve them</a:t>
-            </a:r>
+              <a:t>weighted mean of precision and recall</a:t>
+            </a:r>
+          </a:p>
+          <a:p>
+            <a:pPr lvl="1" algn="l" rtl="0">
+              <a:buFont typeface="Courier New" panose="02070309020205020404" pitchFamily="49" charset="0"/>
+              <a:buChar char="o"/>
+            </a:pPr>
+            <a:r>
+              <a:rPr lang="en-US" dirty="0"/>
+              <a:t>giving more weight to recall than to precision</a:t>
+            </a:r>
+          </a:p>
+          <a:p>
+            <a:pPr marL="457200" indent="-457200" algn="l" rtl="0">
+              <a:buFont typeface="+mj-lt"/>
+              <a:buAutoNum type="arabicPeriod"/>
+            </a:pPr>
+            <a:r>
+              <a:rPr lang="en-US" dirty="0"/>
+              <a:t>Possible F2 improvement</a:t>
+            </a:r>
+          </a:p>
+          <a:p>
+            <a:pPr lvl="1" algn="l" rtl="0">
+              <a:buFont typeface="Courier New" panose="02070309020205020404" pitchFamily="49" charset="0"/>
+              <a:buChar char="o"/>
+            </a:pPr>
+            <a:r>
+              <a:rPr lang="en-US" dirty="0"/>
+              <a:t>focus on data slices which improvement with maximize overall F2 improvement</a:t>
+            </a:r>
+          </a:p>
+          <a:p>
+            <a:pPr lvl="1" algn="l" rtl="0">
+              <a:buFont typeface="Courier New" panose="02070309020205020404" pitchFamily="49" charset="0"/>
+              <a:buChar char="o"/>
+            </a:pPr>
+            <a:r>
+              <a:rPr lang="en-US" dirty="0"/>
+              <a:t>&lt;formula&gt;</a:t>
+            </a:r>
+          </a:p>
+          <a:p>
+            <a:pPr marL="457200" lvl="1" indent="0" algn="l" rtl="0">
+              <a:buNone/>
+            </a:pPr>
+            <a:r>
+              <a:rPr lang="en-US" dirty="0"/>
+              <a:t>&lt;F2 of other slices&gt; - &lt;F2 of overall&gt;</a:t>
+            </a:r>
+          </a:p>
+          <a:p>
+            <a:pPr marL="0" indent="0" algn="l" rtl="0">
+              <a:buNone/>
+            </a:pPr>
+            <a:endParaRPr lang="en-US" dirty="0"/>
+          </a:p>
+          <a:p>
+            <a:pPr marL="0" indent="0" algn="l" rtl="0">
+              <a:buNone/>
+            </a:pPr>
             <a:endParaRPr lang="he-IL" dirty="0"/>
           </a:p>
         </p:txBody>
@@ -8073,7 +8923,7 @@
     </p:spTree>
     <p:extLst>
       <p:ext uri="{BB962C8B-B14F-4D97-AF65-F5344CB8AC3E}">
-        <p14:creationId xmlns:p14="http://schemas.microsoft.com/office/powerpoint/2010/main" val="2804087652"/>
+        <p14:creationId xmlns:p14="http://schemas.microsoft.com/office/powerpoint/2010/main" val="1647464561"/>
       </p:ext>
     </p:extLst>
   </p:cSld>
@@ -8102,10 +8952,10 @@
       </p:grpSpPr>
       <p:sp>
         <p:nvSpPr>
-          <p:cNvPr id="2" name="Title 1">
+          <p:cNvPr id="4" name="Title 3">
             <a:extLst>
               <a:ext uri="{FF2B5EF4-FFF2-40B4-BE49-F238E27FC236}">
-                <a16:creationId xmlns:a16="http://schemas.microsoft.com/office/drawing/2014/main" id="{007DBD3D-6969-0A2D-4588-65BADF920EC4}"/>
+                <a16:creationId xmlns:a16="http://schemas.microsoft.com/office/drawing/2014/main" id="{0164B796-02E6-2CF2-AD58-6BA0FF61E8C3}"/>
               </a:ext>
             </a:extLst>
           </p:cNvPr>
@@ -8121,9 +8971,10 @@
           <a:bodyPr/>
           <a:lstStyle/>
           <a:p>
+            <a:pPr rtl="0"/>
             <a:r>
               <a:rPr lang="en-US" dirty="0"/>
-              <a:t>Decision Trees as a feature analysis heuristic</a:t>
+              <a:t>IBM FreaAI</a:t>
             </a:r>
             <a:endParaRPr lang="he-IL" dirty="0"/>
           </a:p>
@@ -8131,10 +8982,10 @@
       </p:sp>
       <p:sp>
         <p:nvSpPr>
-          <p:cNvPr id="3" name="Content Placeholder 2">
+          <p:cNvPr id="5" name="Text Placeholder 4">
             <a:extLst>
               <a:ext uri="{FF2B5EF4-FFF2-40B4-BE49-F238E27FC236}">
-                <a16:creationId xmlns:a16="http://schemas.microsoft.com/office/drawing/2014/main" id="{1617FA47-36B5-06F4-62F0-E63065DCFC86}"/>
+                <a16:creationId xmlns:a16="http://schemas.microsoft.com/office/drawing/2014/main" id="{49087E06-C5E1-41C3-1F28-1C6A2EEE3E22}"/>
               </a:ext>
             </a:extLst>
           </p:cNvPr>
@@ -8142,7 +8993,7 @@
             <a:spLocks noGrp="1"/>
           </p:cNvSpPr>
           <p:nvPr>
-            <p:ph sz="quarter" idx="13"/>
+            <p:ph type="body" idx="1"/>
           </p:nvPr>
         </p:nvSpPr>
         <p:spPr/>
@@ -8150,31 +9001,10 @@
           <a:bodyPr/>
           <a:lstStyle/>
           <a:p>
-            <a:pPr algn="l" rtl="0"/>
+            <a:pPr rtl="0"/>
             <a:r>
               <a:rPr lang="en-US" dirty="0"/>
-              <a:t>X: single feature or subset of features of the original dataset</a:t>
-            </a:r>
-          </a:p>
-          <a:p>
-            <a:pPr algn="l" rtl="0"/>
-            <a:r>
-              <a:rPr lang="en-US" dirty="0"/>
-              <a:t>Y:</a:t>
-            </a:r>
-          </a:p>
-          <a:p>
-            <a:pPr lvl="1" algn="l" rtl="0"/>
-            <a:r>
-              <a:rPr lang="en-US" dirty="0"/>
-              <a:t>‘True’ = original model predicted the original output successfully</a:t>
-            </a:r>
-          </a:p>
-          <a:p>
-            <a:pPr lvl="1" algn="l" rtl="0"/>
-            <a:r>
-              <a:rPr lang="en-US" dirty="0"/>
-              <a:t>‘False’ = original model failed in its prediction</a:t>
+              <a:t>“Automated extraction of data slices to test machine learning models”</a:t>
             </a:r>
             <a:endParaRPr lang="he-IL" dirty="0"/>
           </a:p>
@@ -8183,7 +9013,7 @@
     </p:spTree>
     <p:extLst>
       <p:ext uri="{BB962C8B-B14F-4D97-AF65-F5344CB8AC3E}">
-        <p14:creationId xmlns:p14="http://schemas.microsoft.com/office/powerpoint/2010/main" val="1503145248"/>
+        <p14:creationId xmlns:p14="http://schemas.microsoft.com/office/powerpoint/2010/main" val="2358774201"/>
       </p:ext>
     </p:extLst>
   </p:cSld>
@@ -8212,10 +9042,10 @@
       </p:grpSpPr>
       <p:sp>
         <p:nvSpPr>
-          <p:cNvPr id="2" name="Title 1">
+          <p:cNvPr id="4" name="Title 3">
             <a:extLst>
               <a:ext uri="{FF2B5EF4-FFF2-40B4-BE49-F238E27FC236}">
-                <a16:creationId xmlns:a16="http://schemas.microsoft.com/office/drawing/2014/main" id="{007DBD3D-6969-0A2D-4588-65BADF920EC4}"/>
+                <a16:creationId xmlns:a16="http://schemas.microsoft.com/office/drawing/2014/main" id="{307389B7-3B50-5AF5-789C-04E529B65851}"/>
               </a:ext>
             </a:extLst>
           </p:cNvPr>
@@ -8231,18 +9061,9 @@
           <a:bodyPr/>
           <a:lstStyle/>
           <a:p>
-            <a:pPr rtl="0"/>
             <a:r>
               <a:rPr lang="en-US" dirty="0"/>
-              <a:t>Our </a:t>
-            </a:r>
-            <a:r>
-              <a:rPr lang="en-US" dirty="0" err="1"/>
-              <a:t>FreaAI</a:t>
-            </a:r>
-            <a:r>
-              <a:rPr lang="en-US" dirty="0"/>
-              <a:t> modification</a:t>
+              <a:t>Method’s purpose</a:t>
             </a:r>
             <a:endParaRPr lang="he-IL" dirty="0"/>
           </a:p>
@@ -8250,10 +9071,10 @@
       </p:sp>
       <p:sp>
         <p:nvSpPr>
-          <p:cNvPr id="3" name="Content Placeholder 2">
+          <p:cNvPr id="5" name="Content Placeholder 4">
             <a:extLst>
               <a:ext uri="{FF2B5EF4-FFF2-40B4-BE49-F238E27FC236}">
-                <a16:creationId xmlns:a16="http://schemas.microsoft.com/office/drawing/2014/main" id="{1617FA47-36B5-06F4-62F0-E63065DCFC86}"/>
+                <a16:creationId xmlns:a16="http://schemas.microsoft.com/office/drawing/2014/main" id="{4014B7C8-595F-3C26-415A-30842CDAF552}"/>
               </a:ext>
             </a:extLst>
           </p:cNvPr>
@@ -8272,36 +9093,14 @@
             <a:pPr algn="l" rtl="0"/>
             <a:r>
               <a:rPr lang="en-US" dirty="0"/>
-              <a:t>X: single feature or subset of features of </a:t>
-            </a:r>
-            <a:r>
-              <a:rPr lang="en-US" b="1" u="sng" dirty="0"/>
-              <a:t>anomalies</a:t>
-            </a:r>
+              <a:t>Identify data slices with low accuracy</a:t>
+            </a:r>
+          </a:p>
+          <a:p>
+            <a:pPr algn="l" rtl="0"/>
             <a:r>
               <a:rPr lang="en-US" dirty="0"/>
-              <a:t> in the original dataset</a:t>
-            </a:r>
-          </a:p>
-          <a:p>
-            <a:pPr algn="l" rtl="0"/>
-            <a:r>
-              <a:rPr lang="en-US" dirty="0"/>
-              <a:t>Y:</a:t>
-            </a:r>
-          </a:p>
-          <a:p>
-            <a:pPr lvl="1" algn="l" rtl="0"/>
-            <a:r>
-              <a:rPr lang="en-US" dirty="0"/>
-              <a:t>‘True’ =  original model predicted the original output successfully = True Positive</a:t>
-            </a:r>
-          </a:p>
-          <a:p>
-            <a:pPr lvl="1" algn="l" rtl="0"/>
-            <a:r>
-              <a:rPr lang="en-US" dirty="0"/>
-              <a:t>‘False’ = original model failed in its prediction = False Negative</a:t>
+              <a:t>Not talking about how to improve them</a:t>
             </a:r>
             <a:endParaRPr lang="he-IL" dirty="0"/>
           </a:p>
@@ -8310,7 +9109,7 @@
     </p:spTree>
     <p:extLst>
       <p:ext uri="{BB962C8B-B14F-4D97-AF65-F5344CB8AC3E}">
-        <p14:creationId xmlns:p14="http://schemas.microsoft.com/office/powerpoint/2010/main" val="230825914"/>
+        <p14:creationId xmlns:p14="http://schemas.microsoft.com/office/powerpoint/2010/main" val="2804087652"/>
       </p:ext>
     </p:extLst>
   </p:cSld>

</xml_diff>

<commit_message>
For Nitay's final updates of the text and review.
</commit_message>
<xml_diff>
--- a/docs/MLOps Final Project.pptx
+++ b/docs/MLOps Final Project.pptx
@@ -5,7 +5,7 @@
     <p:sldMasterId id="2147483648" r:id="rId1"/>
   </p:sldMasterIdLst>
   <p:notesMasterIdLst>
-    <p:notesMasterId r:id="rId29"/>
+    <p:notesMasterId r:id="rId32"/>
   </p:notesMasterIdLst>
   <p:sldIdLst>
     <p:sldId id="256" r:id="rId2"/>
@@ -20,21 +20,24 @@
     <p:sldId id="260" r:id="rId11"/>
     <p:sldId id="261" r:id="rId12"/>
     <p:sldId id="283" r:id="rId13"/>
-    <p:sldId id="281" r:id="rId14"/>
-    <p:sldId id="262" r:id="rId15"/>
-    <p:sldId id="284" r:id="rId16"/>
-    <p:sldId id="270" r:id="rId17"/>
-    <p:sldId id="266" r:id="rId18"/>
-    <p:sldId id="267" r:id="rId19"/>
-    <p:sldId id="265" r:id="rId20"/>
-    <p:sldId id="268" r:id="rId21"/>
-    <p:sldId id="269" r:id="rId22"/>
-    <p:sldId id="274" r:id="rId23"/>
-    <p:sldId id="277" r:id="rId24"/>
-    <p:sldId id="282" r:id="rId25"/>
-    <p:sldId id="276" r:id="rId26"/>
-    <p:sldId id="275" r:id="rId27"/>
-    <p:sldId id="279" r:id="rId28"/>
+    <p:sldId id="285" r:id="rId14"/>
+    <p:sldId id="281" r:id="rId15"/>
+    <p:sldId id="262" r:id="rId16"/>
+    <p:sldId id="284" r:id="rId17"/>
+    <p:sldId id="270" r:id="rId18"/>
+    <p:sldId id="266" r:id="rId19"/>
+    <p:sldId id="267" r:id="rId20"/>
+    <p:sldId id="265" r:id="rId21"/>
+    <p:sldId id="268" r:id="rId22"/>
+    <p:sldId id="269" r:id="rId23"/>
+    <p:sldId id="274" r:id="rId24"/>
+    <p:sldId id="277" r:id="rId25"/>
+    <p:sldId id="282" r:id="rId26"/>
+    <p:sldId id="286" r:id="rId27"/>
+    <p:sldId id="287" r:id="rId28"/>
+    <p:sldId id="276" r:id="rId29"/>
+    <p:sldId id="275" r:id="rId30"/>
+    <p:sldId id="279" r:id="rId31"/>
   </p:sldIdLst>
   <p:sldSz cx="12192000" cy="6858000"/>
   <p:notesSz cx="6858000" cy="9144000"/>
@@ -226,7 +229,7 @@
           <a:p>
             <a:fld id="{7C27A723-51FE-45AC-AC04-AE77775347B3}" type="datetimeFigureOut">
               <a:rPr lang="he-IL" smtClean="0"/>
-              <a:t>ב'/אדר א/תשפ"ד</a:t>
+              <a:t>ג'/אדר א/תשפ"ד</a:t>
             </a:fld>
             <a:endParaRPr lang="he-IL"/>
           </a:p>
@@ -683,7 +686,7 @@
           <a:p>
             <a:fld id="{894B87DD-015A-4410-BE23-4EE1FA92658F}" type="slidenum">
               <a:rPr lang="he-IL" smtClean="0"/>
-              <a:t>13</a:t>
+              <a:t>14</a:t>
             </a:fld>
             <a:endParaRPr lang="he-IL"/>
           </a:p>
@@ -771,7 +774,7 @@
           <a:p>
             <a:fld id="{894B87DD-015A-4410-BE23-4EE1FA92658F}" type="slidenum">
               <a:rPr lang="he-IL" smtClean="0"/>
-              <a:t>26</a:t>
+              <a:t>29</a:t>
             </a:fld>
             <a:endParaRPr lang="he-IL"/>
           </a:p>
@@ -965,7 +968,7 @@
           <a:p>
             <a:fld id="{48A87A34-81AB-432B-8DAE-1953F412C126}" type="datetimeFigureOut">
               <a:rPr lang="en-US" dirty="0"/>
-              <a:t>11-Feb-24</a:t>
+              <a:t>12-Feb-24</a:t>
             </a:fld>
             <a:endParaRPr lang="en-US" dirty="0"/>
           </a:p>
@@ -1272,7 +1275,7 @@
           <a:p>
             <a:fld id="{48A87A34-81AB-432B-8DAE-1953F412C126}" type="datetimeFigureOut">
               <a:rPr lang="en-US" dirty="0"/>
-              <a:t>11-Feb-24</a:t>
+              <a:t>12-Feb-24</a:t>
             </a:fld>
             <a:endParaRPr lang="en-US" dirty="0"/>
           </a:p>
@@ -1489,7 +1492,7 @@
           <a:p>
             <a:fld id="{48A87A34-81AB-432B-8DAE-1953F412C126}" type="datetimeFigureOut">
               <a:rPr lang="en-US" dirty="0"/>
-              <a:t>11-Feb-24</a:t>
+              <a:t>12-Feb-24</a:t>
             </a:fld>
             <a:endParaRPr lang="en-US" dirty="0"/>
           </a:p>
@@ -1775,7 +1778,7 @@
           <a:p>
             <a:fld id="{48A87A34-81AB-432B-8DAE-1953F412C126}" type="datetimeFigureOut">
               <a:rPr lang="en-US" dirty="0"/>
-              <a:t>11-Feb-24</a:t>
+              <a:t>12-Feb-24</a:t>
             </a:fld>
             <a:endParaRPr lang="en-US" dirty="0"/>
           </a:p>
@@ -2224,7 +2227,7 @@
           <a:p>
             <a:fld id="{48A87A34-81AB-432B-8DAE-1953F412C126}" type="datetimeFigureOut">
               <a:rPr lang="en-US" dirty="0"/>
-              <a:t>11-Feb-24</a:t>
+              <a:t>12-Feb-24</a:t>
             </a:fld>
             <a:endParaRPr lang="en-US" dirty="0"/>
           </a:p>
@@ -2795,7 +2798,7 @@
           <a:p>
             <a:fld id="{48A87A34-81AB-432B-8DAE-1953F412C126}" type="datetimeFigureOut">
               <a:rPr lang="en-US" dirty="0"/>
-              <a:t>11-Feb-24</a:t>
+              <a:t>12-Feb-24</a:t>
             </a:fld>
             <a:endParaRPr lang="en-US" dirty="0"/>
           </a:p>
@@ -3642,7 +3645,7 @@
           <a:p>
             <a:fld id="{48A87A34-81AB-432B-8DAE-1953F412C126}" type="datetimeFigureOut">
               <a:rPr lang="en-US" dirty="0"/>
-              <a:t>11-Feb-24</a:t>
+              <a:t>12-Feb-24</a:t>
             </a:fld>
             <a:endParaRPr lang="en-US" dirty="0"/>
           </a:p>
@@ -3842,7 +3845,7 @@
           <a:p>
             <a:fld id="{48A87A34-81AB-432B-8DAE-1953F412C126}" type="datetimeFigureOut">
               <a:rPr lang="en-US" dirty="0"/>
-              <a:t>11-Feb-24</a:t>
+              <a:t>12-Feb-24</a:t>
             </a:fld>
             <a:endParaRPr lang="en-US" dirty="0"/>
           </a:p>
@@ -4051,7 +4054,7 @@
           <a:p>
             <a:fld id="{48A87A34-81AB-432B-8DAE-1953F412C126}" type="datetimeFigureOut">
               <a:rPr lang="en-US" dirty="0"/>
-              <a:t>11-Feb-24</a:t>
+              <a:t>12-Feb-24</a:t>
             </a:fld>
             <a:endParaRPr lang="en-US" dirty="0"/>
           </a:p>
@@ -4260,7 +4263,7 @@
           <a:p>
             <a:fld id="{48A87A34-81AB-432B-8DAE-1953F412C126}" type="datetimeFigureOut">
               <a:rPr lang="en-US" dirty="0"/>
-              <a:t>11-Feb-24</a:t>
+              <a:t>12-Feb-24</a:t>
             </a:fld>
             <a:endParaRPr lang="en-US" dirty="0"/>
           </a:p>
@@ -4540,7 +4543,7 @@
           <a:p>
             <a:fld id="{48A87A34-81AB-432B-8DAE-1953F412C126}" type="datetimeFigureOut">
               <a:rPr lang="en-US" dirty="0"/>
-              <a:t>11-Feb-24</a:t>
+              <a:t>12-Feb-24</a:t>
             </a:fld>
             <a:endParaRPr lang="en-US" dirty="0"/>
           </a:p>
@@ -4802,7 +4805,7 @@
           <a:p>
             <a:fld id="{48A87A34-81AB-432B-8DAE-1953F412C126}" type="datetimeFigureOut">
               <a:rPr lang="en-US" dirty="0"/>
-              <a:t>11-Feb-24</a:t>
+              <a:t>12-Feb-24</a:t>
             </a:fld>
             <a:endParaRPr lang="en-US" dirty="0"/>
           </a:p>
@@ -5212,7 +5215,7 @@
           <a:p>
             <a:fld id="{48A87A34-81AB-432B-8DAE-1953F412C126}" type="datetimeFigureOut">
               <a:rPr lang="en-US" dirty="0"/>
-              <a:t>11-Feb-24</a:t>
+              <a:t>12-Feb-24</a:t>
             </a:fld>
             <a:endParaRPr lang="en-US" dirty="0"/>
           </a:p>
@@ -5355,7 +5358,7 @@
           <a:p>
             <a:fld id="{48A87A34-81AB-432B-8DAE-1953F412C126}" type="datetimeFigureOut">
               <a:rPr lang="en-US" dirty="0"/>
-              <a:t>11-Feb-24</a:t>
+              <a:t>12-Feb-24</a:t>
             </a:fld>
             <a:endParaRPr lang="en-US" dirty="0"/>
           </a:p>
@@ -5475,7 +5478,7 @@
           <a:p>
             <a:fld id="{48A87A34-81AB-432B-8DAE-1953F412C126}" type="datetimeFigureOut">
               <a:rPr lang="en-US" dirty="0"/>
-              <a:t>11-Feb-24</a:t>
+              <a:t>12-Feb-24</a:t>
             </a:fld>
             <a:endParaRPr lang="en-US" dirty="0"/>
           </a:p>
@@ -5749,7 +5752,7 @@
           <a:p>
             <a:fld id="{48A87A34-81AB-432B-8DAE-1953F412C126}" type="datetimeFigureOut">
               <a:rPr lang="en-US" dirty="0"/>
-              <a:t>11-Feb-24</a:t>
+              <a:t>12-Feb-24</a:t>
             </a:fld>
             <a:endParaRPr lang="en-US" dirty="0"/>
           </a:p>
@@ -6056,7 +6059,7 @@
           <a:p>
             <a:fld id="{48A87A34-81AB-432B-8DAE-1953F412C126}" type="datetimeFigureOut">
               <a:rPr lang="en-US" dirty="0"/>
-              <a:t>11-Feb-24</a:t>
+              <a:t>12-Feb-24</a:t>
             </a:fld>
             <a:endParaRPr lang="en-US" dirty="0"/>
           </a:p>
@@ -6303,7 +6306,7 @@
             <a:fld id="{48A87A34-81AB-432B-8DAE-1953F412C126}" type="datetimeFigureOut">
               <a:rPr lang="en-US" dirty="0"/>
               <a:pPr/>
-              <a:t>11-Feb-24</a:t>
+              <a:t>12-Feb-24</a:t>
             </a:fld>
             <a:endParaRPr lang="en-US" dirty="0"/>
           </a:p>
@@ -7001,35 +7004,80 @@
         </p:nvSpPr>
         <p:spPr/>
         <p:txBody>
-          <a:bodyPr/>
+          <a:bodyPr>
+            <a:normAutofit/>
+          </a:bodyPr>
           <a:lstStyle/>
           <a:p>
             <a:pPr algn="l" rtl="0"/>
+            <a:r>
+              <a:rPr lang="en-US" dirty="0"/>
+              <a:t>Input</a:t>
+            </a:r>
+          </a:p>
+          <a:p>
+            <a:pPr marL="457200" lvl="1" indent="0" algn="l" rtl="0">
+              <a:buNone/>
+            </a:pPr>
             <a:r>
               <a:rPr lang="en-US" dirty="0"/>
               <a:t>X: single feature or subset of features of the original dataset</a:t>
             </a:r>
           </a:p>
           <a:p>
+            <a:pPr marL="457200" lvl="1" indent="0" algn="l" rtl="0">
+              <a:buNone/>
+            </a:pPr>
+            <a:r>
+              <a:rPr lang="en-US" dirty="0"/>
+              <a:t>Y:	  ‘True’ = original model correctly predicted the original output</a:t>
+            </a:r>
+          </a:p>
+          <a:p>
+            <a:pPr marL="457200" lvl="1" indent="0" algn="l" rtl="0">
+              <a:buNone/>
+            </a:pPr>
+            <a:r>
+              <a:rPr lang="en-US" dirty="0"/>
+              <a:t>	  ‘False’ = original model failed in its prediction</a:t>
+            </a:r>
+          </a:p>
+          <a:p>
             <a:pPr algn="l" rtl="0"/>
             <a:r>
               <a:rPr lang="en-US" dirty="0"/>
-              <a:t>Y:</a:t>
+              <a:t>Build the tree</a:t>
+            </a:r>
+          </a:p>
+          <a:p>
+            <a:pPr algn="l" rtl="0"/>
+            <a:r>
+              <a:rPr lang="en-US" dirty="0"/>
+              <a:t>Filter the leaves with:</a:t>
             </a:r>
           </a:p>
           <a:p>
             <a:pPr lvl="1" algn="l" rtl="0"/>
             <a:r>
               <a:rPr lang="en-US" dirty="0"/>
-              <a:t>‘True’ = original model predicted the original output successfully</a:t>
+              <a:t>minimal support (above 5% of total misclassification)</a:t>
             </a:r>
           </a:p>
           <a:p>
             <a:pPr lvl="1" algn="l" rtl="0"/>
             <a:r>
               <a:rPr lang="en-US" dirty="0"/>
-              <a:t>‘False’ = original model failed in its prediction</a:t>
-            </a:r>
+              <a:t>statistically significant drop in accuracy (above 4%)</a:t>
+            </a:r>
+          </a:p>
+          <a:p>
+            <a:pPr algn="l" rtl="0"/>
+            <a:endParaRPr lang="en-US" dirty="0"/>
+          </a:p>
+          <a:p>
+            <a:pPr marL="0" indent="0" algn="l" rtl="0">
+              <a:buNone/>
+            </a:pPr>
             <a:endParaRPr lang="he-IL" dirty="0"/>
           </a:p>
         </p:txBody>
@@ -7085,40 +7133,56 @@
           <a:bodyPr/>
           <a:lstStyle/>
           <a:p>
+            <a:pPr rtl="0"/>
+            <a:r>
+              <a:rPr lang="en-US" dirty="0"/>
+              <a:t>Decision tree – ideal case </a:t>
+            </a:r>
             <a:endParaRPr lang="he-IL" dirty="0"/>
           </a:p>
         </p:txBody>
       </p:sp>
-      <p:sp>
-        <p:nvSpPr>
-          <p:cNvPr id="3" name="Content Placeholder 2">
+      <p:pic>
+        <p:nvPicPr>
+          <p:cNvPr id="7" name="Content Placeholder 6">
             <a:extLst>
               <a:ext uri="{FF2B5EF4-FFF2-40B4-BE49-F238E27FC236}">
-                <a16:creationId xmlns:a16="http://schemas.microsoft.com/office/drawing/2014/main" id="{C254E5DA-2825-C02D-2507-0FC6317331AE}"/>
+                <a16:creationId xmlns:a16="http://schemas.microsoft.com/office/drawing/2014/main" id="{7D7C1335-76D2-67D7-5A04-99841E6B3243}"/>
               </a:ext>
             </a:extLst>
           </p:cNvPr>
-          <p:cNvSpPr>
-            <a:spLocks noGrp="1"/>
-          </p:cNvSpPr>
+          <p:cNvPicPr>
+            <a:picLocks noGrp="1" noChangeAspect="1"/>
+          </p:cNvPicPr>
           <p:nvPr>
             <p:ph sz="quarter" idx="13"/>
           </p:nvPr>
-        </p:nvSpPr>
-        <p:spPr/>
-        <p:txBody>
-          <a:bodyPr/>
-          <a:lstStyle/>
-          <a:p>
-            <a:pPr algn="l" rtl="0"/>
-            <a:r>
-              <a:rPr lang="en-US" dirty="0"/>
-              <a:t>&lt;insert example of accuracy decision tree here (ours)&gt;</a:t>
-            </a:r>
-            <a:endParaRPr lang="he-IL" dirty="0"/>
-          </a:p>
-        </p:txBody>
-      </p:sp>
+        </p:nvPicPr>
+        <p:blipFill>
+          <a:blip r:embed="rId2"/>
+          <a:srcRect/>
+          <a:stretch/>
+        </p:blipFill>
+        <p:spPr bwMode="auto">
+          <a:xfrm>
+            <a:off x="2286000" y="2214694"/>
+            <a:ext cx="7620000" cy="3810000"/>
+          </a:xfrm>
+          <a:prstGeom prst="rect">
+            <a:avLst/>
+          </a:prstGeom>
+          <a:noFill/>
+          <a:extLst>
+            <a:ext uri="{909E8E84-426E-40DD-AFC4-6F175D3DCCD1}">
+              <a14:hiddenFill xmlns:a14="http://schemas.microsoft.com/office/drawing/2010/main">
+                <a:solidFill>
+                  <a:srgbClr val="FFFFFF"/>
+                </a:solidFill>
+              </a14:hiddenFill>
+            </a:ext>
+          </a:extLst>
+        </p:spPr>
+      </p:pic>
     </p:spTree>
     <p:extLst>
       <p:ext uri="{BB962C8B-B14F-4D97-AF65-F5344CB8AC3E}">
@@ -7133,6 +7197,114 @@
 </file>
 
 <file path=ppt/slides/slide13.xml><?xml version="1.0" encoding="utf-8"?>
+<p:sld xmlns:a="http://schemas.openxmlformats.org/drawingml/2006/main" xmlns:r="http://schemas.openxmlformats.org/officeDocument/2006/relationships" xmlns:p="http://schemas.openxmlformats.org/presentationml/2006/main">
+  <p:cSld>
+    <p:spTree>
+      <p:nvGrpSpPr>
+        <p:cNvPr id="1" name="">
+          <a:extLst>
+            <a:ext uri="{FF2B5EF4-FFF2-40B4-BE49-F238E27FC236}">
+              <a16:creationId xmlns:a16="http://schemas.microsoft.com/office/drawing/2014/main" id="{56C162D3-4660-713A-5E88-829DA7D7D2DC}"/>
+            </a:ext>
+          </a:extLst>
+        </p:cNvPr>
+        <p:cNvGrpSpPr/>
+        <p:nvPr/>
+      </p:nvGrpSpPr>
+      <p:grpSpPr>
+        <a:xfrm>
+          <a:off x="0" y="0"/>
+          <a:ext cx="0" cy="0"/>
+          <a:chOff x="0" y="0"/>
+          <a:chExt cx="0" cy="0"/>
+        </a:xfrm>
+      </p:grpSpPr>
+      <p:sp>
+        <p:nvSpPr>
+          <p:cNvPr id="2" name="Title 1">
+            <a:extLst>
+              <a:ext uri="{FF2B5EF4-FFF2-40B4-BE49-F238E27FC236}">
+                <a16:creationId xmlns:a16="http://schemas.microsoft.com/office/drawing/2014/main" id="{FE483768-4C8E-C7A6-5C15-127EB02EAD56}"/>
+              </a:ext>
+            </a:extLst>
+          </p:cNvPr>
+          <p:cNvSpPr>
+            <a:spLocks noGrp="1"/>
+          </p:cNvSpPr>
+          <p:nvPr>
+            <p:ph type="title"/>
+          </p:nvPr>
+        </p:nvSpPr>
+        <p:spPr/>
+        <p:txBody>
+          <a:bodyPr/>
+          <a:lstStyle/>
+          <a:p>
+            <a:pPr rtl="0"/>
+            <a:r>
+              <a:rPr lang="en-US" dirty="0"/>
+              <a:t>Decision tree – usual case</a:t>
+            </a:r>
+            <a:endParaRPr lang="he-IL" dirty="0"/>
+          </a:p>
+        </p:txBody>
+      </p:sp>
+      <p:pic>
+        <p:nvPicPr>
+          <p:cNvPr id="7" name="Content Placeholder 6" descr="A diagram of a algorithm&#10;&#10;Description automatically generated">
+            <a:extLst>
+              <a:ext uri="{FF2B5EF4-FFF2-40B4-BE49-F238E27FC236}">
+                <a16:creationId xmlns:a16="http://schemas.microsoft.com/office/drawing/2014/main" id="{17055945-7A9F-6BCE-9B80-930610912C7D}"/>
+              </a:ext>
+            </a:extLst>
+          </p:cNvPr>
+          <p:cNvPicPr>
+            <a:picLocks noGrp="1" noChangeAspect="1"/>
+          </p:cNvPicPr>
+          <p:nvPr>
+            <p:ph sz="quarter" idx="13"/>
+          </p:nvPr>
+        </p:nvPicPr>
+        <p:blipFill>
+          <a:blip r:embed="rId2"/>
+          <a:stretch>
+            <a:fillRect/>
+          </a:stretch>
+        </p:blipFill>
+        <p:spPr bwMode="auto">
+          <a:xfrm>
+            <a:off x="3467100" y="2214694"/>
+            <a:ext cx="5257800" cy="4593431"/>
+          </a:xfrm>
+          <a:prstGeom prst="rect">
+            <a:avLst/>
+          </a:prstGeom>
+          <a:noFill/>
+          <a:extLst>
+            <a:ext uri="{909E8E84-426E-40DD-AFC4-6F175D3DCCD1}">
+              <a14:hiddenFill xmlns:a14="http://schemas.microsoft.com/office/drawing/2010/main">
+                <a:solidFill>
+                  <a:srgbClr val="FFFFFF"/>
+                </a:solidFill>
+              </a14:hiddenFill>
+            </a:ext>
+          </a:extLst>
+        </p:spPr>
+      </p:pic>
+    </p:spTree>
+    <p:extLst>
+      <p:ext uri="{BB962C8B-B14F-4D97-AF65-F5344CB8AC3E}">
+        <p14:creationId xmlns:p14="http://schemas.microsoft.com/office/powerpoint/2010/main" val="3191360359"/>
+      </p:ext>
+    </p:extLst>
+  </p:cSld>
+  <p:clrMapOvr>
+    <a:masterClrMapping/>
+  </p:clrMapOvr>
+</p:sld>
+</file>
+
+<file path=ppt/slides/slide14.xml><?xml version="1.0" encoding="utf-8"?>
 <p:sld xmlns:a="http://schemas.openxmlformats.org/drawingml/2006/main" xmlns:r="http://schemas.openxmlformats.org/officeDocument/2006/relationships" xmlns:p="http://schemas.openxmlformats.org/presentationml/2006/main">
   <p:cSld>
     <p:bg>
@@ -7507,7 +7679,7 @@
 </p:sld>
 </file>
 
-<file path=ppt/slides/slide14.xml><?xml version="1.0" encoding="utf-8"?>
+<file path=ppt/slides/slide15.xml><?xml version="1.0" encoding="utf-8"?>
 <p:sld xmlns:a="http://schemas.openxmlformats.org/drawingml/2006/main" xmlns:r="http://schemas.openxmlformats.org/officeDocument/2006/relationships" xmlns:p="http://schemas.openxmlformats.org/presentationml/2006/main" show="0">
   <p:cSld>
     <p:spTree>
@@ -7573,53 +7745,78 @@
         <p:spPr/>
         <p:txBody>
           <a:bodyPr>
-            <a:normAutofit/>
+            <a:normAutofit fontScale="92500" lnSpcReduction="10000"/>
           </a:bodyPr>
           <a:lstStyle/>
           <a:p>
-            <a:pPr marL="0" indent="0" algn="l" rtl="0">
+            <a:pPr algn="l" rtl="0"/>
+            <a:r>
+              <a:rPr lang="en-US" sz="2400" dirty="0"/>
+              <a:t>Input:</a:t>
+            </a:r>
+          </a:p>
+          <a:p>
+            <a:pPr marL="457200" lvl="1" indent="0" algn="l" rtl="0">
               <a:buNone/>
             </a:pPr>
-            <a:endParaRPr lang="en-US" sz="1000" dirty="0"/>
-          </a:p>
-          <a:p>
-            <a:pPr marL="0" indent="0" algn="l" rtl="0">
+            <a:r>
+              <a:rPr lang="en-US" sz="2200" dirty="0"/>
+              <a:t>X: single feature or subset of features in the original dataset, without TNs</a:t>
+            </a:r>
+          </a:p>
+          <a:p>
+            <a:pPr marL="457200" lvl="1" indent="0" algn="l" rtl="0">
               <a:buNone/>
             </a:pPr>
             <a:r>
-              <a:rPr lang="en-US" sz="2400" dirty="0"/>
-              <a:t>X: single feature or subset of features in the original dataset, without TNs</a:t>
-            </a:r>
-          </a:p>
-          <a:p>
-            <a:pPr marL="0" indent="0" algn="l" rtl="0">
+              <a:rPr lang="en-US" sz="2200" dirty="0"/>
+              <a:t>Y:	</a:t>
+            </a:r>
+            <a:r>
+              <a:rPr lang="en-US" sz="2000" dirty="0"/>
+              <a:t>True’ =  original model predicted the original output successfully = TP</a:t>
+            </a:r>
+          </a:p>
+          <a:p>
+            <a:pPr marL="457200" lvl="1" indent="0" algn="l" rtl="0">
               <a:buNone/>
             </a:pPr>
-            <a:endParaRPr lang="en-US" sz="1000" dirty="0"/>
-          </a:p>
-          <a:p>
-            <a:pPr marL="0" indent="0" algn="l" rtl="0">
-              <a:buNone/>
-            </a:pPr>
-            <a:r>
-              <a:rPr lang="en-US" sz="2400" dirty="0"/>
-              <a:t>Y:</a:t>
+            <a:r>
+              <a:rPr lang="en-US" sz="2000" dirty="0"/>
+              <a:t>	‘False’ = original model failed in its prediction = FP + FN</a:t>
+            </a:r>
+          </a:p>
+          <a:p>
+            <a:pPr algn="l" rtl="0"/>
+            <a:r>
+              <a:rPr lang="en-US" sz="2200" dirty="0"/>
+              <a:t>Build the tree</a:t>
+            </a:r>
+          </a:p>
+          <a:p>
+            <a:pPr algn="l" rtl="0"/>
+            <a:r>
+              <a:rPr lang="en-US" sz="2200" dirty="0"/>
+              <a:t>Filter the nodes:</a:t>
             </a:r>
           </a:p>
           <a:p>
             <a:pPr lvl="1" algn="l" rtl="0"/>
             <a:r>
               <a:rPr lang="en-US" sz="2000" dirty="0"/>
-              <a:t>‘True’ =  original model predicted the original output successfully = TP</a:t>
-            </a:r>
-          </a:p>
-          <a:p>
-            <a:pPr lvl="1" algn="l" rtl="0"/>
-            <a:r>
-              <a:rPr lang="en-US" sz="2000" dirty="0"/>
-              <a:t>‘False’ = original model failed in its prediction = FP + FN</a:t>
-            </a:r>
-            <a:endParaRPr lang="he-IL" sz="2000" dirty="0"/>
+              <a:t>Number of samples below 20% of total</a:t>
+            </a:r>
+          </a:p>
+          <a:p>
+            <a:pPr algn="l" rtl="0"/>
+            <a:r>
+              <a:rPr lang="en-US" sz="2200" dirty="0"/>
+              <a:t>Sort the nodes by potential overall F2 improvement</a:t>
+            </a:r>
+          </a:p>
+          <a:p>
+            <a:pPr algn="l" rtl="0"/>
+            <a:endParaRPr lang="he-IL" sz="2200" dirty="0"/>
           </a:p>
         </p:txBody>
       </p:sp>
@@ -7627,163 +7824,6 @@
     <p:extLst>
       <p:ext uri="{BB962C8B-B14F-4D97-AF65-F5344CB8AC3E}">
         <p14:creationId xmlns:p14="http://schemas.microsoft.com/office/powerpoint/2010/main" val="230825914"/>
-      </p:ext>
-    </p:extLst>
-  </p:cSld>
-  <p:clrMapOvr>
-    <a:masterClrMapping/>
-  </p:clrMapOvr>
-</p:sld>
-</file>
-
-<file path=ppt/slides/slide15.xml><?xml version="1.0" encoding="utf-8"?>
-<p:sld xmlns:a="http://schemas.openxmlformats.org/drawingml/2006/main" xmlns:r="http://schemas.openxmlformats.org/officeDocument/2006/relationships" xmlns:p="http://schemas.openxmlformats.org/presentationml/2006/main">
-  <p:cSld>
-    <p:spTree>
-      <p:nvGrpSpPr>
-        <p:cNvPr id="1" name=""/>
-        <p:cNvGrpSpPr/>
-        <p:nvPr/>
-      </p:nvGrpSpPr>
-      <p:grpSpPr>
-        <a:xfrm>
-          <a:off x="0" y="0"/>
-          <a:ext cx="0" cy="0"/>
-          <a:chOff x="0" y="0"/>
-          <a:chExt cx="0" cy="0"/>
-        </a:xfrm>
-      </p:grpSpPr>
-      <p:sp>
-        <p:nvSpPr>
-          <p:cNvPr id="4" name="Title 3">
-            <a:extLst>
-              <a:ext uri="{FF2B5EF4-FFF2-40B4-BE49-F238E27FC236}">
-                <a16:creationId xmlns:a16="http://schemas.microsoft.com/office/drawing/2014/main" id="{9B3EC792-68A3-4BAB-85F3-B639063A1690}"/>
-              </a:ext>
-            </a:extLst>
-          </p:cNvPr>
-          <p:cNvSpPr>
-            <a:spLocks noGrp="1"/>
-          </p:cNvSpPr>
-          <p:nvPr>
-            <p:ph type="title"/>
-          </p:nvPr>
-        </p:nvSpPr>
-        <p:spPr/>
-        <p:txBody>
-          <a:bodyPr/>
-          <a:lstStyle/>
-          <a:p>
-            <a:pPr rtl="0"/>
-            <a:r>
-              <a:rPr lang="en-US" dirty="0"/>
-              <a:t>Comparison </a:t>
-            </a:r>
-            <a:r>
-              <a:rPr lang="en-US"/>
-              <a:t>of approaches</a:t>
-            </a:r>
-            <a:br>
-              <a:rPr lang="en-US"/>
-            </a:br>
-            <a:r>
-              <a:rPr lang="en-US"/>
-              <a:t>(decision-tree guiding </a:t>
-            </a:r>
-            <a:r>
-              <a:rPr lang="en-US" dirty="0"/>
-              <a:t>metrics)</a:t>
-            </a:r>
-            <a:endParaRPr lang="he-IL" dirty="0"/>
-          </a:p>
-        </p:txBody>
-      </p:sp>
-      <p:sp>
-        <p:nvSpPr>
-          <p:cNvPr id="3" name="Content Placeholder 2">
-            <a:extLst>
-              <a:ext uri="{FF2B5EF4-FFF2-40B4-BE49-F238E27FC236}">
-                <a16:creationId xmlns:a16="http://schemas.microsoft.com/office/drawing/2014/main" id="{483694C7-2D22-1276-11D6-C8CA4A373058}"/>
-              </a:ext>
-            </a:extLst>
-          </p:cNvPr>
-          <p:cNvSpPr>
-            <a:spLocks noGrp="1"/>
-          </p:cNvSpPr>
-          <p:nvPr>
-            <p:ph sz="quarter" idx="13"/>
-          </p:nvPr>
-        </p:nvSpPr>
-        <p:spPr/>
-        <p:txBody>
-          <a:bodyPr/>
-          <a:lstStyle/>
-          <a:p>
-            <a:pPr marL="0" indent="0" algn="l" rtl="0">
-              <a:buNone/>
-            </a:pPr>
-            <a:r>
-              <a:rPr lang="en-US" dirty="0"/>
-              <a:t>&lt;insert example of accuracy decision tree by accuracy&gt;</a:t>
-            </a:r>
-            <a:endParaRPr lang="he-IL" dirty="0"/>
-          </a:p>
-          <a:p>
-            <a:pPr marL="0" indent="0" algn="l" rtl="0">
-              <a:buNone/>
-            </a:pPr>
-            <a:endParaRPr lang="he-IL" dirty="0"/>
-          </a:p>
-        </p:txBody>
-      </p:sp>
-      <p:sp>
-        <p:nvSpPr>
-          <p:cNvPr id="5" name="Content Placeholder 4">
-            <a:extLst>
-              <a:ext uri="{FF2B5EF4-FFF2-40B4-BE49-F238E27FC236}">
-                <a16:creationId xmlns:a16="http://schemas.microsoft.com/office/drawing/2014/main" id="{D5F7A0AC-20B4-EA15-65A9-81B24AC54929}"/>
-              </a:ext>
-            </a:extLst>
-          </p:cNvPr>
-          <p:cNvSpPr>
-            <a:spLocks noGrp="1"/>
-          </p:cNvSpPr>
-          <p:nvPr>
-            <p:ph sz="quarter" idx="14"/>
-          </p:nvPr>
-        </p:nvSpPr>
-        <p:spPr/>
-        <p:txBody>
-          <a:bodyPr/>
-          <a:lstStyle/>
-          <a:p>
-            <a:pPr marL="0" indent="0" algn="l" rtl="0">
-              <a:buNone/>
-            </a:pPr>
-            <a:r>
-              <a:rPr lang="en-US" dirty="0"/>
-              <a:t>&lt;insert example of decision tree by F2&gt;</a:t>
-            </a:r>
-            <a:endParaRPr lang="he-IL" dirty="0"/>
-          </a:p>
-          <a:p>
-            <a:pPr marL="0" indent="0" algn="l" rtl="0">
-              <a:buNone/>
-            </a:pPr>
-            <a:endParaRPr lang="he-IL" dirty="0"/>
-          </a:p>
-          <a:p>
-            <a:pPr marL="0" indent="0" algn="l" rtl="0">
-              <a:buNone/>
-            </a:pPr>
-            <a:endParaRPr lang="he-IL" dirty="0"/>
-          </a:p>
-        </p:txBody>
-      </p:sp>
-    </p:spTree>
-    <p:extLst>
-      <p:ext uri="{BB962C8B-B14F-4D97-AF65-F5344CB8AC3E}">
-        <p14:creationId xmlns:p14="http://schemas.microsoft.com/office/powerpoint/2010/main" val="2901413425"/>
       </p:ext>
     </p:extLst>
   </p:cSld>
@@ -7815,7 +7855,7 @@
           <p:cNvPr id="4" name="Title 3">
             <a:extLst>
               <a:ext uri="{FF2B5EF4-FFF2-40B4-BE49-F238E27FC236}">
-                <a16:creationId xmlns:a16="http://schemas.microsoft.com/office/drawing/2014/main" id="{0164B796-02E6-2CF2-AD58-6BA0FF61E8C3}"/>
+                <a16:creationId xmlns:a16="http://schemas.microsoft.com/office/drawing/2014/main" id="{9B3EC792-68A3-4BAB-85F3-B639063A1690}"/>
               </a:ext>
             </a:extLst>
           </p:cNvPr>
@@ -7833,19 +7873,34 @@
           <a:p>
             <a:pPr rtl="0"/>
             <a:r>
-              <a:rPr lang="en-US" cap="all" dirty="0"/>
-              <a:t>The architecture</a:t>
-            </a:r>
-            <a:endParaRPr lang="he-IL" cap="all" dirty="0"/>
-          </a:p>
-        </p:txBody>
-      </p:sp>
-      <p:sp>
-        <p:nvSpPr>
-          <p:cNvPr id="5" name="Text Placeholder 4">
+              <a:rPr lang="en-US" dirty="0"/>
+              <a:t>Comparison </a:t>
+            </a:r>
+            <a:r>
+              <a:rPr lang="en-US"/>
+              <a:t>of approaches</a:t>
+            </a:r>
+            <a:br>
+              <a:rPr lang="en-US"/>
+            </a:br>
+            <a:r>
+              <a:rPr lang="en-US"/>
+              <a:t>(decision-tree guiding </a:t>
+            </a:r>
+            <a:r>
+              <a:rPr lang="en-US" dirty="0"/>
+              <a:t>metrics)</a:t>
+            </a:r>
+            <a:endParaRPr lang="he-IL" dirty="0"/>
+          </a:p>
+        </p:txBody>
+      </p:sp>
+      <p:sp>
+        <p:nvSpPr>
+          <p:cNvPr id="3" name="Content Placeholder 2">
             <a:extLst>
               <a:ext uri="{FF2B5EF4-FFF2-40B4-BE49-F238E27FC236}">
-                <a16:creationId xmlns:a16="http://schemas.microsoft.com/office/drawing/2014/main" id="{49087E06-C5E1-41C3-1F28-1C6A2EEE3E22}"/>
+                <a16:creationId xmlns:a16="http://schemas.microsoft.com/office/drawing/2014/main" id="{483694C7-2D22-1276-11D6-C8CA4A373058}"/>
               </a:ext>
             </a:extLst>
           </p:cNvPr>
@@ -7853,7 +7908,7 @@
             <a:spLocks noGrp="1"/>
           </p:cNvSpPr>
           <p:nvPr>
-            <p:ph type="body" idx="1"/>
+            <p:ph sz="quarter" idx="13"/>
           </p:nvPr>
         </p:nvSpPr>
         <p:spPr/>
@@ -7861,7 +7916,63 @@
           <a:bodyPr/>
           <a:lstStyle/>
           <a:p>
-            <a:pPr rtl="0"/>
+            <a:pPr marL="0" indent="0" algn="l" rtl="0">
+              <a:buNone/>
+            </a:pPr>
+            <a:r>
+              <a:rPr lang="en-US" dirty="0"/>
+              <a:t>&lt;insert example of accuracy decision tree by accuracy&gt;</a:t>
+            </a:r>
+            <a:endParaRPr lang="he-IL" dirty="0"/>
+          </a:p>
+          <a:p>
+            <a:pPr marL="0" indent="0" algn="l" rtl="0">
+              <a:buNone/>
+            </a:pPr>
+            <a:endParaRPr lang="he-IL" dirty="0"/>
+          </a:p>
+        </p:txBody>
+      </p:sp>
+      <p:sp>
+        <p:nvSpPr>
+          <p:cNvPr id="5" name="Content Placeholder 4">
+            <a:extLst>
+              <a:ext uri="{FF2B5EF4-FFF2-40B4-BE49-F238E27FC236}">
+                <a16:creationId xmlns:a16="http://schemas.microsoft.com/office/drawing/2014/main" id="{D5F7A0AC-20B4-EA15-65A9-81B24AC54929}"/>
+              </a:ext>
+            </a:extLst>
+          </p:cNvPr>
+          <p:cNvSpPr>
+            <a:spLocks noGrp="1"/>
+          </p:cNvSpPr>
+          <p:nvPr>
+            <p:ph sz="quarter" idx="14"/>
+          </p:nvPr>
+        </p:nvSpPr>
+        <p:spPr/>
+        <p:txBody>
+          <a:bodyPr/>
+          <a:lstStyle/>
+          <a:p>
+            <a:pPr marL="0" indent="0" algn="l" rtl="0">
+              <a:buNone/>
+            </a:pPr>
+            <a:r>
+              <a:rPr lang="en-US" dirty="0"/>
+              <a:t>&lt;insert example of decision tree by F2&gt;</a:t>
+            </a:r>
+            <a:endParaRPr lang="he-IL" dirty="0"/>
+          </a:p>
+          <a:p>
+            <a:pPr marL="0" indent="0" algn="l" rtl="0">
+              <a:buNone/>
+            </a:pPr>
+            <a:endParaRPr lang="he-IL" dirty="0"/>
+          </a:p>
+          <a:p>
+            <a:pPr marL="0" indent="0" algn="l" rtl="0">
+              <a:buNone/>
+            </a:pPr>
             <a:endParaRPr lang="he-IL" dirty="0"/>
           </a:p>
         </p:txBody>
@@ -7869,7 +7980,7 @@
     </p:spTree>
     <p:extLst>
       <p:ext uri="{BB962C8B-B14F-4D97-AF65-F5344CB8AC3E}">
-        <p14:creationId xmlns:p14="http://schemas.microsoft.com/office/powerpoint/2010/main" val="2039371253"/>
+        <p14:creationId xmlns:p14="http://schemas.microsoft.com/office/powerpoint/2010/main" val="2901413425"/>
       </p:ext>
     </p:extLst>
   </p:cSld>
@@ -7898,10 +8009,10 @@
       </p:grpSpPr>
       <p:sp>
         <p:nvSpPr>
-          <p:cNvPr id="2" name="Title 1">
+          <p:cNvPr id="4" name="Title 3">
             <a:extLst>
               <a:ext uri="{FF2B5EF4-FFF2-40B4-BE49-F238E27FC236}">
-                <a16:creationId xmlns:a16="http://schemas.microsoft.com/office/drawing/2014/main" id="{3E2365AF-46C2-3616-1532-D71DEC709133}"/>
+                <a16:creationId xmlns:a16="http://schemas.microsoft.com/office/drawing/2014/main" id="{0164B796-02E6-2CF2-AD58-6BA0FF61E8C3}"/>
               </a:ext>
             </a:extLst>
           </p:cNvPr>
@@ -7917,28 +8028,21 @@
           <a:bodyPr/>
           <a:lstStyle/>
           <a:p>
-            <a:pPr algn="ctr" defTabSz="914400" rtl="0" eaLnBrk="1" latinLnBrk="0" hangingPunct="1">
-              <a:lnSpc>
-                <a:spcPct val="90000"/>
-              </a:lnSpc>
-              <a:spcBef>
-                <a:spcPct val="0"/>
-              </a:spcBef>
-              <a:buNone/>
-            </a:pPr>
-            <a:r>
-              <a:rPr lang="en-IL" dirty="0"/>
-              <a:t>Architecture - Overall</a:t>
-            </a:r>
-          </a:p>
-        </p:txBody>
-      </p:sp>
-      <p:sp>
-        <p:nvSpPr>
-          <p:cNvPr id="3" name="Content Placeholder 2">
+            <a:pPr rtl="0"/>
+            <a:r>
+              <a:rPr lang="en-US" cap="all" dirty="0"/>
+              <a:t>The architecture</a:t>
+            </a:r>
+            <a:endParaRPr lang="he-IL" cap="all" dirty="0"/>
+          </a:p>
+        </p:txBody>
+      </p:sp>
+      <p:sp>
+        <p:nvSpPr>
+          <p:cNvPr id="5" name="Text Placeholder 4">
             <a:extLst>
               <a:ext uri="{FF2B5EF4-FFF2-40B4-BE49-F238E27FC236}">
-                <a16:creationId xmlns:a16="http://schemas.microsoft.com/office/drawing/2014/main" id="{E6EF5898-C934-4F56-A10A-009A01A21DA2}"/>
+                <a16:creationId xmlns:a16="http://schemas.microsoft.com/office/drawing/2014/main" id="{49087E06-C5E1-41C3-1F28-1C6A2EEE3E22}"/>
               </a:ext>
             </a:extLst>
           </p:cNvPr>
@@ -7946,96 +8050,23 @@
             <a:spLocks noGrp="1"/>
           </p:cNvSpPr>
           <p:nvPr>
-            <p:ph sz="quarter" idx="13"/>
-          </p:nvPr>
-        </p:nvSpPr>
-        <p:spPr>
-          <a:xfrm>
-            <a:off x="913774" y="1828800"/>
-            <a:ext cx="10363826" cy="3962399"/>
-          </a:xfrm>
-        </p:spPr>
-        <p:txBody>
-          <a:bodyPr>
-            <a:normAutofit/>
-          </a:bodyPr>
-          <a:lstStyle/>
-          <a:p>
-            <a:pPr marL="228600" indent="-228600" algn="l" defTabSz="914400" rtl="0" eaLnBrk="1" latinLnBrk="0" hangingPunct="1">
-              <a:lnSpc>
-                <a:spcPct val="120000"/>
-              </a:lnSpc>
-              <a:spcBef>
-                <a:spcPts val="1000"/>
-              </a:spcBef>
-              <a:buClr>
-                <a:schemeClr val="tx1"/>
-              </a:buClr>
-              <a:buFont typeface="Arial" panose="020B0604020202020204" pitchFamily="34" charset="0"/>
-              <a:buChar char="•"/>
-            </a:pPr>
-            <a:r>
-              <a:rPr lang="en-IL" dirty="0"/>
-              <a:t>Runtime environment: We use our laptops as the runtime environment, with the following installed:</a:t>
-            </a:r>
-          </a:p>
-          <a:p>
-            <a:pPr lvl="1" algn="l" rtl="0">
-              <a:spcBef>
-                <a:spcPts val="1000"/>
-              </a:spcBef>
-            </a:pPr>
-            <a:r>
-              <a:rPr lang="en-IL" sz="2000" dirty="0"/>
-              <a:t>OS: MacOS M1 / M2 or Windows 10+ supported</a:t>
-            </a:r>
-          </a:p>
-          <a:p>
-            <a:pPr lvl="1" algn="l" rtl="0">
-              <a:spcBef>
-                <a:spcPts val="1000"/>
-              </a:spcBef>
-            </a:pPr>
-            <a:r>
-              <a:rPr lang="en-IL" sz="2000" dirty="0"/>
-              <a:t>Python 3.11 with Anaconda / Miniconda installed</a:t>
-            </a:r>
-          </a:p>
-          <a:p>
-            <a:pPr lvl="1" algn="l" rtl="0">
-              <a:spcBef>
-                <a:spcPts val="1000"/>
-              </a:spcBef>
-            </a:pPr>
-            <a:r>
-              <a:rPr lang="en-IL" sz="2000" dirty="0"/>
-              <a:t>The requirements Python packages specified in requirements.txt files installed using pip or conda</a:t>
-            </a:r>
-          </a:p>
-          <a:p>
-            <a:pPr lvl="1" algn="l" rtl="0">
-              <a:spcBef>
-                <a:spcPts val="1000"/>
-              </a:spcBef>
-            </a:pPr>
-            <a:r>
-              <a:rPr lang="en-IL" sz="2000" dirty="0"/>
-              <a:t>In a real scenario the runtime environment should be run on an Instance in the cloud</a:t>
-            </a:r>
-          </a:p>
-          <a:p>
-            <a:pPr algn="l" rtl="0"/>
-            <a:r>
-              <a:rPr lang="en-IL" dirty="0"/>
-              <a:t>Model registry: We use Databricks SaaS platform to register and store our trained models. The Databricks platform is hosted in AWS cloud</a:t>
-            </a:r>
+            <p:ph type="body" idx="1"/>
+          </p:nvPr>
+        </p:nvSpPr>
+        <p:spPr/>
+        <p:txBody>
+          <a:bodyPr/>
+          <a:lstStyle/>
+          <a:p>
+            <a:pPr rtl="0"/>
+            <a:endParaRPr lang="he-IL" dirty="0"/>
           </a:p>
         </p:txBody>
       </p:sp>
     </p:spTree>
     <p:extLst>
       <p:ext uri="{BB962C8B-B14F-4D97-AF65-F5344CB8AC3E}">
-        <p14:creationId xmlns:p14="http://schemas.microsoft.com/office/powerpoint/2010/main" val="810456341"/>
+        <p14:creationId xmlns:p14="http://schemas.microsoft.com/office/powerpoint/2010/main" val="2039371253"/>
       </p:ext>
     </p:extLst>
   </p:cSld>
@@ -8067,7 +8098,7 @@
           <p:cNvPr id="2" name="Title 1">
             <a:extLst>
               <a:ext uri="{FF2B5EF4-FFF2-40B4-BE49-F238E27FC236}">
-                <a16:creationId xmlns:a16="http://schemas.microsoft.com/office/drawing/2014/main" id="{1992D947-AC74-53B5-5D6B-12BA87E6572D}"/>
+                <a16:creationId xmlns:a16="http://schemas.microsoft.com/office/drawing/2014/main" id="{3E2365AF-46C2-3616-1532-D71DEC709133}"/>
               </a:ext>
             </a:extLst>
           </p:cNvPr>
@@ -8094,7 +8125,7 @@
             </a:pPr>
             <a:r>
               <a:rPr lang="en-IL" dirty="0"/>
-              <a:t>Architecture - Process</a:t>
+              <a:t>Architecture - Overall</a:t>
             </a:r>
           </a:p>
         </p:txBody>
@@ -8104,7 +8135,7 @@
           <p:cNvPr id="3" name="Content Placeholder 2">
             <a:extLst>
               <a:ext uri="{FF2B5EF4-FFF2-40B4-BE49-F238E27FC236}">
-                <a16:creationId xmlns:a16="http://schemas.microsoft.com/office/drawing/2014/main" id="{16B8136E-200E-3148-DE13-5E3FEC8D9D65}"/>
+                <a16:creationId xmlns:a16="http://schemas.microsoft.com/office/drawing/2014/main" id="{E6EF5898-C934-4F56-A10A-009A01A21DA2}"/>
               </a:ext>
             </a:extLst>
           </p:cNvPr>
@@ -8117,17 +8148,17 @@
         </p:nvSpPr>
         <p:spPr>
           <a:xfrm>
-            <a:off x="659774" y="1794934"/>
-            <a:ext cx="10363826" cy="4614333"/>
+            <a:off x="913774" y="1828800"/>
+            <a:ext cx="10363826" cy="3962399"/>
           </a:xfrm>
         </p:spPr>
         <p:txBody>
           <a:bodyPr>
-            <a:normAutofit fontScale="92500" lnSpcReduction="10000"/>
+            <a:normAutofit/>
           </a:bodyPr>
           <a:lstStyle/>
           <a:p>
-            <a:pPr marL="457200" indent="-457200" algn="l" defTabSz="914400" rtl="0" eaLnBrk="1" latinLnBrk="0" hangingPunct="1">
+            <a:pPr marL="228600" indent="-228600" algn="l" defTabSz="914400" rtl="0" eaLnBrk="1" latinLnBrk="0" hangingPunct="1">
               <a:lnSpc>
                 <a:spcPct val="120000"/>
               </a:lnSpc>
@@ -8137,122 +8168,63 @@
               <a:buClr>
                 <a:schemeClr val="tx1"/>
               </a:buClr>
-              <a:buFont typeface="+mj-lt"/>
-              <a:buAutoNum type="arabicPeriod"/>
+              <a:buFont typeface="Arial" panose="020B0604020202020204" pitchFamily="34" charset="0"/>
+              <a:buChar char="•"/>
             </a:pPr>
             <a:r>
               <a:rPr lang="en-IL" dirty="0"/>
-              <a:t>Load the dataset from a set of CSV files and concatinate them into a Dataframe object</a:t>
-            </a:r>
-          </a:p>
-          <a:p>
-            <a:pPr marL="457200" indent="-457200" algn="l" defTabSz="914400" rtl="0" eaLnBrk="1" latinLnBrk="0" hangingPunct="1">
-              <a:lnSpc>
-                <a:spcPct val="120000"/>
-              </a:lnSpc>
+              <a:t>Runtime environment: We use our laptops as the runtime environment, with the following installed:</a:t>
+            </a:r>
+          </a:p>
+          <a:p>
+            <a:pPr lvl="1" algn="l" rtl="0">
               <a:spcBef>
                 <a:spcPts val="1000"/>
               </a:spcBef>
-              <a:buClr>
-                <a:schemeClr val="tx1"/>
-              </a:buClr>
-              <a:buFont typeface="+mj-lt"/>
-              <a:buAutoNum type="arabicPeriod"/>
             </a:pPr>
             <a:r>
-              <a:rPr lang="en-IL" dirty="0"/>
-              <a:t>By the selected algorithm (LightGBM / ConvAE):</a:t>
-            </a:r>
-          </a:p>
-          <a:p>
-            <a:pPr marL="914400" lvl="1" indent="-457200" algn="l" rtl="0">
+              <a:rPr lang="en-IL" sz="2000" dirty="0"/>
+              <a:t>OS: MacOS M1 / M2 or Windows 10+ supported</a:t>
+            </a:r>
+          </a:p>
+          <a:p>
+            <a:pPr lvl="1" algn="l" rtl="0">
               <a:spcBef>
                 <a:spcPts val="1000"/>
               </a:spcBef>
-              <a:buFont typeface="+mj-lt"/>
-              <a:buAutoNum type="arabicPeriod"/>
             </a:pPr>
             <a:r>
-              <a:rPr lang="en-IL" dirty="0"/>
-              <a:t>Split the dataset into train / valid</a:t>
-            </a:r>
-            <a:r>
-              <a:rPr lang="en-US" dirty="0" err="1"/>
-              <a:t>ation</a:t>
-            </a:r>
-            <a:r>
-              <a:rPr lang="en-IL" dirty="0"/>
-              <a:t> / test sets</a:t>
-            </a:r>
-          </a:p>
-          <a:p>
-            <a:pPr marL="914400" lvl="1" indent="-457200" algn="l" rtl="0">
+              <a:rPr lang="en-IL" sz="2000" dirty="0"/>
+              <a:t>Python 3.11 with Anaconda / Miniconda installed</a:t>
+            </a:r>
+          </a:p>
+          <a:p>
+            <a:pPr lvl="1" algn="l" rtl="0">
               <a:spcBef>
                 <a:spcPts val="1000"/>
               </a:spcBef>
-              <a:buFont typeface="+mj-lt"/>
-              <a:buAutoNum type="arabicPeriod"/>
             </a:pPr>
             <a:r>
-              <a:rPr lang="en-IL" dirty="0"/>
-              <a:t>Run a training using the train set and validate it with the valid set</a:t>
-            </a:r>
-          </a:p>
-          <a:p>
-            <a:pPr marL="914400" lvl="1" indent="-457200" algn="l" rtl="0">
+              <a:rPr lang="en-IL" sz="2000" dirty="0"/>
+              <a:t>The requirements Python packages specified in requirements.txt files installed using pip or conda</a:t>
+            </a:r>
+          </a:p>
+          <a:p>
+            <a:pPr lvl="1" algn="l" rtl="0">
               <a:spcBef>
                 <a:spcPts val="1000"/>
               </a:spcBef>
-              <a:buFont typeface="+mj-lt"/>
-              <a:buAutoNum type="arabicPeriod"/>
             </a:pPr>
             <a:r>
+              <a:rPr lang="en-IL" sz="2000" dirty="0"/>
+              <a:t>In a real scenario the runtime environment should be run on an Instance in the cloud</a:t>
+            </a:r>
+          </a:p>
+          <a:p>
+            <a:pPr algn="l" rtl="0"/>
+            <a:r>
               <a:rPr lang="en-IL" dirty="0"/>
-              <a:t>Make a test using the test set in order to calculate our desired metrics</a:t>
-            </a:r>
-          </a:p>
-          <a:p>
-            <a:pPr marL="457200" indent="-457200" algn="l" rtl="0">
-              <a:buFont typeface="+mj-lt"/>
-              <a:buAutoNum type="arabicPeriod"/>
-            </a:pPr>
-            <a:r>
-              <a:rPr lang="en-IL" dirty="0"/>
-              <a:t>Run a </a:t>
-            </a:r>
-            <a:r>
-              <a:rPr lang="en-US" dirty="0"/>
-              <a:t>FreaAI algorithm based on a single feature of the original dataset and compare between the predicted vs actual test results (In our use-case it’s anomaly)</a:t>
-            </a:r>
-          </a:p>
-          <a:p>
-            <a:pPr marL="457200" indent="-457200" algn="l" rtl="0">
-              <a:buFont typeface="+mj-lt"/>
-              <a:buAutoNum type="arabicPeriod"/>
-            </a:pPr>
-            <a:r>
-              <a:rPr lang="en-US" dirty="0"/>
-              <a:t>Calculate our desired metrics based on the FreaAI algorithm</a:t>
-            </a:r>
-          </a:p>
-          <a:p>
-            <a:pPr marL="457200" indent="-457200" algn="l" rtl="0">
-              <a:buFont typeface="+mj-lt"/>
-              <a:buAutoNum type="arabicPeriod"/>
-            </a:pPr>
-            <a:r>
-              <a:rPr lang="en-US" dirty="0"/>
-              <a:t>Register our model into Databricks platform</a:t>
-            </a:r>
-          </a:p>
-          <a:p>
-            <a:pPr marL="457200" indent="-457200" algn="l" rtl="0">
-              <a:buFont typeface="+mj-lt"/>
-              <a:buAutoNum type="arabicPeriod"/>
-            </a:pPr>
-            <a:r>
-              <a:rPr lang="en-IL" dirty="0"/>
-              <a:t>Load the model from Databricks and make a test using the test set in order to calculate our desired metrics</a:t>
+              <a:t>Model registry: We use Databricks SaaS platform to register and store our trained models. The Databricks platform is hosted in AWS cloud</a:t>
             </a:r>
           </a:p>
         </p:txBody>
@@ -8260,7 +8232,7 @@
     </p:spTree>
     <p:extLst>
       <p:ext uri="{BB962C8B-B14F-4D97-AF65-F5344CB8AC3E}">
-        <p14:creationId xmlns:p14="http://schemas.microsoft.com/office/powerpoint/2010/main" val="1757092679"/>
+        <p14:creationId xmlns:p14="http://schemas.microsoft.com/office/powerpoint/2010/main" val="810456341"/>
       </p:ext>
     </p:extLst>
   </p:cSld>
@@ -8292,7 +8264,7 @@
           <p:cNvPr id="2" name="Title 1">
             <a:extLst>
               <a:ext uri="{FF2B5EF4-FFF2-40B4-BE49-F238E27FC236}">
-                <a16:creationId xmlns:a16="http://schemas.microsoft.com/office/drawing/2014/main" id="{0D2CA2B8-C3E4-9CCB-39B6-3632459C9DBE}"/>
+                <a16:creationId xmlns:a16="http://schemas.microsoft.com/office/drawing/2014/main" id="{1992D947-AC74-53B5-5D6B-12BA87E6572D}"/>
               </a:ext>
             </a:extLst>
           </p:cNvPr>
@@ -8319,7 +8291,7 @@
             </a:pPr>
             <a:r>
               <a:rPr lang="en-IL" dirty="0"/>
-              <a:t>Architecture – MLFlow</a:t>
+              <a:t>Architecture - Process</a:t>
             </a:r>
           </a:p>
         </p:txBody>
@@ -8329,7 +8301,7 @@
           <p:cNvPr id="3" name="Content Placeholder 2">
             <a:extLst>
               <a:ext uri="{FF2B5EF4-FFF2-40B4-BE49-F238E27FC236}">
-                <a16:creationId xmlns:a16="http://schemas.microsoft.com/office/drawing/2014/main" id="{043E4208-15B2-8B64-720E-70C7E9DBB450}"/>
+                <a16:creationId xmlns:a16="http://schemas.microsoft.com/office/drawing/2014/main" id="{16B8136E-200E-3148-DE13-5E3FEC8D9D65}"/>
               </a:ext>
             </a:extLst>
           </p:cNvPr>
@@ -8340,12 +8312,19 @@
             <p:ph sz="quarter" idx="13"/>
           </p:nvPr>
         </p:nvSpPr>
-        <p:spPr/>
-        <p:txBody>
-          <a:bodyPr/>
-          <a:lstStyle/>
-          <a:p>
-            <a:pPr marL="228600" indent="-228600" algn="l" defTabSz="914400" rtl="0" eaLnBrk="1" latinLnBrk="0" hangingPunct="1">
+        <p:spPr>
+          <a:xfrm>
+            <a:off x="659774" y="1794934"/>
+            <a:ext cx="10363826" cy="4614333"/>
+          </a:xfrm>
+        </p:spPr>
+        <p:txBody>
+          <a:bodyPr>
+            <a:normAutofit fontScale="92500" lnSpcReduction="10000"/>
+          </a:bodyPr>
+          <a:lstStyle/>
+          <a:p>
+            <a:pPr marL="457200" indent="-457200" algn="l" defTabSz="914400" rtl="0" eaLnBrk="1" latinLnBrk="0" hangingPunct="1">
               <a:lnSpc>
                 <a:spcPct val="120000"/>
               </a:lnSpc>
@@ -8355,16 +8334,16 @@
               <a:buClr>
                 <a:schemeClr val="tx1"/>
               </a:buClr>
-              <a:buFont typeface="Arial" panose="020B0604020202020204" pitchFamily="34" charset="0"/>
-              <a:buChar char="•"/>
+              <a:buFont typeface="+mj-lt"/>
+              <a:buAutoNum type="arabicPeriod"/>
             </a:pPr>
             <a:r>
               <a:rPr lang="en-IL" dirty="0"/>
-              <a:t>MLFlow is a MLOps library provider by Databricks, a MLOps software company</a:t>
-            </a:r>
-          </a:p>
-          <a:p>
-            <a:pPr marL="228600" indent="-228600" algn="l" defTabSz="914400" rtl="0" eaLnBrk="1" latinLnBrk="0" hangingPunct="1">
+              <a:t>Load the dataset from a set of CSV files and concatinate them into a Dataframe object</a:t>
+            </a:r>
+          </a:p>
+          <a:p>
+            <a:pPr marL="457200" indent="-457200" algn="l" defTabSz="914400" rtl="0" eaLnBrk="1" latinLnBrk="0" hangingPunct="1">
               <a:lnSpc>
                 <a:spcPct val="120000"/>
               </a:lnSpc>
@@ -8374,50 +8353,103 @@
               <a:buClr>
                 <a:schemeClr val="tx1"/>
               </a:buClr>
-              <a:buFont typeface="Arial" panose="020B0604020202020204" pitchFamily="34" charset="0"/>
-              <a:buChar char="•"/>
+              <a:buFont typeface="+mj-lt"/>
+              <a:buAutoNum type="arabicPeriod"/>
             </a:pPr>
             <a:r>
               <a:rPr lang="en-IL" dirty="0"/>
-              <a:t>We use MLFlow to register our trained model in the Databricks cloud SaaS platform</a:t>
-            </a:r>
-          </a:p>
-          <a:p>
-            <a:pPr marL="228600" indent="-228600" algn="l" defTabSz="914400" rtl="0" eaLnBrk="1" latinLnBrk="0" hangingPunct="1">
-              <a:lnSpc>
-                <a:spcPct val="120000"/>
-              </a:lnSpc>
+              <a:t>By the selected algorithm (LightGBM / ConvAE):</a:t>
+            </a:r>
+          </a:p>
+          <a:p>
+            <a:pPr marL="914400" lvl="1" indent="-457200" algn="l" rtl="0">
               <a:spcBef>
                 <a:spcPts val="1000"/>
               </a:spcBef>
-              <a:buClr>
-                <a:schemeClr val="tx1"/>
-              </a:buClr>
-              <a:buFont typeface="Arial" panose="020B0604020202020204" pitchFamily="34" charset="0"/>
-              <a:buChar char="•"/>
+              <a:buFont typeface="+mj-lt"/>
+              <a:buAutoNum type="arabicPeriod"/>
             </a:pPr>
             <a:r>
               <a:rPr lang="en-IL" dirty="0"/>
-              <a:t>Using MLFlow, we can handle versions of the trained model</a:t>
-            </a:r>
-          </a:p>
-          <a:p>
-            <a:pPr marL="228600" indent="-228600" algn="l" defTabSz="914400" rtl="0" eaLnBrk="1" latinLnBrk="0" hangingPunct="1">
-              <a:lnSpc>
-                <a:spcPct val="120000"/>
-              </a:lnSpc>
+              <a:t>Split the dataset into train / valid</a:t>
+            </a:r>
+            <a:r>
+              <a:rPr lang="en-US" dirty="0" err="1"/>
+              <a:t>ation</a:t>
+            </a:r>
+            <a:r>
+              <a:rPr lang="en-IL" dirty="0"/>
+              <a:t> / test sets</a:t>
+            </a:r>
+          </a:p>
+          <a:p>
+            <a:pPr marL="914400" lvl="1" indent="-457200" algn="l" rtl="0">
               <a:spcBef>
                 <a:spcPts val="1000"/>
               </a:spcBef>
-              <a:buClr>
-                <a:schemeClr val="tx1"/>
-              </a:buClr>
-              <a:buFont typeface="Arial" panose="020B0604020202020204" pitchFamily="34" charset="0"/>
-              <a:buChar char="•"/>
+              <a:buFont typeface="+mj-lt"/>
+              <a:buAutoNum type="arabicPeriod"/>
             </a:pPr>
             <a:r>
               <a:rPr lang="en-IL" dirty="0"/>
-              <a:t>In production scenario, we can load the model from the platform and run a prediction against a test set in order to calculate our metrics </a:t>
+              <a:t>Run a training using the train set and validate it with the valid set</a:t>
+            </a:r>
+          </a:p>
+          <a:p>
+            <a:pPr marL="914400" lvl="1" indent="-457200" algn="l" rtl="0">
+              <a:spcBef>
+                <a:spcPts val="1000"/>
+              </a:spcBef>
+              <a:buFont typeface="+mj-lt"/>
+              <a:buAutoNum type="arabicPeriod"/>
+            </a:pPr>
+            <a:r>
+              <a:rPr lang="en-IL" dirty="0"/>
+              <a:t>Make a test using the test set in order to calculate our desired metrics</a:t>
+            </a:r>
+          </a:p>
+          <a:p>
+            <a:pPr marL="457200" indent="-457200" algn="l" rtl="0">
+              <a:buFont typeface="+mj-lt"/>
+              <a:buAutoNum type="arabicPeriod"/>
+            </a:pPr>
+            <a:r>
+              <a:rPr lang="en-IL" dirty="0"/>
+              <a:t>Run a </a:t>
+            </a:r>
+            <a:r>
+              <a:rPr lang="en-US" dirty="0"/>
+              <a:t>FreaAI algorithm based on a single feature of the original dataset and compare between the predicted vs actual test results (In our use-case it’s anomaly)</a:t>
+            </a:r>
+          </a:p>
+          <a:p>
+            <a:pPr marL="457200" indent="-457200" algn="l" rtl="0">
+              <a:buFont typeface="+mj-lt"/>
+              <a:buAutoNum type="arabicPeriod"/>
+            </a:pPr>
+            <a:r>
+              <a:rPr lang="en-US" dirty="0"/>
+              <a:t>Calculate our desired metrics based on the FreaAI algorithm</a:t>
+            </a:r>
+          </a:p>
+          <a:p>
+            <a:pPr marL="457200" indent="-457200" algn="l" rtl="0">
+              <a:buFont typeface="+mj-lt"/>
+              <a:buAutoNum type="arabicPeriod"/>
+            </a:pPr>
+            <a:r>
+              <a:rPr lang="en-US" dirty="0"/>
+              <a:t>Register our model into Databricks platform</a:t>
+            </a:r>
+          </a:p>
+          <a:p>
+            <a:pPr marL="457200" indent="-457200" algn="l" rtl="0">
+              <a:buFont typeface="+mj-lt"/>
+              <a:buAutoNum type="arabicPeriod"/>
+            </a:pPr>
+            <a:r>
+              <a:rPr lang="en-IL" dirty="0"/>
+              <a:t>Load the model from Databricks and make a test using the test set in order to calculate our desired metrics</a:t>
             </a:r>
           </a:p>
         </p:txBody>
@@ -8425,7 +8457,7 @@
     </p:spTree>
     <p:extLst>
       <p:ext uri="{BB962C8B-B14F-4D97-AF65-F5344CB8AC3E}">
-        <p14:creationId xmlns:p14="http://schemas.microsoft.com/office/powerpoint/2010/main" val="1722080921"/>
+        <p14:creationId xmlns:p14="http://schemas.microsoft.com/office/powerpoint/2010/main" val="1757092679"/>
       </p:ext>
     </p:extLst>
   </p:cSld>
@@ -8704,6 +8736,171 @@
 </file>
 
 <file path=ppt/slides/slide20.xml><?xml version="1.0" encoding="utf-8"?>
+<p:sld xmlns:a="http://schemas.openxmlformats.org/drawingml/2006/main" xmlns:r="http://schemas.openxmlformats.org/officeDocument/2006/relationships" xmlns:p="http://schemas.openxmlformats.org/presentationml/2006/main">
+  <p:cSld>
+    <p:spTree>
+      <p:nvGrpSpPr>
+        <p:cNvPr id="1" name=""/>
+        <p:cNvGrpSpPr/>
+        <p:nvPr/>
+      </p:nvGrpSpPr>
+      <p:grpSpPr>
+        <a:xfrm>
+          <a:off x="0" y="0"/>
+          <a:ext cx="0" cy="0"/>
+          <a:chOff x="0" y="0"/>
+          <a:chExt cx="0" cy="0"/>
+        </a:xfrm>
+      </p:grpSpPr>
+      <p:sp>
+        <p:nvSpPr>
+          <p:cNvPr id="2" name="Title 1">
+            <a:extLst>
+              <a:ext uri="{FF2B5EF4-FFF2-40B4-BE49-F238E27FC236}">
+                <a16:creationId xmlns:a16="http://schemas.microsoft.com/office/drawing/2014/main" id="{0D2CA2B8-C3E4-9CCB-39B6-3632459C9DBE}"/>
+              </a:ext>
+            </a:extLst>
+          </p:cNvPr>
+          <p:cNvSpPr>
+            <a:spLocks noGrp="1"/>
+          </p:cNvSpPr>
+          <p:nvPr>
+            <p:ph type="title"/>
+          </p:nvPr>
+        </p:nvSpPr>
+        <p:spPr/>
+        <p:txBody>
+          <a:bodyPr/>
+          <a:lstStyle/>
+          <a:p>
+            <a:pPr algn="ctr" defTabSz="914400" rtl="0" eaLnBrk="1" latinLnBrk="0" hangingPunct="1">
+              <a:lnSpc>
+                <a:spcPct val="90000"/>
+              </a:lnSpc>
+              <a:spcBef>
+                <a:spcPct val="0"/>
+              </a:spcBef>
+              <a:buNone/>
+            </a:pPr>
+            <a:r>
+              <a:rPr lang="en-IL" dirty="0"/>
+              <a:t>Architecture – MLFlow</a:t>
+            </a:r>
+          </a:p>
+        </p:txBody>
+      </p:sp>
+      <p:sp>
+        <p:nvSpPr>
+          <p:cNvPr id="3" name="Content Placeholder 2">
+            <a:extLst>
+              <a:ext uri="{FF2B5EF4-FFF2-40B4-BE49-F238E27FC236}">
+                <a16:creationId xmlns:a16="http://schemas.microsoft.com/office/drawing/2014/main" id="{043E4208-15B2-8B64-720E-70C7E9DBB450}"/>
+              </a:ext>
+            </a:extLst>
+          </p:cNvPr>
+          <p:cNvSpPr>
+            <a:spLocks noGrp="1"/>
+          </p:cNvSpPr>
+          <p:nvPr>
+            <p:ph sz="quarter" idx="13"/>
+          </p:nvPr>
+        </p:nvSpPr>
+        <p:spPr/>
+        <p:txBody>
+          <a:bodyPr/>
+          <a:lstStyle/>
+          <a:p>
+            <a:pPr marL="228600" indent="-228600" algn="l" defTabSz="914400" rtl="0" eaLnBrk="1" latinLnBrk="0" hangingPunct="1">
+              <a:lnSpc>
+                <a:spcPct val="120000"/>
+              </a:lnSpc>
+              <a:spcBef>
+                <a:spcPts val="1000"/>
+              </a:spcBef>
+              <a:buClr>
+                <a:schemeClr val="tx1"/>
+              </a:buClr>
+              <a:buFont typeface="Arial" panose="020B0604020202020204" pitchFamily="34" charset="0"/>
+              <a:buChar char="•"/>
+            </a:pPr>
+            <a:r>
+              <a:rPr lang="en-IL" dirty="0"/>
+              <a:t>MLFlow is a MLOps library provider by Databricks, a MLOps software company</a:t>
+            </a:r>
+          </a:p>
+          <a:p>
+            <a:pPr marL="228600" indent="-228600" algn="l" defTabSz="914400" rtl="0" eaLnBrk="1" latinLnBrk="0" hangingPunct="1">
+              <a:lnSpc>
+                <a:spcPct val="120000"/>
+              </a:lnSpc>
+              <a:spcBef>
+                <a:spcPts val="1000"/>
+              </a:spcBef>
+              <a:buClr>
+                <a:schemeClr val="tx1"/>
+              </a:buClr>
+              <a:buFont typeface="Arial" panose="020B0604020202020204" pitchFamily="34" charset="0"/>
+              <a:buChar char="•"/>
+            </a:pPr>
+            <a:r>
+              <a:rPr lang="en-IL" dirty="0"/>
+              <a:t>We use MLFlow to register our trained model in the Databricks cloud SaaS platform</a:t>
+            </a:r>
+          </a:p>
+          <a:p>
+            <a:pPr marL="228600" indent="-228600" algn="l" defTabSz="914400" rtl="0" eaLnBrk="1" latinLnBrk="0" hangingPunct="1">
+              <a:lnSpc>
+                <a:spcPct val="120000"/>
+              </a:lnSpc>
+              <a:spcBef>
+                <a:spcPts val="1000"/>
+              </a:spcBef>
+              <a:buClr>
+                <a:schemeClr val="tx1"/>
+              </a:buClr>
+              <a:buFont typeface="Arial" panose="020B0604020202020204" pitchFamily="34" charset="0"/>
+              <a:buChar char="•"/>
+            </a:pPr>
+            <a:r>
+              <a:rPr lang="en-IL" dirty="0"/>
+              <a:t>Using MLFlow, we can handle versions of the trained model</a:t>
+            </a:r>
+          </a:p>
+          <a:p>
+            <a:pPr marL="228600" indent="-228600" algn="l" defTabSz="914400" rtl="0" eaLnBrk="1" latinLnBrk="0" hangingPunct="1">
+              <a:lnSpc>
+                <a:spcPct val="120000"/>
+              </a:lnSpc>
+              <a:spcBef>
+                <a:spcPts val="1000"/>
+              </a:spcBef>
+              <a:buClr>
+                <a:schemeClr val="tx1"/>
+              </a:buClr>
+              <a:buFont typeface="Arial" panose="020B0604020202020204" pitchFamily="34" charset="0"/>
+              <a:buChar char="•"/>
+            </a:pPr>
+            <a:r>
+              <a:rPr lang="en-IL" dirty="0"/>
+              <a:t>In production scenario, we can load the model from the platform and run a prediction against a test set in order to calculate our metrics </a:t>
+            </a:r>
+          </a:p>
+        </p:txBody>
+      </p:sp>
+    </p:spTree>
+    <p:extLst>
+      <p:ext uri="{BB962C8B-B14F-4D97-AF65-F5344CB8AC3E}">
+        <p14:creationId xmlns:p14="http://schemas.microsoft.com/office/powerpoint/2010/main" val="1722080921"/>
+      </p:ext>
+    </p:extLst>
+  </p:cSld>
+  <p:clrMapOvr>
+    <a:masterClrMapping/>
+  </p:clrMapOvr>
+</p:sld>
+</file>
+
+<file path=ppt/slides/slide21.xml><?xml version="1.0" encoding="utf-8"?>
 <p:sld xmlns:a="http://schemas.openxmlformats.org/drawingml/2006/main" xmlns:r="http://schemas.openxmlformats.org/officeDocument/2006/relationships" xmlns:p="http://schemas.openxmlformats.org/presentationml/2006/main">
   <p:cSld>
     <p:spTree>
@@ -8800,7 +8997,7 @@
 </p:sld>
 </file>
 
-<file path=ppt/slides/slide21.xml><?xml version="1.0" encoding="utf-8"?>
+<file path=ppt/slides/slide22.xml><?xml version="1.0" encoding="utf-8"?>
 <p:sld xmlns:a="http://schemas.openxmlformats.org/drawingml/2006/main" xmlns:r="http://schemas.openxmlformats.org/officeDocument/2006/relationships" xmlns:p="http://schemas.openxmlformats.org/presentationml/2006/main">
   <p:cSld>
     <p:spTree>
@@ -8897,92 +9094,6 @@
 </p:sld>
 </file>
 
-<file path=ppt/slides/slide22.xml><?xml version="1.0" encoding="utf-8"?>
-<p:sld xmlns:a="http://schemas.openxmlformats.org/drawingml/2006/main" xmlns:r="http://schemas.openxmlformats.org/officeDocument/2006/relationships" xmlns:p="http://schemas.openxmlformats.org/presentationml/2006/main">
-  <p:cSld>
-    <p:spTree>
-      <p:nvGrpSpPr>
-        <p:cNvPr id="1" name=""/>
-        <p:cNvGrpSpPr/>
-        <p:nvPr/>
-      </p:nvGrpSpPr>
-      <p:grpSpPr>
-        <a:xfrm>
-          <a:off x="0" y="0"/>
-          <a:ext cx="0" cy="0"/>
-          <a:chOff x="0" y="0"/>
-          <a:chExt cx="0" cy="0"/>
-        </a:xfrm>
-      </p:grpSpPr>
-      <p:sp>
-        <p:nvSpPr>
-          <p:cNvPr id="4" name="Title 3">
-            <a:extLst>
-              <a:ext uri="{FF2B5EF4-FFF2-40B4-BE49-F238E27FC236}">
-                <a16:creationId xmlns:a16="http://schemas.microsoft.com/office/drawing/2014/main" id="{0164B796-02E6-2CF2-AD58-6BA0FF61E8C3}"/>
-              </a:ext>
-            </a:extLst>
-          </p:cNvPr>
-          <p:cNvSpPr>
-            <a:spLocks noGrp="1"/>
-          </p:cNvSpPr>
-          <p:nvPr>
-            <p:ph type="title"/>
-          </p:nvPr>
-        </p:nvSpPr>
-        <p:spPr/>
-        <p:txBody>
-          <a:bodyPr/>
-          <a:lstStyle/>
-          <a:p>
-            <a:pPr rtl="0"/>
-            <a:r>
-              <a:rPr lang="en-US" cap="all" dirty="0"/>
-              <a:t>DEMO</a:t>
-            </a:r>
-            <a:endParaRPr lang="he-IL" cap="all" dirty="0"/>
-          </a:p>
-        </p:txBody>
-      </p:sp>
-      <p:sp>
-        <p:nvSpPr>
-          <p:cNvPr id="5" name="Text Placeholder 4">
-            <a:extLst>
-              <a:ext uri="{FF2B5EF4-FFF2-40B4-BE49-F238E27FC236}">
-                <a16:creationId xmlns:a16="http://schemas.microsoft.com/office/drawing/2014/main" id="{49087E06-C5E1-41C3-1F28-1C6A2EEE3E22}"/>
-              </a:ext>
-            </a:extLst>
-          </p:cNvPr>
-          <p:cNvSpPr>
-            <a:spLocks noGrp="1"/>
-          </p:cNvSpPr>
-          <p:nvPr>
-            <p:ph type="body" idx="1"/>
-          </p:nvPr>
-        </p:nvSpPr>
-        <p:spPr/>
-        <p:txBody>
-          <a:bodyPr/>
-          <a:lstStyle/>
-          <a:p>
-            <a:pPr rtl="0"/>
-            <a:endParaRPr lang="he-IL" dirty="0"/>
-          </a:p>
-        </p:txBody>
-      </p:sp>
-    </p:spTree>
-    <p:extLst>
-      <p:ext uri="{BB962C8B-B14F-4D97-AF65-F5344CB8AC3E}">
-        <p14:creationId xmlns:p14="http://schemas.microsoft.com/office/powerpoint/2010/main" val="3522007243"/>
-      </p:ext>
-    </p:extLst>
-  </p:cSld>
-  <p:clrMapOvr>
-    <a:masterClrMapping/>
-  </p:clrMapOvr>
-</p:sld>
-</file>
-
 <file path=ppt/slides/slide23.xml><?xml version="1.0" encoding="utf-8"?>
 <p:sld xmlns:a="http://schemas.openxmlformats.org/drawingml/2006/main" xmlns:r="http://schemas.openxmlformats.org/officeDocument/2006/relationships" xmlns:p="http://schemas.openxmlformats.org/presentationml/2006/main">
   <p:cSld>
@@ -9024,7 +9135,7 @@
             <a:pPr rtl="0"/>
             <a:r>
               <a:rPr lang="en-US" cap="all" dirty="0"/>
-              <a:t>THE report</a:t>
+              <a:t>DEMO</a:t>
             </a:r>
             <a:endParaRPr lang="he-IL" cap="all" dirty="0"/>
           </a:p>
@@ -9059,7 +9170,7 @@
     </p:spTree>
     <p:extLst>
       <p:ext uri="{BB962C8B-B14F-4D97-AF65-F5344CB8AC3E}">
-        <p14:creationId xmlns:p14="http://schemas.microsoft.com/office/powerpoint/2010/main" val="3978710713"/>
+        <p14:creationId xmlns:p14="http://schemas.microsoft.com/office/powerpoint/2010/main" val="3522007243"/>
       </p:ext>
     </p:extLst>
   </p:cSld>
@@ -9091,7 +9202,7 @@
           <p:cNvPr id="4" name="Title 3">
             <a:extLst>
               <a:ext uri="{FF2B5EF4-FFF2-40B4-BE49-F238E27FC236}">
-                <a16:creationId xmlns:a16="http://schemas.microsoft.com/office/drawing/2014/main" id="{6D5488FF-F6DF-42CF-C78C-A0BBBAECD472}"/>
+                <a16:creationId xmlns:a16="http://schemas.microsoft.com/office/drawing/2014/main" id="{0164B796-02E6-2CF2-AD58-6BA0FF61E8C3}"/>
               </a:ext>
             </a:extLst>
           </p:cNvPr>
@@ -9107,7 +9218,98 @@
           <a:bodyPr/>
           <a:lstStyle/>
           <a:p>
-            <a:endParaRPr lang="he-IL"/>
+            <a:pPr rtl="0"/>
+            <a:r>
+              <a:rPr lang="en-US" cap="all" dirty="0"/>
+              <a:t>THE report</a:t>
+            </a:r>
+            <a:endParaRPr lang="he-IL" cap="all" dirty="0"/>
+          </a:p>
+        </p:txBody>
+      </p:sp>
+      <p:sp>
+        <p:nvSpPr>
+          <p:cNvPr id="5" name="Text Placeholder 4">
+            <a:extLst>
+              <a:ext uri="{FF2B5EF4-FFF2-40B4-BE49-F238E27FC236}">
+                <a16:creationId xmlns:a16="http://schemas.microsoft.com/office/drawing/2014/main" id="{49087E06-C5E1-41C3-1F28-1C6A2EEE3E22}"/>
+              </a:ext>
+            </a:extLst>
+          </p:cNvPr>
+          <p:cNvSpPr>
+            <a:spLocks noGrp="1"/>
+          </p:cNvSpPr>
+          <p:nvPr>
+            <p:ph type="body" idx="1"/>
+          </p:nvPr>
+        </p:nvSpPr>
+        <p:spPr/>
+        <p:txBody>
+          <a:bodyPr/>
+          <a:lstStyle/>
+          <a:p>
+            <a:pPr rtl="0"/>
+            <a:endParaRPr lang="he-IL" dirty="0"/>
+          </a:p>
+        </p:txBody>
+      </p:sp>
+    </p:spTree>
+    <p:extLst>
+      <p:ext uri="{BB962C8B-B14F-4D97-AF65-F5344CB8AC3E}">
+        <p14:creationId xmlns:p14="http://schemas.microsoft.com/office/powerpoint/2010/main" val="3978710713"/>
+      </p:ext>
+    </p:extLst>
+  </p:cSld>
+  <p:clrMapOvr>
+    <a:masterClrMapping/>
+  </p:clrMapOvr>
+</p:sld>
+</file>
+
+<file path=ppt/slides/slide25.xml><?xml version="1.0" encoding="utf-8"?>
+<p:sld xmlns:a="http://schemas.openxmlformats.org/drawingml/2006/main" xmlns:r="http://schemas.openxmlformats.org/officeDocument/2006/relationships" xmlns:p="http://schemas.openxmlformats.org/presentationml/2006/main">
+  <p:cSld>
+    <p:spTree>
+      <p:nvGrpSpPr>
+        <p:cNvPr id="1" name=""/>
+        <p:cNvGrpSpPr/>
+        <p:nvPr/>
+      </p:nvGrpSpPr>
+      <p:grpSpPr>
+        <a:xfrm>
+          <a:off x="0" y="0"/>
+          <a:ext cx="0" cy="0"/>
+          <a:chOff x="0" y="0"/>
+          <a:chExt cx="0" cy="0"/>
+        </a:xfrm>
+      </p:grpSpPr>
+      <p:sp>
+        <p:nvSpPr>
+          <p:cNvPr id="4" name="Title 3">
+            <a:extLst>
+              <a:ext uri="{FF2B5EF4-FFF2-40B4-BE49-F238E27FC236}">
+                <a16:creationId xmlns:a16="http://schemas.microsoft.com/office/drawing/2014/main" id="{6D5488FF-F6DF-42CF-C78C-A0BBBAECD472}"/>
+              </a:ext>
+            </a:extLst>
+          </p:cNvPr>
+          <p:cNvSpPr>
+            <a:spLocks noGrp="1"/>
+          </p:cNvSpPr>
+          <p:nvPr>
+            <p:ph type="title"/>
+          </p:nvPr>
+        </p:nvSpPr>
+        <p:spPr/>
+        <p:txBody>
+          <a:bodyPr/>
+          <a:lstStyle/>
+          <a:p>
+            <a:pPr rtl="0"/>
+            <a:r>
+              <a:rPr lang="en-US" dirty="0"/>
+              <a:t>Summary and notes</a:t>
+            </a:r>
+            <a:endParaRPr lang="he-IL" dirty="0"/>
           </a:p>
         </p:txBody>
       </p:sp>
@@ -9135,7 +9337,7 @@
             <a:pPr algn="l" rtl="0"/>
             <a:r>
               <a:rPr lang="en-US" dirty="0"/>
-              <a:t>&lt;Insert reports for each model – 2 slides?&gt;</a:t>
+              <a:t>3 graphs</a:t>
             </a:r>
             <a:endParaRPr lang="he-IL" dirty="0"/>
           </a:p>
@@ -9154,7 +9356,211 @@
 </p:sld>
 </file>
 
-<file path=ppt/slides/slide25.xml><?xml version="1.0" encoding="utf-8"?>
+<file path=ppt/slides/slide26.xml><?xml version="1.0" encoding="utf-8"?>
+<p:sld xmlns:a="http://schemas.openxmlformats.org/drawingml/2006/main" xmlns:r="http://schemas.openxmlformats.org/officeDocument/2006/relationships" xmlns:p="http://schemas.openxmlformats.org/presentationml/2006/main">
+  <p:cSld>
+    <p:spTree>
+      <p:nvGrpSpPr>
+        <p:cNvPr id="1" name="">
+          <a:extLst>
+            <a:ext uri="{FF2B5EF4-FFF2-40B4-BE49-F238E27FC236}">
+              <a16:creationId xmlns:a16="http://schemas.microsoft.com/office/drawing/2014/main" id="{BA8B3184-D034-C81C-72FF-EB3F29328628}"/>
+            </a:ext>
+          </a:extLst>
+        </p:cNvPr>
+        <p:cNvGrpSpPr/>
+        <p:nvPr/>
+      </p:nvGrpSpPr>
+      <p:grpSpPr>
+        <a:xfrm>
+          <a:off x="0" y="0"/>
+          <a:ext cx="0" cy="0"/>
+          <a:chOff x="0" y="0"/>
+          <a:chExt cx="0" cy="0"/>
+        </a:xfrm>
+      </p:grpSpPr>
+      <p:sp>
+        <p:nvSpPr>
+          <p:cNvPr id="4" name="Title 3">
+            <a:extLst>
+              <a:ext uri="{FF2B5EF4-FFF2-40B4-BE49-F238E27FC236}">
+                <a16:creationId xmlns:a16="http://schemas.microsoft.com/office/drawing/2014/main" id="{B9796361-33EB-EEDC-7251-C77943B87D2B}"/>
+              </a:ext>
+            </a:extLst>
+          </p:cNvPr>
+          <p:cNvSpPr>
+            <a:spLocks noGrp="1"/>
+          </p:cNvSpPr>
+          <p:nvPr>
+            <p:ph type="title"/>
+          </p:nvPr>
+        </p:nvSpPr>
+        <p:spPr/>
+        <p:txBody>
+          <a:bodyPr/>
+          <a:lstStyle/>
+          <a:p>
+            <a:pPr rtl="0"/>
+            <a:endParaRPr lang="he-IL" dirty="0"/>
+          </a:p>
+        </p:txBody>
+      </p:sp>
+      <p:sp>
+        <p:nvSpPr>
+          <p:cNvPr id="5" name="Content Placeholder 4">
+            <a:extLst>
+              <a:ext uri="{FF2B5EF4-FFF2-40B4-BE49-F238E27FC236}">
+                <a16:creationId xmlns:a16="http://schemas.microsoft.com/office/drawing/2014/main" id="{208A68BF-ECEA-6C77-B7B0-557477171E7F}"/>
+              </a:ext>
+            </a:extLst>
+          </p:cNvPr>
+          <p:cNvSpPr>
+            <a:spLocks noGrp="1"/>
+          </p:cNvSpPr>
+          <p:nvPr>
+            <p:ph sz="quarter" idx="13"/>
+          </p:nvPr>
+        </p:nvSpPr>
+        <p:spPr/>
+        <p:txBody>
+          <a:bodyPr/>
+          <a:lstStyle/>
+          <a:p>
+            <a:pPr algn="l" rtl="0"/>
+            <a:r>
+              <a:rPr lang="en-US" dirty="0"/>
+              <a:t>The potential improvement we got using our modification is less than original FreaAI</a:t>
+            </a:r>
+          </a:p>
+          <a:p>
+            <a:pPr marL="0" indent="0" algn="l" rtl="0">
+              <a:buNone/>
+            </a:pPr>
+            <a:r>
+              <a:rPr lang="en-US" dirty="0"/>
+              <a:t>&lt;add 2</a:t>
+            </a:r>
+            <a:r>
+              <a:rPr lang="en-US" baseline="30000" dirty="0"/>
+              <a:t>nd</a:t>
+            </a:r>
+            <a:r>
+              <a:rPr lang="en-US" dirty="0"/>
+              <a:t> couple of trees&gt;</a:t>
+            </a:r>
+          </a:p>
+          <a:p>
+            <a:pPr algn="l" rtl="0"/>
+            <a:r>
+              <a:rPr lang="en-US" dirty="0"/>
+              <a:t>The modified decision tree splits better </a:t>
+            </a:r>
+          </a:p>
+          <a:p>
+            <a:pPr algn="l" rtl="0"/>
+            <a:r>
+              <a:rPr lang="en-US" dirty="0"/>
+              <a:t>Number of samples per node is large and therefore many nodes were dropped</a:t>
+            </a:r>
+            <a:endParaRPr lang="he-IL" dirty="0"/>
+          </a:p>
+        </p:txBody>
+      </p:sp>
+    </p:spTree>
+    <p:extLst>
+      <p:ext uri="{BB962C8B-B14F-4D97-AF65-F5344CB8AC3E}">
+        <p14:creationId xmlns:p14="http://schemas.microsoft.com/office/powerpoint/2010/main" val="2258968697"/>
+      </p:ext>
+    </p:extLst>
+  </p:cSld>
+  <p:clrMapOvr>
+    <a:masterClrMapping/>
+  </p:clrMapOvr>
+</p:sld>
+</file>
+
+<file path=ppt/slides/slide27.xml><?xml version="1.0" encoding="utf-8"?>
+<p:sld xmlns:a="http://schemas.openxmlformats.org/drawingml/2006/main" xmlns:r="http://schemas.openxmlformats.org/officeDocument/2006/relationships" xmlns:p="http://schemas.openxmlformats.org/presentationml/2006/main">
+  <p:cSld>
+    <p:spTree>
+      <p:nvGrpSpPr>
+        <p:cNvPr id="1" name=""/>
+        <p:cNvGrpSpPr/>
+        <p:nvPr/>
+      </p:nvGrpSpPr>
+      <p:grpSpPr>
+        <a:xfrm>
+          <a:off x="0" y="0"/>
+          <a:ext cx="0" cy="0"/>
+          <a:chOff x="0" y="0"/>
+          <a:chExt cx="0" cy="0"/>
+        </a:xfrm>
+      </p:grpSpPr>
+      <p:sp>
+        <p:nvSpPr>
+          <p:cNvPr id="2" name="Title 1">
+            <a:extLst>
+              <a:ext uri="{FF2B5EF4-FFF2-40B4-BE49-F238E27FC236}">
+                <a16:creationId xmlns:a16="http://schemas.microsoft.com/office/drawing/2014/main" id="{A3801608-5897-3518-0AA7-31219D68B2E2}"/>
+              </a:ext>
+            </a:extLst>
+          </p:cNvPr>
+          <p:cNvSpPr>
+            <a:spLocks noGrp="1"/>
+          </p:cNvSpPr>
+          <p:nvPr>
+            <p:ph type="title"/>
+          </p:nvPr>
+        </p:nvSpPr>
+        <p:spPr/>
+        <p:txBody>
+          <a:bodyPr/>
+          <a:lstStyle/>
+          <a:p>
+            <a:endParaRPr lang="he-IL"/>
+          </a:p>
+        </p:txBody>
+      </p:sp>
+      <p:sp>
+        <p:nvSpPr>
+          <p:cNvPr id="3" name="Content Placeholder 2">
+            <a:extLst>
+              <a:ext uri="{FF2B5EF4-FFF2-40B4-BE49-F238E27FC236}">
+                <a16:creationId xmlns:a16="http://schemas.microsoft.com/office/drawing/2014/main" id="{05B2259C-E6D9-7174-2A6C-F29C9E807E58}"/>
+              </a:ext>
+            </a:extLst>
+          </p:cNvPr>
+          <p:cNvSpPr>
+            <a:spLocks noGrp="1"/>
+          </p:cNvSpPr>
+          <p:nvPr>
+            <p:ph sz="quarter" idx="13"/>
+          </p:nvPr>
+        </p:nvSpPr>
+        <p:spPr/>
+        <p:txBody>
+          <a:bodyPr/>
+          <a:lstStyle/>
+          <a:p>
+            <a:pPr algn="l" rtl="0"/>
+            <a:endParaRPr lang="he-IL" dirty="0"/>
+          </a:p>
+        </p:txBody>
+      </p:sp>
+    </p:spTree>
+    <p:extLst>
+      <p:ext uri="{BB962C8B-B14F-4D97-AF65-F5344CB8AC3E}">
+        <p14:creationId xmlns:p14="http://schemas.microsoft.com/office/powerpoint/2010/main" val="3373937242"/>
+      </p:ext>
+    </p:extLst>
+  </p:cSld>
+  <p:clrMapOvr>
+    <a:masterClrMapping/>
+  </p:clrMapOvr>
+</p:sld>
+</file>
+
+<file path=ppt/slides/slide28.xml><?xml version="1.0" encoding="utf-8"?>
 <p:sld xmlns:a="http://schemas.openxmlformats.org/drawingml/2006/main" xmlns:r="http://schemas.openxmlformats.org/officeDocument/2006/relationships" xmlns:p="http://schemas.openxmlformats.org/presentationml/2006/main">
   <p:cSld>
     <p:bg>
@@ -9562,7 +9968,7 @@
 </p:sld>
 </file>
 
-<file path=ppt/slides/slide26.xml><?xml version="1.0" encoding="utf-8"?>
+<file path=ppt/slides/slide29.xml><?xml version="1.0" encoding="utf-8"?>
 <p:sld xmlns:a="http://schemas.openxmlformats.org/drawingml/2006/main" xmlns:r="http://schemas.openxmlformats.org/officeDocument/2006/relationships" xmlns:p="http://schemas.openxmlformats.org/presentationml/2006/main">
   <p:cSld>
     <p:spTree>
@@ -9690,7 +10096,100 @@
 </p:sld>
 </file>
 
-<file path=ppt/slides/slide27.xml><?xml version="1.0" encoding="utf-8"?>
+<file path=ppt/slides/slide3.xml><?xml version="1.0" encoding="utf-8"?>
+<p:sld xmlns:a="http://schemas.openxmlformats.org/drawingml/2006/main" xmlns:r="http://schemas.openxmlformats.org/officeDocument/2006/relationships" xmlns:p="http://schemas.openxmlformats.org/presentationml/2006/main">
+  <p:cSld>
+    <p:spTree>
+      <p:nvGrpSpPr>
+        <p:cNvPr id="1" name=""/>
+        <p:cNvGrpSpPr/>
+        <p:nvPr/>
+      </p:nvGrpSpPr>
+      <p:grpSpPr>
+        <a:xfrm>
+          <a:off x="0" y="0"/>
+          <a:ext cx="0" cy="0"/>
+          <a:chOff x="0" y="0"/>
+          <a:chExt cx="0" cy="0"/>
+        </a:xfrm>
+      </p:grpSpPr>
+      <p:sp>
+        <p:nvSpPr>
+          <p:cNvPr id="4" name="Title 3">
+            <a:extLst>
+              <a:ext uri="{FF2B5EF4-FFF2-40B4-BE49-F238E27FC236}">
+                <a16:creationId xmlns:a16="http://schemas.microsoft.com/office/drawing/2014/main" id="{0164B796-02E6-2CF2-AD58-6BA0FF61E8C3}"/>
+              </a:ext>
+            </a:extLst>
+          </p:cNvPr>
+          <p:cNvSpPr>
+            <a:spLocks noGrp="1"/>
+          </p:cNvSpPr>
+          <p:nvPr>
+            <p:ph type="title"/>
+          </p:nvPr>
+        </p:nvSpPr>
+        <p:spPr/>
+        <p:txBody>
+          <a:bodyPr/>
+          <a:lstStyle/>
+          <a:p>
+            <a:pPr rtl="0"/>
+            <a:r>
+              <a:rPr lang="en-US" cap="all" dirty="0"/>
+              <a:t>From business OBJECTIVE –</a:t>
+            </a:r>
+            <a:br>
+              <a:rPr lang="en-US" cap="all" dirty="0"/>
+            </a:br>
+            <a:r>
+              <a:rPr lang="en-US" cap="all" dirty="0"/>
+              <a:t>to TECHNICAL metrics</a:t>
+            </a:r>
+            <a:endParaRPr lang="he-IL" cap="all" dirty="0"/>
+          </a:p>
+        </p:txBody>
+      </p:sp>
+      <p:sp>
+        <p:nvSpPr>
+          <p:cNvPr id="5" name="Text Placeholder 4">
+            <a:extLst>
+              <a:ext uri="{FF2B5EF4-FFF2-40B4-BE49-F238E27FC236}">
+                <a16:creationId xmlns:a16="http://schemas.microsoft.com/office/drawing/2014/main" id="{49087E06-C5E1-41C3-1F28-1C6A2EEE3E22}"/>
+              </a:ext>
+            </a:extLst>
+          </p:cNvPr>
+          <p:cNvSpPr>
+            <a:spLocks noGrp="1"/>
+          </p:cNvSpPr>
+          <p:nvPr>
+            <p:ph type="body" idx="1"/>
+          </p:nvPr>
+        </p:nvSpPr>
+        <p:spPr/>
+        <p:txBody>
+          <a:bodyPr/>
+          <a:lstStyle/>
+          <a:p>
+            <a:pPr rtl="0"/>
+            <a:endParaRPr lang="he-IL" dirty="0"/>
+          </a:p>
+        </p:txBody>
+      </p:sp>
+    </p:spTree>
+    <p:extLst>
+      <p:ext uri="{BB962C8B-B14F-4D97-AF65-F5344CB8AC3E}">
+        <p14:creationId xmlns:p14="http://schemas.microsoft.com/office/powerpoint/2010/main" val="3030595227"/>
+      </p:ext>
+    </p:extLst>
+  </p:cSld>
+  <p:clrMapOvr>
+    <a:masterClrMapping/>
+  </p:clrMapOvr>
+</p:sld>
+</file>
+
+<file path=ppt/slides/slide30.xml><?xml version="1.0" encoding="utf-8"?>
 <p:sld xmlns:a="http://schemas.openxmlformats.org/drawingml/2006/main" xmlns:r="http://schemas.openxmlformats.org/officeDocument/2006/relationships" xmlns:p="http://schemas.openxmlformats.org/presentationml/2006/main">
   <p:cSld>
     <p:bg>
@@ -10058,99 +10557,6 @@
 </p:sld>
 </file>
 
-<file path=ppt/slides/slide3.xml><?xml version="1.0" encoding="utf-8"?>
-<p:sld xmlns:a="http://schemas.openxmlformats.org/drawingml/2006/main" xmlns:r="http://schemas.openxmlformats.org/officeDocument/2006/relationships" xmlns:p="http://schemas.openxmlformats.org/presentationml/2006/main">
-  <p:cSld>
-    <p:spTree>
-      <p:nvGrpSpPr>
-        <p:cNvPr id="1" name=""/>
-        <p:cNvGrpSpPr/>
-        <p:nvPr/>
-      </p:nvGrpSpPr>
-      <p:grpSpPr>
-        <a:xfrm>
-          <a:off x="0" y="0"/>
-          <a:ext cx="0" cy="0"/>
-          <a:chOff x="0" y="0"/>
-          <a:chExt cx="0" cy="0"/>
-        </a:xfrm>
-      </p:grpSpPr>
-      <p:sp>
-        <p:nvSpPr>
-          <p:cNvPr id="4" name="Title 3">
-            <a:extLst>
-              <a:ext uri="{FF2B5EF4-FFF2-40B4-BE49-F238E27FC236}">
-                <a16:creationId xmlns:a16="http://schemas.microsoft.com/office/drawing/2014/main" id="{0164B796-02E6-2CF2-AD58-6BA0FF61E8C3}"/>
-              </a:ext>
-            </a:extLst>
-          </p:cNvPr>
-          <p:cNvSpPr>
-            <a:spLocks noGrp="1"/>
-          </p:cNvSpPr>
-          <p:nvPr>
-            <p:ph type="title"/>
-          </p:nvPr>
-        </p:nvSpPr>
-        <p:spPr/>
-        <p:txBody>
-          <a:bodyPr/>
-          <a:lstStyle/>
-          <a:p>
-            <a:pPr rtl="0"/>
-            <a:r>
-              <a:rPr lang="en-US" cap="all" dirty="0"/>
-              <a:t>From business OBJECTIVE –</a:t>
-            </a:r>
-            <a:br>
-              <a:rPr lang="en-US" cap="all" dirty="0"/>
-            </a:br>
-            <a:r>
-              <a:rPr lang="en-US" cap="all" dirty="0"/>
-              <a:t>to TECHNICAL metrics</a:t>
-            </a:r>
-            <a:endParaRPr lang="he-IL" cap="all" dirty="0"/>
-          </a:p>
-        </p:txBody>
-      </p:sp>
-      <p:sp>
-        <p:nvSpPr>
-          <p:cNvPr id="5" name="Text Placeholder 4">
-            <a:extLst>
-              <a:ext uri="{FF2B5EF4-FFF2-40B4-BE49-F238E27FC236}">
-                <a16:creationId xmlns:a16="http://schemas.microsoft.com/office/drawing/2014/main" id="{49087E06-C5E1-41C3-1F28-1C6A2EEE3E22}"/>
-              </a:ext>
-            </a:extLst>
-          </p:cNvPr>
-          <p:cNvSpPr>
-            <a:spLocks noGrp="1"/>
-          </p:cNvSpPr>
-          <p:nvPr>
-            <p:ph type="body" idx="1"/>
-          </p:nvPr>
-        </p:nvSpPr>
-        <p:spPr/>
-        <p:txBody>
-          <a:bodyPr/>
-          <a:lstStyle/>
-          <a:p>
-            <a:pPr rtl="0"/>
-            <a:endParaRPr lang="he-IL" dirty="0"/>
-          </a:p>
-        </p:txBody>
-      </p:sp>
-    </p:spTree>
-    <p:extLst>
-      <p:ext uri="{BB962C8B-B14F-4D97-AF65-F5344CB8AC3E}">
-        <p14:creationId xmlns:p14="http://schemas.microsoft.com/office/powerpoint/2010/main" val="3030595227"/>
-      </p:ext>
-    </p:extLst>
-  </p:cSld>
-  <p:clrMapOvr>
-    <a:masterClrMapping/>
-  </p:clrMapOvr>
-</p:sld>
-</file>
-
 <file path=ppt/slides/slide4.xml><?xml version="1.0" encoding="utf-8"?>
 <p:sld xmlns:a="http://schemas.openxmlformats.org/drawingml/2006/main" xmlns:r="http://schemas.openxmlformats.org/officeDocument/2006/relationships" xmlns:p="http://schemas.openxmlformats.org/presentationml/2006/main">
   <p:cSld>
@@ -10217,7 +10623,7 @@
         <p:spPr/>
         <p:txBody>
           <a:bodyPr>
-            <a:normAutofit lnSpcReduction="10000"/>
+            <a:normAutofit fontScale="85000" lnSpcReduction="20000"/>
           </a:bodyPr>
           <a:lstStyle/>
           <a:p>
@@ -10328,7 +10734,41 @@
             </a:pPr>
             <a:r>
               <a:rPr lang="en-US" sz="2400" dirty="0"/>
-              <a:t>Costs reduction: by preventive measures and excessive checks</a:t>
+              <a:t>Costs reduction:</a:t>
+            </a:r>
+          </a:p>
+          <a:p>
+            <a:pPr lvl="1" algn="l" rtl="0">
+              <a:buBlip>
+                <a:blip r:embed="rId2">
+                  <a:extLst>
+                    <a:ext uri="{96DAC541-7B7A-43D3-8B79-37D633B846F1}">
+                      <asvg:svgBlip xmlns:asvg="http://schemas.microsoft.com/office/drawing/2016/SVG/main" r:embed="rId3"/>
+                    </a:ext>
+                  </a:extLst>
+                </a:blip>
+              </a:buBlip>
+            </a:pPr>
+            <a:r>
+              <a:rPr lang="en-US" sz="2200" dirty="0"/>
+              <a:t>by early failure detection</a:t>
+            </a:r>
+          </a:p>
+          <a:p>
+            <a:pPr lvl="1" algn="l" rtl="0">
+              <a:buBlip>
+                <a:blip r:embed="rId2">
+                  <a:extLst>
+                    <a:ext uri="{96DAC541-7B7A-43D3-8B79-37D633B846F1}">
+                      <asvg:svgBlip xmlns:asvg="http://schemas.microsoft.com/office/drawing/2016/SVG/main" r:embed="rId3"/>
+                    </a:ext>
+                  </a:extLst>
+                </a:blip>
+              </a:buBlip>
+            </a:pPr>
+            <a:r>
+              <a:rPr lang="en-US" sz="2200" dirty="0"/>
+              <a:t>preventive measures and excessive checks</a:t>
             </a:r>
           </a:p>
         </p:txBody>
@@ -10567,9 +11007,16 @@
             <p:ph sz="quarter" idx="13"/>
           </p:nvPr>
         </p:nvSpPr>
-        <p:spPr/>
-        <p:txBody>
-          <a:bodyPr/>
+        <p:spPr>
+          <a:xfrm>
+            <a:off x="913774" y="2214694"/>
+            <a:ext cx="5110691" cy="3424107"/>
+          </a:xfrm>
+        </p:spPr>
+        <p:txBody>
+          <a:bodyPr>
+            <a:normAutofit/>
+          </a:bodyPr>
           <a:lstStyle/>
           <a:p>
             <a:pPr marL="0" indent="0" algn="l" rtl="0">
@@ -10577,38 +11024,777 @@
             </a:pPr>
             <a:r>
               <a:rPr lang="en-US" dirty="0"/>
-              <a:t>F2 &lt;add formula&gt;</a:t>
-            </a:r>
-          </a:p>
-          <a:p>
-            <a:pPr lvl="1" algn="l" rtl="0">
+              <a:t>F2:</a:t>
+            </a:r>
+          </a:p>
+          <a:p>
+            <a:pPr algn="l" rtl="0">
               <a:buFont typeface="Courier New" panose="02070309020205020404" pitchFamily="49" charset="0"/>
               <a:buChar char="o"/>
             </a:pPr>
-            <a:endParaRPr lang="en-US" dirty="0"/>
-          </a:p>
-          <a:p>
-            <a:pPr lvl="1" algn="l" rtl="0">
+            <a:r>
+              <a:rPr lang="en-US" dirty="0"/>
+              <a:t>weighted mean of precision and recall</a:t>
+            </a:r>
+          </a:p>
+          <a:p>
+            <a:pPr algn="l" rtl="0">
               <a:buFont typeface="Courier New" panose="02070309020205020404" pitchFamily="49" charset="0"/>
               <a:buChar char="o"/>
             </a:pPr>
             <a:r>
               <a:rPr lang="en-US" dirty="0"/>
-              <a:t>weighted mean of precision and recall</a:t>
-            </a:r>
-          </a:p>
-          <a:p>
-            <a:pPr lvl="1" algn="l" rtl="0">
-              <a:buFont typeface="Courier New" panose="02070309020205020404" pitchFamily="49" charset="0"/>
-              <a:buChar char="o"/>
+              <a:t>giving more weight to recall than to precision</a:t>
+            </a:r>
+          </a:p>
+          <a:p>
+            <a:pPr marL="0" indent="0" algn="l" rtl="0">
+              <a:buNone/>
             </a:pPr>
-            <a:r>
-              <a:rPr lang="en-US" dirty="0"/>
-              <a:t>giving more weight to recall than to precision</a:t>
-            </a:r>
-          </a:p>
-        </p:txBody>
-      </p:sp>
+            <a:endParaRPr lang="en-US" dirty="0"/>
+          </a:p>
+        </p:txBody>
+      </p:sp>
+      <mc:AlternateContent xmlns:mc="http://schemas.openxmlformats.org/markup-compatibility/2006">
+        <mc:Choice xmlns:a14="http://schemas.microsoft.com/office/drawing/2010/main" Requires="a14">
+          <p:sp>
+            <p:nvSpPr>
+              <p:cNvPr id="4" name="Content Placeholder 2">
+                <a:extLst>
+                  <a:ext uri="{FF2B5EF4-FFF2-40B4-BE49-F238E27FC236}">
+                    <a16:creationId xmlns:a16="http://schemas.microsoft.com/office/drawing/2014/main" id="{8AD734C4-AC68-FDCB-96FF-4F565ACCE750}"/>
+                  </a:ext>
+                </a:extLst>
+              </p:cNvPr>
+              <p:cNvSpPr txBox="1">
+                <a:spLocks/>
+              </p:cNvSpPr>
+              <p:nvPr/>
+            </p:nvSpPr>
+            <p:spPr>
+              <a:xfrm>
+                <a:off x="6671388" y="2214694"/>
+                <a:ext cx="4697034" cy="3424107"/>
+              </a:xfrm>
+              <a:prstGeom prst="rect">
+                <a:avLst/>
+              </a:prstGeom>
+            </p:spPr>
+            <p:txBody>
+              <a:bodyPr vert="horz" lIns="91440" tIns="45720" rIns="91440" bIns="45720" rtlCol="0">
+                <a:normAutofit/>
+              </a:bodyPr>
+              <a:lstStyle>
+                <a:lvl1pPr marL="228600" indent="-228600" algn="r" defTabSz="914400" rtl="1" eaLnBrk="1" latinLnBrk="0" hangingPunct="1">
+                  <a:lnSpc>
+                    <a:spcPct val="120000"/>
+                  </a:lnSpc>
+                  <a:spcBef>
+                    <a:spcPts val="1000"/>
+                  </a:spcBef>
+                  <a:buClr>
+                    <a:schemeClr val="tx1"/>
+                  </a:buClr>
+                  <a:buFont typeface="Arial" panose="020B0604020202020204" pitchFamily="34" charset="0"/>
+                  <a:buChar char="•"/>
+                  <a:defRPr sz="2000" kern="1200" cap="none" baseline="0">
+                    <a:solidFill>
+                      <a:schemeClr val="tx1"/>
+                    </a:solidFill>
+                    <a:effectLst/>
+                    <a:latin typeface="+mn-lt"/>
+                    <a:ea typeface="+mn-ea"/>
+                    <a:cs typeface="+mn-cs"/>
+                  </a:defRPr>
+                </a:lvl1pPr>
+                <a:lvl2pPr marL="685800" indent="-228600" algn="r" defTabSz="914400" rtl="1" eaLnBrk="1" latinLnBrk="0" hangingPunct="1">
+                  <a:lnSpc>
+                    <a:spcPct val="120000"/>
+                  </a:lnSpc>
+                  <a:spcBef>
+                    <a:spcPts val="500"/>
+                  </a:spcBef>
+                  <a:buClr>
+                    <a:schemeClr val="tx1"/>
+                  </a:buClr>
+                  <a:buFont typeface="Arial" panose="020B0604020202020204" pitchFamily="34" charset="0"/>
+                  <a:buChar char="•"/>
+                  <a:defRPr sz="1800" kern="1200" cap="none" baseline="0">
+                    <a:solidFill>
+                      <a:schemeClr val="tx1"/>
+                    </a:solidFill>
+                    <a:effectLst/>
+                    <a:latin typeface="+mn-lt"/>
+                    <a:ea typeface="+mn-ea"/>
+                    <a:cs typeface="+mn-cs"/>
+                  </a:defRPr>
+                </a:lvl2pPr>
+                <a:lvl3pPr marL="1143000" indent="-228600" algn="r" defTabSz="914400" rtl="1" eaLnBrk="1" latinLnBrk="0" hangingPunct="1">
+                  <a:lnSpc>
+                    <a:spcPct val="120000"/>
+                  </a:lnSpc>
+                  <a:spcBef>
+                    <a:spcPts val="500"/>
+                  </a:spcBef>
+                  <a:buClr>
+                    <a:schemeClr val="tx1"/>
+                  </a:buClr>
+                  <a:buFont typeface="Arial" panose="020B0604020202020204" pitchFamily="34" charset="0"/>
+                  <a:buChar char="•"/>
+                  <a:defRPr sz="1600" kern="1200" cap="none" baseline="0">
+                    <a:solidFill>
+                      <a:schemeClr val="tx1"/>
+                    </a:solidFill>
+                    <a:effectLst/>
+                    <a:latin typeface="+mn-lt"/>
+                    <a:ea typeface="+mn-ea"/>
+                    <a:cs typeface="+mn-cs"/>
+                  </a:defRPr>
+                </a:lvl3pPr>
+                <a:lvl4pPr marL="1600200" indent="-228600" algn="r" defTabSz="914400" rtl="1" eaLnBrk="1" latinLnBrk="0" hangingPunct="1">
+                  <a:lnSpc>
+                    <a:spcPct val="120000"/>
+                  </a:lnSpc>
+                  <a:spcBef>
+                    <a:spcPts val="500"/>
+                  </a:spcBef>
+                  <a:buClr>
+                    <a:schemeClr val="tx1"/>
+                  </a:buClr>
+                  <a:buFont typeface="Arial" panose="020B0604020202020204" pitchFamily="34" charset="0"/>
+                  <a:buChar char="•"/>
+                  <a:defRPr sz="1400" kern="1200" cap="none" baseline="0">
+                    <a:solidFill>
+                      <a:schemeClr val="tx1"/>
+                    </a:solidFill>
+                    <a:effectLst/>
+                    <a:latin typeface="+mn-lt"/>
+                    <a:ea typeface="+mn-ea"/>
+                    <a:cs typeface="+mn-cs"/>
+                  </a:defRPr>
+                </a:lvl4pPr>
+                <a:lvl5pPr marL="2057400" indent="-228600" algn="r" defTabSz="914400" rtl="1" eaLnBrk="1" latinLnBrk="0" hangingPunct="1">
+                  <a:lnSpc>
+                    <a:spcPct val="120000"/>
+                  </a:lnSpc>
+                  <a:spcBef>
+                    <a:spcPts val="500"/>
+                  </a:spcBef>
+                  <a:buClr>
+                    <a:schemeClr val="tx1"/>
+                  </a:buClr>
+                  <a:buFont typeface="Arial" panose="020B0604020202020204" pitchFamily="34" charset="0"/>
+                  <a:buChar char="•"/>
+                  <a:defRPr sz="1400" kern="1200" cap="none" baseline="0">
+                    <a:solidFill>
+                      <a:schemeClr val="tx1"/>
+                    </a:solidFill>
+                    <a:effectLst/>
+                    <a:latin typeface="+mn-lt"/>
+                    <a:ea typeface="+mn-ea"/>
+                    <a:cs typeface="+mn-cs"/>
+                  </a:defRPr>
+                </a:lvl5pPr>
+                <a:lvl6pPr marL="2514600" indent="-228600" algn="r" defTabSz="914400" rtl="1" eaLnBrk="1" latinLnBrk="0" hangingPunct="1">
+                  <a:lnSpc>
+                    <a:spcPct val="120000"/>
+                  </a:lnSpc>
+                  <a:spcBef>
+                    <a:spcPts val="500"/>
+                  </a:spcBef>
+                  <a:buClr>
+                    <a:schemeClr val="tx1"/>
+                  </a:buClr>
+                  <a:buFont typeface="Arial" panose="020B0604020202020204" pitchFamily="34" charset="0"/>
+                  <a:buChar char="•"/>
+                  <a:defRPr sz="1400" kern="1200" cap="all" baseline="0">
+                    <a:solidFill>
+                      <a:schemeClr val="tx1"/>
+                    </a:solidFill>
+                    <a:effectLst/>
+                    <a:latin typeface="+mn-lt"/>
+                    <a:ea typeface="+mn-ea"/>
+                    <a:cs typeface="+mn-cs"/>
+                  </a:defRPr>
+                </a:lvl6pPr>
+                <a:lvl7pPr marL="2971800" indent="-228600" algn="r" defTabSz="914400" rtl="1" eaLnBrk="1" latinLnBrk="0" hangingPunct="1">
+                  <a:lnSpc>
+                    <a:spcPct val="120000"/>
+                  </a:lnSpc>
+                  <a:spcBef>
+                    <a:spcPts val="500"/>
+                  </a:spcBef>
+                  <a:buClr>
+                    <a:schemeClr val="tx1"/>
+                  </a:buClr>
+                  <a:buFont typeface="Arial" panose="020B0604020202020204" pitchFamily="34" charset="0"/>
+                  <a:buChar char="•"/>
+                  <a:defRPr sz="1400" kern="1200" cap="all" baseline="0">
+                    <a:solidFill>
+                      <a:schemeClr val="tx1"/>
+                    </a:solidFill>
+                    <a:effectLst/>
+                    <a:latin typeface="+mn-lt"/>
+                    <a:ea typeface="+mn-ea"/>
+                    <a:cs typeface="+mn-cs"/>
+                  </a:defRPr>
+                </a:lvl7pPr>
+                <a:lvl8pPr marL="3429000" indent="-228600" algn="r" defTabSz="914400" rtl="1" eaLnBrk="1" latinLnBrk="0" hangingPunct="1">
+                  <a:lnSpc>
+                    <a:spcPct val="120000"/>
+                  </a:lnSpc>
+                  <a:spcBef>
+                    <a:spcPts val="500"/>
+                  </a:spcBef>
+                  <a:buClr>
+                    <a:schemeClr val="tx1"/>
+                  </a:buClr>
+                  <a:buFont typeface="Arial" panose="020B0604020202020204" pitchFamily="34" charset="0"/>
+                  <a:buChar char="•"/>
+                  <a:defRPr sz="1400" kern="1200" cap="all" baseline="0">
+                    <a:solidFill>
+                      <a:schemeClr val="tx1"/>
+                    </a:solidFill>
+                    <a:effectLst/>
+                    <a:latin typeface="+mn-lt"/>
+                    <a:ea typeface="+mn-ea"/>
+                    <a:cs typeface="+mn-cs"/>
+                  </a:defRPr>
+                </a:lvl8pPr>
+                <a:lvl9pPr marL="3886200" indent="-228600" algn="r" defTabSz="914400" rtl="1" eaLnBrk="1" latinLnBrk="0" hangingPunct="1">
+                  <a:lnSpc>
+                    <a:spcPct val="120000"/>
+                  </a:lnSpc>
+                  <a:spcBef>
+                    <a:spcPts val="500"/>
+                  </a:spcBef>
+                  <a:buClr>
+                    <a:schemeClr val="tx1"/>
+                  </a:buClr>
+                  <a:buFont typeface="Arial" panose="020B0604020202020204" pitchFamily="34" charset="0"/>
+                  <a:buChar char="•"/>
+                  <a:defRPr sz="1400" kern="1200" cap="all" baseline="0">
+                    <a:solidFill>
+                      <a:schemeClr val="tx1"/>
+                    </a:solidFill>
+                    <a:effectLst/>
+                    <a:latin typeface="+mn-lt"/>
+                    <a:ea typeface="+mn-ea"/>
+                    <a:cs typeface="+mn-cs"/>
+                  </a:defRPr>
+                </a:lvl9pPr>
+              </a:lstStyle>
+              <a:p>
+                <a:pPr marL="0" indent="0" algn="l" rtl="0">
+                  <a:buFont typeface="Arial" panose="020B0604020202020204" pitchFamily="34" charset="0"/>
+                  <a:buNone/>
+                </a:pPr>
+                <a14:m>
+                  <m:oMathPara xmlns:m="http://schemas.openxmlformats.org/officeDocument/2006/math">
+                    <m:oMathParaPr>
+                      <m:jc m:val="left"/>
+                    </m:oMathParaPr>
+                    <m:oMath xmlns:m="http://schemas.openxmlformats.org/officeDocument/2006/math">
+                      <m:r>
+                        <a:rPr lang="en-US" i="1" smtClean="0">
+                          <a:latin typeface="Cambria Math" panose="02040503050406030204" pitchFamily="18" charset="0"/>
+                        </a:rPr>
+                        <m:t>𝐹</m:t>
+                      </m:r>
+                      <m:r>
+                        <a:rPr lang="en-US" i="1" smtClean="0">
+                          <a:latin typeface="Cambria Math" panose="02040503050406030204" pitchFamily="18" charset="0"/>
+                        </a:rPr>
+                        <m:t>2</m:t>
+                      </m:r>
+                      <m:r>
+                        <a:rPr lang="en-US" i="1" smtClean="0">
+                          <a:latin typeface="Cambria Math" panose="02040503050406030204" pitchFamily="18" charset="0"/>
+                        </a:rPr>
+                        <m:t>=</m:t>
+                      </m:r>
+                      <m:r>
+                        <a:rPr lang="en-US" i="1" smtClean="0">
+                          <a:latin typeface="Cambria Math" panose="02040503050406030204" pitchFamily="18" charset="0"/>
+                        </a:rPr>
+                        <m:t>5</m:t>
+                      </m:r>
+                      <m:r>
+                        <a:rPr lang="en-US" i="1" smtClean="0">
+                          <a:latin typeface="Cambria Math" panose="02040503050406030204" pitchFamily="18" charset="0"/>
+                        </a:rPr>
+                        <m:t> ∗</m:t>
+                      </m:r>
+                      <m:f>
+                        <m:fPr>
+                          <m:ctrlPr>
+                            <a:rPr lang="en-US" i="1" smtClean="0">
+                              <a:latin typeface="Cambria Math" panose="02040503050406030204" pitchFamily="18" charset="0"/>
+                            </a:rPr>
+                          </m:ctrlPr>
+                        </m:fPr>
+                        <m:num>
+                          <m:r>
+                            <a:rPr lang="en-US" i="1" smtClean="0">
+                              <a:latin typeface="Cambria Math" panose="02040503050406030204" pitchFamily="18" charset="0"/>
+                            </a:rPr>
+                            <m:t>𝑝𝑟𝑒𝑐𝑖𝑠𝑖𝑜𝑛</m:t>
+                          </m:r>
+                          <m:r>
+                            <a:rPr lang="en-US" i="1" smtClean="0">
+                              <a:latin typeface="Cambria Math" panose="02040503050406030204" pitchFamily="18" charset="0"/>
+                            </a:rPr>
+                            <m:t> ∗</m:t>
+                          </m:r>
+                          <m:r>
+                            <a:rPr lang="en-US" i="1" smtClean="0">
+                              <a:latin typeface="Cambria Math" panose="02040503050406030204" pitchFamily="18" charset="0"/>
+                            </a:rPr>
+                            <m:t>𝑟𝑒𝑐𝑎𝑙𝑙</m:t>
+                          </m:r>
+                        </m:num>
+                        <m:den>
+                          <m:r>
+                            <a:rPr lang="en-US" i="1" smtClean="0">
+                              <a:latin typeface="Cambria Math" panose="02040503050406030204" pitchFamily="18" charset="0"/>
+                            </a:rPr>
+                            <m:t>  </m:t>
+                          </m:r>
+                          <m:r>
+                            <a:rPr lang="en-US" i="1" smtClean="0">
+                              <a:latin typeface="Cambria Math" panose="02040503050406030204" pitchFamily="18" charset="0"/>
+                            </a:rPr>
+                            <m:t>4</m:t>
+                          </m:r>
+                          <m:r>
+                            <a:rPr lang="en-US" i="1" smtClean="0">
+                              <a:latin typeface="Cambria Math" panose="02040503050406030204" pitchFamily="18" charset="0"/>
+                            </a:rPr>
+                            <m:t> ∗</m:t>
+                          </m:r>
+                          <m:r>
+                            <a:rPr lang="en-US" i="1" smtClean="0">
+                              <a:latin typeface="Cambria Math" panose="02040503050406030204" pitchFamily="18" charset="0"/>
+                            </a:rPr>
+                            <m:t>𝑝𝑟𝑒𝑐𝑖𝑠𝑖𝑜𝑛</m:t>
+                          </m:r>
+                          <m:r>
+                            <a:rPr lang="en-US" i="1" smtClean="0">
+                              <a:latin typeface="Cambria Math" panose="02040503050406030204" pitchFamily="18" charset="0"/>
+                            </a:rPr>
+                            <m:t>+</m:t>
+                          </m:r>
+                          <m:r>
+                            <a:rPr lang="en-US" i="1" smtClean="0">
+                              <a:latin typeface="Cambria Math" panose="02040503050406030204" pitchFamily="18" charset="0"/>
+                            </a:rPr>
+                            <m:t>𝑟𝑒𝑐𝑎𝑙𝑙</m:t>
+                          </m:r>
+                          <m:r>
+                            <a:rPr lang="en-US" i="1" smtClean="0">
+                              <a:latin typeface="Cambria Math" panose="02040503050406030204" pitchFamily="18" charset="0"/>
+                            </a:rPr>
+                            <m:t>  </m:t>
+                          </m:r>
+                        </m:den>
+                      </m:f>
+                      <m:r>
+                        <a:rPr lang="en-US" i="1" smtClean="0">
+                          <a:latin typeface="Cambria Math" panose="02040503050406030204" pitchFamily="18" charset="0"/>
+                        </a:rPr>
+                        <m:t>.</m:t>
+                      </m:r>
+                    </m:oMath>
+                  </m:oMathPara>
+                </a14:m>
+                <a:endParaRPr lang="en-US" i="1" dirty="0">
+                  <a:latin typeface="Cambria Math" panose="02040503050406030204" pitchFamily="18" charset="0"/>
+                </a:endParaRPr>
+              </a:p>
+              <a:p>
+                <a:pPr marL="457200" lvl="1" indent="0" algn="l" rtl="0">
+                  <a:buFont typeface="Arial" panose="020B0604020202020204" pitchFamily="34" charset="0"/>
+                  <a:buNone/>
+                </a:pPr>
+                <a14:m>
+                  <m:oMathPara xmlns:m="http://schemas.openxmlformats.org/officeDocument/2006/math">
+                    <m:oMathParaPr>
+                      <m:jc m:val="left"/>
+                    </m:oMathParaPr>
+                    <m:oMath xmlns:m="http://schemas.openxmlformats.org/officeDocument/2006/math">
+                      <m:r>
+                        <a:rPr lang="en-US" i="1" smtClean="0">
+                          <a:latin typeface="Cambria Math" panose="02040503050406030204" pitchFamily="18" charset="0"/>
+                        </a:rPr>
+                        <m:t>𝑃𝑟𝑒𝑐𝑖𝑠𝑖𝑜𝑛</m:t>
+                      </m:r>
+                      <m:r>
+                        <a:rPr lang="en-US" i="1">
+                          <a:latin typeface="Cambria Math" panose="02040503050406030204" pitchFamily="18" charset="0"/>
+                        </a:rPr>
+                        <m:t>=</m:t>
+                      </m:r>
+                      <m:f>
+                        <m:fPr>
+                          <m:ctrlPr>
+                            <a:rPr lang="en-US" i="1">
+                              <a:latin typeface="Cambria Math" panose="02040503050406030204" pitchFamily="18" charset="0"/>
+                            </a:rPr>
+                          </m:ctrlPr>
+                        </m:fPr>
+                        <m:num>
+                          <m:r>
+                            <a:rPr lang="en-US" i="1" smtClean="0">
+                              <a:latin typeface="Cambria Math" panose="02040503050406030204" pitchFamily="18" charset="0"/>
+                            </a:rPr>
+                            <m:t>𝑇𝑃</m:t>
+                          </m:r>
+                        </m:num>
+                        <m:den>
+                          <m:r>
+                            <a:rPr lang="en-US" i="1">
+                              <a:latin typeface="Cambria Math" panose="02040503050406030204" pitchFamily="18" charset="0"/>
+                            </a:rPr>
+                            <m:t>  </m:t>
+                          </m:r>
+                          <m:r>
+                            <a:rPr lang="en-US" i="1" smtClean="0">
+                              <a:latin typeface="Cambria Math" panose="02040503050406030204" pitchFamily="18" charset="0"/>
+                            </a:rPr>
+                            <m:t>𝑇𝑃</m:t>
+                          </m:r>
+                          <m:r>
+                            <a:rPr lang="en-US" i="1" smtClean="0">
+                              <a:latin typeface="Cambria Math" panose="02040503050406030204" pitchFamily="18" charset="0"/>
+                            </a:rPr>
+                            <m:t>+</m:t>
+                          </m:r>
+                          <m:r>
+                            <a:rPr lang="en-US" i="1" smtClean="0">
+                              <a:latin typeface="Cambria Math" panose="02040503050406030204" pitchFamily="18" charset="0"/>
+                            </a:rPr>
+                            <m:t>𝐹𝑃</m:t>
+                          </m:r>
+                          <m:r>
+                            <a:rPr lang="en-US" i="1">
+                              <a:latin typeface="Cambria Math" panose="02040503050406030204" pitchFamily="18" charset="0"/>
+                            </a:rPr>
+                            <m:t>  </m:t>
+                          </m:r>
+                        </m:den>
+                      </m:f>
+                    </m:oMath>
+                  </m:oMathPara>
+                </a14:m>
+                <a:endParaRPr lang="en-US" i="1" dirty="0">
+                  <a:latin typeface="Cambria Math" panose="02040503050406030204" pitchFamily="18" charset="0"/>
+                </a:endParaRPr>
+              </a:p>
+              <a:p>
+                <a:pPr marL="457200" lvl="1" indent="0" algn="l" rtl="0">
+                  <a:buFont typeface="Arial" panose="020B0604020202020204" pitchFamily="34" charset="0"/>
+                  <a:buNone/>
+                </a:pPr>
+                <a14:m>
+                  <m:oMathPara xmlns:m="http://schemas.openxmlformats.org/officeDocument/2006/math">
+                    <m:oMathParaPr>
+                      <m:jc m:val="left"/>
+                    </m:oMathParaPr>
+                    <m:oMath xmlns:m="http://schemas.openxmlformats.org/officeDocument/2006/math">
+                      <m:r>
+                        <a:rPr lang="en-US" i="1" smtClean="0">
+                          <a:latin typeface="Cambria Math" panose="02040503050406030204" pitchFamily="18" charset="0"/>
+                        </a:rPr>
+                        <m:t>𝑅𝑒𝑐𝑎𝑙𝑙</m:t>
+                      </m:r>
+                      <m:r>
+                        <a:rPr lang="en-US" i="1">
+                          <a:latin typeface="Cambria Math" panose="02040503050406030204" pitchFamily="18" charset="0"/>
+                        </a:rPr>
+                        <m:t>=</m:t>
+                      </m:r>
+                      <m:f>
+                        <m:fPr>
+                          <m:ctrlPr>
+                            <a:rPr lang="en-US" i="1">
+                              <a:latin typeface="Cambria Math" panose="02040503050406030204" pitchFamily="18" charset="0"/>
+                            </a:rPr>
+                          </m:ctrlPr>
+                        </m:fPr>
+                        <m:num>
+                          <m:r>
+                            <a:rPr lang="en-US" i="1">
+                              <a:latin typeface="Cambria Math" panose="02040503050406030204" pitchFamily="18" charset="0"/>
+                            </a:rPr>
+                            <m:t>𝑇𝑃</m:t>
+                          </m:r>
+                        </m:num>
+                        <m:den>
+                          <m:r>
+                            <a:rPr lang="en-US" i="1">
+                              <a:latin typeface="Cambria Math" panose="02040503050406030204" pitchFamily="18" charset="0"/>
+                            </a:rPr>
+                            <m:t>  </m:t>
+                          </m:r>
+                          <m:r>
+                            <a:rPr lang="en-US" i="1">
+                              <a:latin typeface="Cambria Math" panose="02040503050406030204" pitchFamily="18" charset="0"/>
+                            </a:rPr>
+                            <m:t>𝑇𝑃</m:t>
+                          </m:r>
+                          <m:r>
+                            <a:rPr lang="en-US" i="1">
+                              <a:latin typeface="Cambria Math" panose="02040503050406030204" pitchFamily="18" charset="0"/>
+                            </a:rPr>
+                            <m:t>+</m:t>
+                          </m:r>
+                          <m:r>
+                            <a:rPr lang="en-US" i="1">
+                              <a:latin typeface="Cambria Math" panose="02040503050406030204" pitchFamily="18" charset="0"/>
+                            </a:rPr>
+                            <m:t>𝐹𝑁</m:t>
+                          </m:r>
+                          <m:r>
+                            <a:rPr lang="en-US" i="1">
+                              <a:latin typeface="Cambria Math" panose="02040503050406030204" pitchFamily="18" charset="0"/>
+                            </a:rPr>
+                            <m:t>  </m:t>
+                          </m:r>
+                        </m:den>
+                      </m:f>
+                      <m:r>
+                        <a:rPr lang="en-US" i="1" smtClean="0">
+                          <a:latin typeface="Cambria Math" panose="02040503050406030204" pitchFamily="18" charset="0"/>
+                        </a:rPr>
+                        <m:t>.</m:t>
+                      </m:r>
+                      <m:r>
+                        <a:rPr lang="en-US" i="1">
+                          <a:latin typeface="Cambria Math" panose="02040503050406030204" pitchFamily="18" charset="0"/>
+                        </a:rPr>
+                        <m:t> </m:t>
+                      </m:r>
+                    </m:oMath>
+                  </m:oMathPara>
+                </a14:m>
+                <a:endParaRPr lang="en-US" dirty="0"/>
+              </a:p>
+              <a:p>
+                <a:pPr marL="0" indent="0" algn="l" rtl="0">
+                  <a:buFont typeface="Arial" panose="020B0604020202020204" pitchFamily="34" charset="0"/>
+                  <a:buNone/>
+                </a:pPr>
+                <a:endParaRPr lang="en-US" i="1" dirty="0">
+                  <a:latin typeface="Cambria Math" panose="02040503050406030204" pitchFamily="18" charset="0"/>
+                </a:endParaRPr>
+              </a:p>
+              <a:p>
+                <a:pPr marL="0" indent="0" algn="l" rtl="0">
+                  <a:buFont typeface="Arial" panose="020B0604020202020204" pitchFamily="34" charset="0"/>
+                  <a:buNone/>
+                </a:pPr>
+                <a14:m>
+                  <m:oMathPara xmlns:m="http://schemas.openxmlformats.org/officeDocument/2006/math">
+                    <m:oMathParaPr>
+                      <m:jc m:val="left"/>
+                    </m:oMathParaPr>
+                    <m:oMath xmlns:m="http://schemas.openxmlformats.org/officeDocument/2006/math">
+                      <m:r>
+                        <a:rPr lang="en-US" i="1" smtClean="0">
+                          <a:latin typeface="Cambria Math" panose="02040503050406030204" pitchFamily="18" charset="0"/>
+                        </a:rPr>
+                        <m:t>⇒ </m:t>
+                      </m:r>
+                      <m:r>
+                        <a:rPr lang="en-US" i="1" smtClean="0">
+                          <a:latin typeface="Cambria Math" panose="02040503050406030204" pitchFamily="18" charset="0"/>
+                        </a:rPr>
+                        <m:t>𝐹</m:t>
+                      </m:r>
+                      <m:r>
+                        <a:rPr lang="en-US" i="1" smtClean="0">
+                          <a:latin typeface="Cambria Math" panose="02040503050406030204" pitchFamily="18" charset="0"/>
+                        </a:rPr>
+                        <m:t>2</m:t>
+                      </m:r>
+                      <m:r>
+                        <a:rPr lang="en-US" i="1" smtClean="0">
+                          <a:latin typeface="Cambria Math" panose="02040503050406030204" pitchFamily="18" charset="0"/>
+                        </a:rPr>
+                        <m:t>=</m:t>
+                      </m:r>
+                      <m:f>
+                        <m:fPr>
+                          <m:ctrlPr>
+                            <a:rPr lang="en-US" i="1" smtClean="0">
+                              <a:latin typeface="Cambria Math" panose="02040503050406030204" pitchFamily="18" charset="0"/>
+                            </a:rPr>
+                          </m:ctrlPr>
+                        </m:fPr>
+                        <m:num>
+                          <m:r>
+                            <a:rPr lang="en-US" i="1" smtClean="0">
+                              <a:latin typeface="Cambria Math" panose="02040503050406030204" pitchFamily="18" charset="0"/>
+                            </a:rPr>
+                            <m:t>5</m:t>
+                          </m:r>
+                          <m:r>
+                            <a:rPr lang="en-US" i="1" smtClean="0">
+                              <a:latin typeface="Cambria Math" panose="02040503050406030204" pitchFamily="18" charset="0"/>
+                            </a:rPr>
+                            <m:t> </m:t>
+                          </m:r>
+                          <m:r>
+                            <a:rPr lang="en-US" i="1" smtClean="0">
+                              <a:latin typeface="Cambria Math" panose="02040503050406030204" pitchFamily="18" charset="0"/>
+                            </a:rPr>
+                            <m:t>𝑇𝑃</m:t>
+                          </m:r>
+                        </m:num>
+                        <m:den>
+                          <m:r>
+                            <a:rPr lang="en-US" i="1" smtClean="0">
+                              <a:latin typeface="Cambria Math" panose="02040503050406030204" pitchFamily="18" charset="0"/>
+                            </a:rPr>
+                            <m:t>  </m:t>
+                          </m:r>
+                          <m:r>
+                            <a:rPr lang="en-US" i="1" smtClean="0">
+                              <a:latin typeface="Cambria Math" panose="02040503050406030204" pitchFamily="18" charset="0"/>
+                            </a:rPr>
+                            <m:t>5</m:t>
+                          </m:r>
+                          <m:r>
+                            <a:rPr lang="en-US" i="1" smtClean="0">
+                              <a:latin typeface="Cambria Math" panose="02040503050406030204" pitchFamily="18" charset="0"/>
+                            </a:rPr>
+                            <m:t> </m:t>
+                          </m:r>
+                          <m:r>
+                            <a:rPr lang="en-US" i="1" smtClean="0">
+                              <a:latin typeface="Cambria Math" panose="02040503050406030204" pitchFamily="18" charset="0"/>
+                            </a:rPr>
+                            <m:t>𝑇𝑃</m:t>
+                          </m:r>
+                          <m:r>
+                            <a:rPr lang="en-US" i="1" smtClean="0">
+                              <a:latin typeface="Cambria Math" panose="02040503050406030204" pitchFamily="18" charset="0"/>
+                            </a:rPr>
+                            <m:t>+(</m:t>
+                          </m:r>
+                          <m:r>
+                            <a:rPr lang="en-US" i="1" smtClean="0">
+                              <a:latin typeface="Cambria Math" panose="02040503050406030204" pitchFamily="18" charset="0"/>
+                            </a:rPr>
+                            <m:t>4</m:t>
+                          </m:r>
+                          <m:r>
+                            <a:rPr lang="en-US" i="1" smtClean="0">
+                              <a:latin typeface="Cambria Math" panose="02040503050406030204" pitchFamily="18" charset="0"/>
+                            </a:rPr>
+                            <m:t> </m:t>
+                          </m:r>
+                          <m:r>
+                            <a:rPr lang="en-US" i="1" smtClean="0">
+                              <a:latin typeface="Cambria Math" panose="02040503050406030204" pitchFamily="18" charset="0"/>
+                            </a:rPr>
+                            <m:t>𝐹𝑁</m:t>
+                          </m:r>
+                          <m:r>
+                            <a:rPr lang="en-US" i="1" smtClean="0">
+                              <a:latin typeface="Cambria Math" panose="02040503050406030204" pitchFamily="18" charset="0"/>
+                            </a:rPr>
+                            <m:t>+</m:t>
+                          </m:r>
+                          <m:r>
+                            <a:rPr lang="en-US" i="1" smtClean="0">
+                              <a:latin typeface="Cambria Math" panose="02040503050406030204" pitchFamily="18" charset="0"/>
+                            </a:rPr>
+                            <m:t>𝐹𝑃</m:t>
+                          </m:r>
+                          <m:r>
+                            <a:rPr lang="en-US" i="1" smtClean="0">
+                              <a:latin typeface="Cambria Math" panose="02040503050406030204" pitchFamily="18" charset="0"/>
+                            </a:rPr>
+                            <m:t>)  </m:t>
+                          </m:r>
+                        </m:den>
+                      </m:f>
+                      <m:r>
+                        <a:rPr lang="en-US" i="1" smtClean="0">
+                          <a:latin typeface="Cambria Math" panose="02040503050406030204" pitchFamily="18" charset="0"/>
+                        </a:rPr>
+                        <m:t>.</m:t>
+                      </m:r>
+                    </m:oMath>
+                  </m:oMathPara>
+                </a14:m>
+                <a:endParaRPr lang="en-US" i="1" dirty="0">
+                  <a:latin typeface="Cambria Math" panose="02040503050406030204" pitchFamily="18" charset="0"/>
+                </a:endParaRPr>
+              </a:p>
+              <a:p>
+                <a:pPr marL="0" indent="0" algn="l" rtl="0">
+                  <a:buFont typeface="Arial" panose="020B0604020202020204" pitchFamily="34" charset="0"/>
+                  <a:buNone/>
+                </a:pPr>
+                <a:endParaRPr lang="en-US" dirty="0"/>
+              </a:p>
+              <a:p>
+                <a:pPr marL="0" indent="0" algn="l" rtl="0">
+                  <a:buFont typeface="Arial" panose="020B0604020202020204" pitchFamily="34" charset="0"/>
+                  <a:buNone/>
+                </a:pPr>
+                <a:endParaRPr lang="en-US" dirty="0"/>
+              </a:p>
+            </p:txBody>
+          </p:sp>
+        </mc:Choice>
+        <mc:Fallback>
+          <p:sp>
+            <p:nvSpPr>
+              <p:cNvPr id="4" name="Content Placeholder 2">
+                <a:extLst>
+                  <a:ext uri="{FF2B5EF4-FFF2-40B4-BE49-F238E27FC236}">
+                    <a16:creationId xmlns:a16="http://schemas.microsoft.com/office/drawing/2014/main" id="{8AD734C4-AC68-FDCB-96FF-4F565ACCE750}"/>
+                  </a:ext>
+                </a:extLst>
+              </p:cNvPr>
+              <p:cNvSpPr txBox="1">
+                <a:spLocks noRot="1" noChangeAspect="1" noMove="1" noResize="1" noEditPoints="1" noAdjustHandles="1" noChangeArrowheads="1" noChangeShapeType="1" noTextEdit="1"/>
+              </p:cNvSpPr>
+              <p:nvPr/>
+            </p:nvSpPr>
+            <p:spPr>
+              <a:xfrm>
+                <a:off x="6671388" y="2214694"/>
+                <a:ext cx="4697034" cy="3424107"/>
+              </a:xfrm>
+              <a:prstGeom prst="rect">
+                <a:avLst/>
+              </a:prstGeom>
+              <a:blipFill>
+                <a:blip r:embed="rId2"/>
+                <a:stretch>
+                  <a:fillRect/>
+                </a:stretch>
+              </a:blipFill>
+            </p:spPr>
+            <p:txBody>
+              <a:bodyPr/>
+              <a:lstStyle/>
+              <a:p>
+                <a:r>
+                  <a:rPr lang="he-IL">
+                    <a:noFill/>
+                  </a:rPr>
+                  <a:t> </a:t>
+                </a:r>
+              </a:p>
+            </p:txBody>
+          </p:sp>
+        </mc:Fallback>
+      </mc:AlternateContent>
     </p:spTree>
     <p:extLst>
       <p:ext uri="{BB962C8B-B14F-4D97-AF65-F5344CB8AC3E}">
@@ -10688,7 +11874,7 @@
         <p:spPr/>
         <p:txBody>
           <a:bodyPr>
-            <a:normAutofit/>
+            <a:normAutofit fontScale="92500"/>
           </a:bodyPr>
           <a:lstStyle/>
           <a:p>
@@ -10757,7 +11943,7 @@
             </a:pPr>
             <a:r>
               <a:rPr lang="en-US" sz="3200" dirty="0"/>
-              <a:t>Estimate potential F2 improvement for those slices.</a:t>
+              <a:t>Estimate overall F2 improvement expected as a result of performance improvement of a under-performing data slice.</a:t>
             </a:r>
           </a:p>
         </p:txBody>
@@ -10847,36 +12033,43 @@
             </a:pPr>
             <a:r>
               <a:rPr lang="en-US" dirty="0"/>
-              <a:t>Potential F2 improvement</a:t>
-            </a:r>
-          </a:p>
-          <a:p>
-            <a:pPr lvl="1" algn="l" rtl="0">
-              <a:buFont typeface="Courier New" panose="02070309020205020404" pitchFamily="49" charset="0"/>
-              <a:buChar char="o"/>
+              <a:t>Potential F2 improvement of a data slice:</a:t>
+            </a:r>
+          </a:p>
+          <a:p>
+            <a:pPr marL="0" indent="0" algn="l" rtl="0">
+              <a:buNone/>
             </a:pPr>
             <a:r>
               <a:rPr lang="en-US" dirty="0"/>
-              <a:t>focus on data slices which improvement with maximize overall F2 improvement</a:t>
-            </a:r>
-          </a:p>
-          <a:p>
-            <a:pPr lvl="1" algn="l" rtl="0">
-              <a:buFont typeface="Courier New" panose="02070309020205020404" pitchFamily="49" charset="0"/>
-              <a:buChar char="o"/>
+              <a:t>	</a:t>
+            </a:r>
+            <a:r>
+              <a:rPr lang="en-US" i="1" dirty="0"/>
+              <a:t>&lt;F2 of rest of data slices&gt;</a:t>
+            </a:r>
+            <a:r>
+              <a:rPr lang="en-US" dirty="0"/>
+              <a:t> - </a:t>
+            </a:r>
+            <a:r>
+              <a:rPr lang="en-US" i="1" dirty="0"/>
+              <a:t>&lt;overall F2&gt;</a:t>
+            </a:r>
+          </a:p>
+          <a:p>
+            <a:pPr marL="0" indent="0" algn="l" rtl="0">
+              <a:buNone/>
             </a:pPr>
+            <a:endParaRPr lang="en-US" dirty="0"/>
+          </a:p>
+          <a:p>
+            <a:pPr marL="0" indent="0" algn="l" rtl="0">
+              <a:buNone/>
+            </a:pPr>
             <a:r>
               <a:rPr lang="en-US" dirty="0"/>
-              <a:t>&lt;formula&gt;</a:t>
-            </a:r>
-          </a:p>
-          <a:p>
-            <a:pPr marL="457200" lvl="1" indent="0" algn="l" rtl="0">
-              <a:buNone/>
-            </a:pPr>
-            <a:r>
-              <a:rPr lang="en-US" dirty="0"/>
-              <a:t>&lt;F2 of other slices&gt; - &lt;F2 of overall&gt;</a:t>
+              <a:t>Focus on data slices which improvement with maximal overall F2 improvement</a:t>
             </a:r>
           </a:p>
           <a:p>

</xml_diff>

<commit_message>
Nitay's changes in Report section
</commit_message>
<xml_diff>
--- a/docs/MLOps Final Project.pptx
+++ b/docs/MLOps Final Project.pptx
@@ -33,8 +33,8 @@
     <p:sldId id="274" r:id="rId24"/>
     <p:sldId id="277" r:id="rId25"/>
     <p:sldId id="282" r:id="rId26"/>
-    <p:sldId id="286" r:id="rId27"/>
-    <p:sldId id="287" r:id="rId28"/>
+    <p:sldId id="288" r:id="rId27"/>
+    <p:sldId id="289" r:id="rId28"/>
     <p:sldId id="276" r:id="rId29"/>
     <p:sldId id="275" r:id="rId30"/>
     <p:sldId id="279" r:id="rId31"/>
@@ -749,6 +749,90 @@
           <a:bodyPr/>
           <a:lstStyle/>
           <a:p>
+            <a:endParaRPr lang="en-US" dirty="0"/>
+          </a:p>
+        </p:txBody>
+      </p:sp>
+      <p:sp>
+        <p:nvSpPr>
+          <p:cNvPr id="4" name="Slide Number Placeholder 3"/>
+          <p:cNvSpPr>
+            <a:spLocks noGrp="1"/>
+          </p:cNvSpPr>
+          <p:nvPr>
+            <p:ph type="sldNum" sz="quarter" idx="5"/>
+          </p:nvPr>
+        </p:nvSpPr>
+        <p:spPr/>
+        <p:txBody>
+          <a:bodyPr/>
+          <a:lstStyle/>
+          <a:p>
+            <a:fld id="{894B87DD-015A-4410-BE23-4EE1FA92658F}" type="slidenum">
+              <a:rPr lang="he-IL" smtClean="0"/>
+              <a:t>27</a:t>
+            </a:fld>
+            <a:endParaRPr lang="he-IL"/>
+          </a:p>
+        </p:txBody>
+      </p:sp>
+    </p:spTree>
+    <p:extLst>
+      <p:ext uri="{BB962C8B-B14F-4D97-AF65-F5344CB8AC3E}">
+        <p14:creationId xmlns:p14="http://schemas.microsoft.com/office/powerpoint/2010/main" val="2991689101"/>
+      </p:ext>
+    </p:extLst>
+  </p:cSld>
+  <p:clrMapOvr>
+    <a:masterClrMapping/>
+  </p:clrMapOvr>
+</p:notes>
+</file>
+
+<file path=ppt/notesSlides/notesSlide4.xml><?xml version="1.0" encoding="utf-8"?>
+<p:notes xmlns:a="http://schemas.openxmlformats.org/drawingml/2006/main" xmlns:r="http://schemas.openxmlformats.org/officeDocument/2006/relationships" xmlns:p="http://schemas.openxmlformats.org/presentationml/2006/main">
+  <p:cSld>
+    <p:spTree>
+      <p:nvGrpSpPr>
+        <p:cNvPr id="1" name=""/>
+        <p:cNvGrpSpPr/>
+        <p:nvPr/>
+      </p:nvGrpSpPr>
+      <p:grpSpPr>
+        <a:xfrm>
+          <a:off x="0" y="0"/>
+          <a:ext cx="0" cy="0"/>
+          <a:chOff x="0" y="0"/>
+          <a:chExt cx="0" cy="0"/>
+        </a:xfrm>
+      </p:grpSpPr>
+      <p:sp>
+        <p:nvSpPr>
+          <p:cNvPr id="2" name="Slide Image Placeholder 1"/>
+          <p:cNvSpPr>
+            <a:spLocks noGrp="1" noRot="1" noChangeAspect="1"/>
+          </p:cNvSpPr>
+          <p:nvPr>
+            <p:ph type="sldImg"/>
+          </p:nvPr>
+        </p:nvSpPr>
+        <p:spPr/>
+      </p:sp>
+      <p:sp>
+        <p:nvSpPr>
+          <p:cNvPr id="3" name="Notes Placeholder 2"/>
+          <p:cNvSpPr>
+            <a:spLocks noGrp="1"/>
+          </p:cNvSpPr>
+          <p:nvPr>
+            <p:ph type="body" idx="1"/>
+          </p:nvPr>
+        </p:nvSpPr>
+        <p:spPr/>
+        <p:txBody>
+          <a:bodyPr/>
+          <a:lstStyle/>
+          <a:p>
             <a:r>
               <a:rPr lang="en-US" dirty="0"/>
               <a:t>Use correlation matrix</a:t>
@@ -968,7 +1052,7 @@
           <a:p>
             <a:fld id="{48A87A34-81AB-432B-8DAE-1953F412C126}" type="datetimeFigureOut">
               <a:rPr lang="en-US" dirty="0"/>
-              <a:t>12-Feb-24</a:t>
+              <a:t>2/12/2024</a:t>
             </a:fld>
             <a:endParaRPr lang="en-US" dirty="0"/>
           </a:p>
@@ -1275,7 +1359,7 @@
           <a:p>
             <a:fld id="{48A87A34-81AB-432B-8DAE-1953F412C126}" type="datetimeFigureOut">
               <a:rPr lang="en-US" dirty="0"/>
-              <a:t>12-Feb-24</a:t>
+              <a:t>2/12/2024</a:t>
             </a:fld>
             <a:endParaRPr lang="en-US" dirty="0"/>
           </a:p>
@@ -1492,7 +1576,7 @@
           <a:p>
             <a:fld id="{48A87A34-81AB-432B-8DAE-1953F412C126}" type="datetimeFigureOut">
               <a:rPr lang="en-US" dirty="0"/>
-              <a:t>12-Feb-24</a:t>
+              <a:t>2/12/2024</a:t>
             </a:fld>
             <a:endParaRPr lang="en-US" dirty="0"/>
           </a:p>
@@ -1778,7 +1862,7 @@
           <a:p>
             <a:fld id="{48A87A34-81AB-432B-8DAE-1953F412C126}" type="datetimeFigureOut">
               <a:rPr lang="en-US" dirty="0"/>
-              <a:t>12-Feb-24</a:t>
+              <a:t>2/12/2024</a:t>
             </a:fld>
             <a:endParaRPr lang="en-US" dirty="0"/>
           </a:p>
@@ -2227,7 +2311,7 @@
           <a:p>
             <a:fld id="{48A87A34-81AB-432B-8DAE-1953F412C126}" type="datetimeFigureOut">
               <a:rPr lang="en-US" dirty="0"/>
-              <a:t>12-Feb-24</a:t>
+              <a:t>2/12/2024</a:t>
             </a:fld>
             <a:endParaRPr lang="en-US" dirty="0"/>
           </a:p>
@@ -2798,7 +2882,7 @@
           <a:p>
             <a:fld id="{48A87A34-81AB-432B-8DAE-1953F412C126}" type="datetimeFigureOut">
               <a:rPr lang="en-US" dirty="0"/>
-              <a:t>12-Feb-24</a:t>
+              <a:t>2/12/2024</a:t>
             </a:fld>
             <a:endParaRPr lang="en-US" dirty="0"/>
           </a:p>
@@ -3645,7 +3729,7 @@
           <a:p>
             <a:fld id="{48A87A34-81AB-432B-8DAE-1953F412C126}" type="datetimeFigureOut">
               <a:rPr lang="en-US" dirty="0"/>
-              <a:t>12-Feb-24</a:t>
+              <a:t>2/12/2024</a:t>
             </a:fld>
             <a:endParaRPr lang="en-US" dirty="0"/>
           </a:p>
@@ -3845,7 +3929,7 @@
           <a:p>
             <a:fld id="{48A87A34-81AB-432B-8DAE-1953F412C126}" type="datetimeFigureOut">
               <a:rPr lang="en-US" dirty="0"/>
-              <a:t>12-Feb-24</a:t>
+              <a:t>2/12/2024</a:t>
             </a:fld>
             <a:endParaRPr lang="en-US" dirty="0"/>
           </a:p>
@@ -4054,7 +4138,7 @@
           <a:p>
             <a:fld id="{48A87A34-81AB-432B-8DAE-1953F412C126}" type="datetimeFigureOut">
               <a:rPr lang="en-US" dirty="0"/>
-              <a:t>12-Feb-24</a:t>
+              <a:t>2/12/2024</a:t>
             </a:fld>
             <a:endParaRPr lang="en-US" dirty="0"/>
           </a:p>
@@ -4263,7 +4347,7 @@
           <a:p>
             <a:fld id="{48A87A34-81AB-432B-8DAE-1953F412C126}" type="datetimeFigureOut">
               <a:rPr lang="en-US" dirty="0"/>
-              <a:t>12-Feb-24</a:t>
+              <a:t>2/12/2024</a:t>
             </a:fld>
             <a:endParaRPr lang="en-US" dirty="0"/>
           </a:p>
@@ -4543,7 +4627,7 @@
           <a:p>
             <a:fld id="{48A87A34-81AB-432B-8DAE-1953F412C126}" type="datetimeFigureOut">
               <a:rPr lang="en-US" dirty="0"/>
-              <a:t>12-Feb-24</a:t>
+              <a:t>2/12/2024</a:t>
             </a:fld>
             <a:endParaRPr lang="en-US" dirty="0"/>
           </a:p>
@@ -4805,7 +4889,7 @@
           <a:p>
             <a:fld id="{48A87A34-81AB-432B-8DAE-1953F412C126}" type="datetimeFigureOut">
               <a:rPr lang="en-US" dirty="0"/>
-              <a:t>12-Feb-24</a:t>
+              <a:t>2/12/2024</a:t>
             </a:fld>
             <a:endParaRPr lang="en-US" dirty="0"/>
           </a:p>
@@ -5215,7 +5299,7 @@
           <a:p>
             <a:fld id="{48A87A34-81AB-432B-8DAE-1953F412C126}" type="datetimeFigureOut">
               <a:rPr lang="en-US" dirty="0"/>
-              <a:t>12-Feb-24</a:t>
+              <a:t>2/12/2024</a:t>
             </a:fld>
             <a:endParaRPr lang="en-US" dirty="0"/>
           </a:p>
@@ -5358,7 +5442,7 @@
           <a:p>
             <a:fld id="{48A87A34-81AB-432B-8DAE-1953F412C126}" type="datetimeFigureOut">
               <a:rPr lang="en-US" dirty="0"/>
-              <a:t>12-Feb-24</a:t>
+              <a:t>2/12/2024</a:t>
             </a:fld>
             <a:endParaRPr lang="en-US" dirty="0"/>
           </a:p>
@@ -5478,7 +5562,7 @@
           <a:p>
             <a:fld id="{48A87A34-81AB-432B-8DAE-1953F412C126}" type="datetimeFigureOut">
               <a:rPr lang="en-US" dirty="0"/>
-              <a:t>12-Feb-24</a:t>
+              <a:t>2/12/2024</a:t>
             </a:fld>
             <a:endParaRPr lang="en-US" dirty="0"/>
           </a:p>
@@ -5752,7 +5836,7 @@
           <a:p>
             <a:fld id="{48A87A34-81AB-432B-8DAE-1953F412C126}" type="datetimeFigureOut">
               <a:rPr lang="en-US" dirty="0"/>
-              <a:t>12-Feb-24</a:t>
+              <a:t>2/12/2024</a:t>
             </a:fld>
             <a:endParaRPr lang="en-US" dirty="0"/>
           </a:p>
@@ -6059,7 +6143,7 @@
           <a:p>
             <a:fld id="{48A87A34-81AB-432B-8DAE-1953F412C126}" type="datetimeFigureOut">
               <a:rPr lang="en-US" dirty="0"/>
-              <a:t>12-Feb-24</a:t>
+              <a:t>2/12/2024</a:t>
             </a:fld>
             <a:endParaRPr lang="en-US" dirty="0"/>
           </a:p>
@@ -6306,7 +6390,7 @@
             <a:fld id="{48A87A34-81AB-432B-8DAE-1953F412C126}" type="datetimeFigureOut">
               <a:rPr lang="en-US" dirty="0"/>
               <a:pPr/>
-              <a:t>12-Feb-24</a:t>
+              <a:t>2/12/2024</a:t>
             </a:fld>
             <a:endParaRPr lang="en-US" dirty="0"/>
           </a:p>
@@ -9313,36 +9397,96 @@
           </a:p>
         </p:txBody>
       </p:sp>
-      <p:sp>
-        <p:nvSpPr>
-          <p:cNvPr id="5" name="Content Placeholder 4">
+      <p:pic>
+        <p:nvPicPr>
+          <p:cNvPr id="3" name="Picture 2" descr="A graph of a slice&#10;&#10;Description automatically generated with medium confidence">
             <a:extLst>
               <a:ext uri="{FF2B5EF4-FFF2-40B4-BE49-F238E27FC236}">
-                <a16:creationId xmlns:a16="http://schemas.microsoft.com/office/drawing/2014/main" id="{EAE03400-D284-9C48-FF87-998796FA8467}"/>
+                <a16:creationId xmlns:a16="http://schemas.microsoft.com/office/drawing/2014/main" id="{BB11AFF7-F58E-CDC5-34C5-96958D0DD309}"/>
               </a:ext>
             </a:extLst>
           </p:cNvPr>
-          <p:cNvSpPr>
-            <a:spLocks noGrp="1"/>
-          </p:cNvSpPr>
-          <p:nvPr>
-            <p:ph sz="quarter" idx="13"/>
-          </p:nvPr>
-        </p:nvSpPr>
-        <p:spPr/>
-        <p:txBody>
-          <a:bodyPr/>
-          <a:lstStyle/>
-          <a:p>
-            <a:pPr algn="l" rtl="0"/>
-            <a:r>
-              <a:rPr lang="en-US" dirty="0"/>
-              <a:t>3 graphs</a:t>
-            </a:r>
-            <a:endParaRPr lang="he-IL" dirty="0"/>
-          </a:p>
-        </p:txBody>
-      </p:sp>
+          <p:cNvPicPr>
+            <a:picLocks noChangeAspect="1"/>
+          </p:cNvPicPr>
+          <p:nvPr/>
+        </p:nvPicPr>
+        <p:blipFill>
+          <a:blip r:embed="rId2"/>
+          <a:stretch>
+            <a:fillRect/>
+          </a:stretch>
+        </p:blipFill>
+        <p:spPr>
+          <a:xfrm>
+            <a:off x="6684264" y="1628960"/>
+            <a:ext cx="5142075" cy="3085245"/>
+          </a:xfrm>
+          <a:prstGeom prst="rect">
+            <a:avLst/>
+          </a:prstGeom>
+        </p:spPr>
+      </p:pic>
+      <p:pic>
+        <p:nvPicPr>
+          <p:cNvPr id="7" name="Picture 6" descr="A graph of blue rectangular bars&#10;&#10;Description automatically generated with medium confidence">
+            <a:extLst>
+              <a:ext uri="{FF2B5EF4-FFF2-40B4-BE49-F238E27FC236}">
+                <a16:creationId xmlns:a16="http://schemas.microsoft.com/office/drawing/2014/main" id="{44C0AF68-9EEB-562D-2CF1-F6F6A36A21D4}"/>
+              </a:ext>
+            </a:extLst>
+          </p:cNvPr>
+          <p:cNvPicPr>
+            <a:picLocks noChangeAspect="1"/>
+          </p:cNvPicPr>
+          <p:nvPr/>
+        </p:nvPicPr>
+        <p:blipFill>
+          <a:blip r:embed="rId3"/>
+          <a:stretch>
+            <a:fillRect/>
+          </a:stretch>
+        </p:blipFill>
+        <p:spPr>
+          <a:xfrm>
+            <a:off x="231050" y="1628961"/>
+            <a:ext cx="5023910" cy="3014346"/>
+          </a:xfrm>
+          <a:prstGeom prst="rect">
+            <a:avLst/>
+          </a:prstGeom>
+        </p:spPr>
+      </p:pic>
+      <p:pic>
+        <p:nvPicPr>
+          <p:cNvPr id="9" name="Picture 8" descr="A graph of blue squares&#10;&#10;Description automatically generated with medium confidence">
+            <a:extLst>
+              <a:ext uri="{FF2B5EF4-FFF2-40B4-BE49-F238E27FC236}">
+                <a16:creationId xmlns:a16="http://schemas.microsoft.com/office/drawing/2014/main" id="{62719826-F876-30FE-8CF0-B333E6B344D8}"/>
+              </a:ext>
+            </a:extLst>
+          </p:cNvPr>
+          <p:cNvPicPr>
+            <a:picLocks noChangeAspect="1"/>
+          </p:cNvPicPr>
+          <p:nvPr/>
+        </p:nvPicPr>
+        <p:blipFill>
+          <a:blip r:embed="rId4"/>
+          <a:stretch>
+            <a:fillRect/>
+          </a:stretch>
+        </p:blipFill>
+        <p:spPr>
+          <a:xfrm>
+            <a:off x="3568757" y="4777284"/>
+            <a:ext cx="5224408" cy="1957305"/>
+          </a:xfrm>
+          <a:prstGeom prst="rect">
+            <a:avLst/>
+          </a:prstGeom>
+        </p:spPr>
+      </p:pic>
     </p:spTree>
     <p:extLst>
       <p:ext uri="{BB962C8B-B14F-4D97-AF65-F5344CB8AC3E}">
@@ -9364,7 +9508,7 @@
         <p:cNvPr id="1" name="">
           <a:extLst>
             <a:ext uri="{FF2B5EF4-FFF2-40B4-BE49-F238E27FC236}">
-              <a16:creationId xmlns:a16="http://schemas.microsoft.com/office/drawing/2014/main" id="{BA8B3184-D034-C81C-72FF-EB3F29328628}"/>
+              <a16:creationId xmlns:a16="http://schemas.microsoft.com/office/drawing/2014/main" id="{99EE38F9-D638-D9F7-E253-2E22EF69D1EF}"/>
             </a:ext>
           </a:extLst>
         </p:cNvPr>
@@ -9384,7 +9528,7 @@
           <p:cNvPr id="4" name="Title 3">
             <a:extLst>
               <a:ext uri="{FF2B5EF4-FFF2-40B4-BE49-F238E27FC236}">
-                <a16:creationId xmlns:a16="http://schemas.microsoft.com/office/drawing/2014/main" id="{B9796361-33EB-EEDC-7251-C77943B87D2B}"/>
+                <a16:creationId xmlns:a16="http://schemas.microsoft.com/office/drawing/2014/main" id="{64AA09A9-EDDF-7F45-DCE1-57F31BA512BA}"/>
               </a:ext>
             </a:extLst>
           </p:cNvPr>
@@ -9401,16 +9545,20 @@
           <a:lstStyle/>
           <a:p>
             <a:pPr rtl="0"/>
+            <a:r>
+              <a:rPr lang="en-US" dirty="0"/>
+              <a:t>Summary and notes</a:t>
+            </a:r>
             <a:endParaRPr lang="he-IL" dirty="0"/>
           </a:p>
         </p:txBody>
       </p:sp>
       <p:sp>
         <p:nvSpPr>
-          <p:cNvPr id="5" name="Content Placeholder 4">
+          <p:cNvPr id="2" name="Content Placeholder 4">
             <a:extLst>
               <a:ext uri="{FF2B5EF4-FFF2-40B4-BE49-F238E27FC236}">
-                <a16:creationId xmlns:a16="http://schemas.microsoft.com/office/drawing/2014/main" id="{208A68BF-ECEA-6C77-B7B0-557477171E7F}"/>
+                <a16:creationId xmlns:a16="http://schemas.microsoft.com/office/drawing/2014/main" id="{DBE07DDF-F6B8-381C-964D-B1B99FD9F1E3}"/>
               </a:ext>
             </a:extLst>
           </p:cNvPr>
@@ -9421,33 +9569,66 @@
             <p:ph sz="quarter" idx="13"/>
           </p:nvPr>
         </p:nvSpPr>
-        <p:spPr/>
-        <p:txBody>
-          <a:bodyPr/>
+        <p:spPr>
+          <a:xfrm>
+            <a:off x="913774" y="1764792"/>
+            <a:ext cx="10363826" cy="4937760"/>
+          </a:xfrm>
+        </p:spPr>
+        <p:txBody>
+          <a:bodyPr>
+            <a:normAutofit/>
+          </a:bodyPr>
           <a:lstStyle/>
           <a:p>
             <a:pPr algn="l" rtl="0"/>
             <a:r>
               <a:rPr lang="en-US" dirty="0"/>
-              <a:t>The potential improvement we got using our modification is less than original FreaAI</a:t>
-            </a:r>
+              <a:t>Does our modification helps? </a:t>
+            </a:r>
+            <a:endParaRPr lang="he-IL" dirty="0"/>
+          </a:p>
+          <a:p>
+            <a:pPr algn="l" rtl="0"/>
+            <a:r>
+              <a:rPr lang="en-US" dirty="0"/>
+              <a:t>The potential improvement we got using our modification is less than original </a:t>
+            </a:r>
+            <a:r>
+              <a:rPr lang="en-US" dirty="0" err="1"/>
+              <a:t>FreaAI</a:t>
+            </a:r>
+            <a:endParaRPr lang="en-US" dirty="0"/>
+          </a:p>
+          <a:p>
+            <a:pPr algn="l" rtl="0"/>
+            <a:endParaRPr lang="he-IL" dirty="0"/>
+          </a:p>
+          <a:p>
+            <a:pPr algn="l" rtl="0"/>
+            <a:endParaRPr lang="he-IL" dirty="0"/>
           </a:p>
           <a:p>
             <a:pPr marL="0" indent="0" algn="l" rtl="0">
               <a:buNone/>
             </a:pPr>
-            <a:r>
-              <a:rPr lang="en-US" dirty="0"/>
-              <a:t>&lt;add 2</a:t>
-            </a:r>
-            <a:r>
-              <a:rPr lang="en-US" baseline="30000" dirty="0"/>
-              <a:t>nd</a:t>
-            </a:r>
-            <a:r>
-              <a:rPr lang="en-US" dirty="0"/>
-              <a:t> couple of trees&gt;</a:t>
-            </a:r>
+            <a:endParaRPr lang="he-IL" dirty="0"/>
+          </a:p>
+          <a:p>
+            <a:pPr algn="l" rtl="0"/>
+            <a:endParaRPr lang="he-IL" dirty="0"/>
+          </a:p>
+          <a:p>
+            <a:pPr marL="0" indent="0" algn="l" rtl="0">
+              <a:buNone/>
+            </a:pPr>
+            <a:endParaRPr lang="en-US" dirty="0"/>
+          </a:p>
+          <a:p>
+            <a:pPr marL="0" indent="0" algn="l" rtl="0">
+              <a:buNone/>
+            </a:pPr>
+            <a:endParaRPr lang="he-IL" dirty="0"/>
           </a:p>
           <a:p>
             <a:pPr algn="l" rtl="0"/>
@@ -9463,13 +9644,143 @@
               <a:t>Number of samples per node is large and therefore many nodes were dropped</a:t>
             </a:r>
             <a:endParaRPr lang="he-IL" dirty="0"/>
+          </a:p>
+        </p:txBody>
+      </p:sp>
+      <p:pic>
+        <p:nvPicPr>
+          <p:cNvPr id="6" name="Picture 5" descr="A diagram of a diagram&#10;&#10;Description automatically generated with medium confidence">
+            <a:extLst>
+              <a:ext uri="{FF2B5EF4-FFF2-40B4-BE49-F238E27FC236}">
+                <a16:creationId xmlns:a16="http://schemas.microsoft.com/office/drawing/2014/main" id="{6245B1A3-2F64-AB80-3E02-8CADD209A822}"/>
+              </a:ext>
+            </a:extLst>
+          </p:cNvPr>
+          <p:cNvPicPr>
+            <a:picLocks noChangeAspect="1"/>
+          </p:cNvPicPr>
+          <p:nvPr/>
+        </p:nvPicPr>
+        <p:blipFill>
+          <a:blip r:embed="rId2"/>
+          <a:stretch>
+            <a:fillRect/>
+          </a:stretch>
+        </p:blipFill>
+        <p:spPr>
+          <a:xfrm>
+            <a:off x="5462016" y="2828990"/>
+            <a:ext cx="6729984" cy="3499104"/>
+          </a:xfrm>
+          <a:prstGeom prst="rect">
+            <a:avLst/>
+          </a:prstGeom>
+        </p:spPr>
+      </p:pic>
+      <p:pic>
+        <p:nvPicPr>
+          <p:cNvPr id="10" name="Picture 9" descr="A diagram of a number of numbers&#10;&#10;Description automatically generated with medium confidence">
+            <a:extLst>
+              <a:ext uri="{FF2B5EF4-FFF2-40B4-BE49-F238E27FC236}">
+                <a16:creationId xmlns:a16="http://schemas.microsoft.com/office/drawing/2014/main" id="{779D5F16-D3B1-58CE-4B80-C5B78D5043B8}"/>
+              </a:ext>
+            </a:extLst>
+          </p:cNvPr>
+          <p:cNvPicPr>
+            <a:picLocks noChangeAspect="1"/>
+          </p:cNvPicPr>
+          <p:nvPr/>
+        </p:nvPicPr>
+        <p:blipFill>
+          <a:blip r:embed="rId3"/>
+          <a:stretch>
+            <a:fillRect/>
+          </a:stretch>
+        </p:blipFill>
+        <p:spPr>
+          <a:xfrm>
+            <a:off x="1077696" y="3161746"/>
+            <a:ext cx="3469920" cy="1734960"/>
+          </a:xfrm>
+          <a:prstGeom prst="rect">
+            <a:avLst/>
+          </a:prstGeom>
+        </p:spPr>
+      </p:pic>
+      <p:sp>
+        <p:nvSpPr>
+          <p:cNvPr id="12" name="TextBox 11">
+            <a:extLst>
+              <a:ext uri="{FF2B5EF4-FFF2-40B4-BE49-F238E27FC236}">
+                <a16:creationId xmlns:a16="http://schemas.microsoft.com/office/drawing/2014/main" id="{4113DB39-F343-9765-534B-94884D1BB13C}"/>
+              </a:ext>
+            </a:extLst>
+          </p:cNvPr>
+          <p:cNvSpPr txBox="1"/>
+          <p:nvPr/>
+        </p:nvSpPr>
+        <p:spPr>
+          <a:xfrm>
+            <a:off x="1281599" y="3317915"/>
+            <a:ext cx="6094476" cy="369332"/>
+          </a:xfrm>
+          <a:prstGeom prst="rect">
+            <a:avLst/>
+          </a:prstGeom>
+          <a:noFill/>
+        </p:spPr>
+        <p:txBody>
+          <a:bodyPr wrap="square">
+            <a:spAutoFit/>
+          </a:bodyPr>
+          <a:lstStyle/>
+          <a:p>
+            <a:r>
+              <a:rPr lang="en-US" dirty="0"/>
+              <a:t>Modified tree</a:t>
+            </a:r>
+          </a:p>
+        </p:txBody>
+      </p:sp>
+      <p:sp>
+        <p:nvSpPr>
+          <p:cNvPr id="13" name="TextBox 12">
+            <a:extLst>
+              <a:ext uri="{FF2B5EF4-FFF2-40B4-BE49-F238E27FC236}">
+                <a16:creationId xmlns:a16="http://schemas.microsoft.com/office/drawing/2014/main" id="{A1A37EFF-193C-2192-217F-B6F1CC2604E1}"/>
+              </a:ext>
+            </a:extLst>
+          </p:cNvPr>
+          <p:cNvSpPr txBox="1"/>
+          <p:nvPr/>
+        </p:nvSpPr>
+        <p:spPr>
+          <a:xfrm>
+            <a:off x="5593080" y="2644324"/>
+            <a:ext cx="6094476" cy="369332"/>
+          </a:xfrm>
+          <a:prstGeom prst="rect">
+            <a:avLst/>
+          </a:prstGeom>
+          <a:noFill/>
+        </p:spPr>
+        <p:txBody>
+          <a:bodyPr wrap="square">
+            <a:spAutoFit/>
+          </a:bodyPr>
+          <a:lstStyle/>
+          <a:p>
+            <a:r>
+              <a:rPr lang="en-US" dirty="0"/>
+              <a:t>Original tree</a:t>
+            </a:r>
           </a:p>
         </p:txBody>
       </p:sp>
     </p:spTree>
     <p:extLst>
       <p:ext uri="{BB962C8B-B14F-4D97-AF65-F5344CB8AC3E}">
-        <p14:creationId xmlns:p14="http://schemas.microsoft.com/office/powerpoint/2010/main" val="2258968697"/>
+        <p14:creationId xmlns:p14="http://schemas.microsoft.com/office/powerpoint/2010/main" val="2407745157"/>
       </p:ext>
     </p:extLst>
   </p:cSld>
@@ -9484,7 +9795,13 @@
   <p:cSld>
     <p:spTree>
       <p:nvGrpSpPr>
-        <p:cNvPr id="1" name=""/>
+        <p:cNvPr id="1" name="">
+          <a:extLst>
+            <a:ext uri="{FF2B5EF4-FFF2-40B4-BE49-F238E27FC236}">
+              <a16:creationId xmlns:a16="http://schemas.microsoft.com/office/drawing/2014/main" id="{CF58B648-FF61-CF63-927A-EB27845786DA}"/>
+            </a:ext>
+          </a:extLst>
+        </p:cNvPr>
         <p:cNvGrpSpPr/>
         <p:nvPr/>
       </p:nvGrpSpPr>
@@ -9498,10 +9815,10 @@
       </p:grpSpPr>
       <p:sp>
         <p:nvSpPr>
-          <p:cNvPr id="2" name="Title 1">
+          <p:cNvPr id="4" name="Title 3">
             <a:extLst>
               <a:ext uri="{FF2B5EF4-FFF2-40B4-BE49-F238E27FC236}">
-                <a16:creationId xmlns:a16="http://schemas.microsoft.com/office/drawing/2014/main" id="{A3801608-5897-3518-0AA7-31219D68B2E2}"/>
+                <a16:creationId xmlns:a16="http://schemas.microsoft.com/office/drawing/2014/main" id="{FFF7B0AF-4BEB-E341-FC20-76B0F9A9DC86}"/>
               </a:ext>
             </a:extLst>
           </p:cNvPr>
@@ -9517,16 +9834,21 @@
           <a:bodyPr/>
           <a:lstStyle/>
           <a:p>
-            <a:endParaRPr lang="he-IL"/>
-          </a:p>
-        </p:txBody>
-      </p:sp>
-      <p:sp>
-        <p:nvSpPr>
-          <p:cNvPr id="3" name="Content Placeholder 2">
+            <a:pPr rtl="0"/>
+            <a:r>
+              <a:rPr lang="en-US" dirty="0"/>
+              <a:t>Summary and notes</a:t>
+            </a:r>
+            <a:endParaRPr lang="he-IL" dirty="0"/>
+          </a:p>
+        </p:txBody>
+      </p:sp>
+      <p:sp>
+        <p:nvSpPr>
+          <p:cNvPr id="2" name="Content Placeholder 4">
             <a:extLst>
               <a:ext uri="{FF2B5EF4-FFF2-40B4-BE49-F238E27FC236}">
-                <a16:creationId xmlns:a16="http://schemas.microsoft.com/office/drawing/2014/main" id="{05B2259C-E6D9-7174-2A6C-F29C9E807E58}"/>
+                <a16:creationId xmlns:a16="http://schemas.microsoft.com/office/drawing/2014/main" id="{076B6187-0F34-EFCF-54DB-005B257D0F97}"/>
               </a:ext>
             </a:extLst>
           </p:cNvPr>
@@ -9537,20 +9859,71 @@
             <p:ph sz="quarter" idx="13"/>
           </p:nvPr>
         </p:nvSpPr>
-        <p:spPr/>
-        <p:txBody>
-          <a:bodyPr/>
+        <p:spPr>
+          <a:xfrm>
+            <a:off x="913774" y="1764792"/>
+            <a:ext cx="10363826" cy="4937760"/>
+          </a:xfrm>
+        </p:spPr>
+        <p:txBody>
+          <a:bodyPr>
+            <a:normAutofit/>
+          </a:bodyPr>
           <a:lstStyle/>
           <a:p>
             <a:pPr algn="l" rtl="0"/>
+            <a:r>
+              <a:rPr lang="en-US" dirty="0"/>
+              <a:t>Consider again nodes’ filtering heuristic.</a:t>
+            </a:r>
+          </a:p>
+          <a:p>
+            <a:pPr algn="l" rtl="0"/>
+            <a:r>
+              <a:rPr lang="en-US" dirty="0"/>
+              <a:t>Is a large data slice for improvement is as good input to phase 2?</a:t>
+            </a:r>
+          </a:p>
+          <a:p>
+            <a:pPr algn="l" rtl="0"/>
+            <a:r>
+              <a:rPr lang="en-US" dirty="0"/>
+              <a:t>Features combination finds slices which their improvement can contributes more to the overall F2.</a:t>
+            </a:r>
+          </a:p>
+          <a:p>
+            <a:pPr algn="l" rtl="0"/>
+            <a:r>
+              <a:rPr lang="en-US" dirty="0"/>
+              <a:t>Does improving multiple feature slice in possible?</a:t>
+            </a:r>
             <a:endParaRPr lang="he-IL" dirty="0"/>
+          </a:p>
+          <a:p>
+            <a:pPr algn="l" rtl="0"/>
+            <a:r>
+              <a:rPr lang="en-US" dirty="0"/>
+              <a:t>Identifying bad slices in anomaly detection problem is difficult.</a:t>
+            </a:r>
+            <a:endParaRPr lang="he-IL" dirty="0"/>
+          </a:p>
+          <a:p>
+            <a:pPr algn="l" rtl="0"/>
+            <a:r>
+              <a:rPr lang="en-US" dirty="0" err="1"/>
+              <a:t>MLOps</a:t>
+            </a:r>
+            <a:r>
+              <a:rPr lang="en-US" dirty="0"/>
+              <a:t> is a cycle. We tried to implement specific phase in the cycle without knowing how it will affect the next phases. Feedbacks from phase 2 can help us improve the recommendations we give in phase 1.</a:t>
+            </a:r>
           </a:p>
         </p:txBody>
       </p:sp>
     </p:spTree>
     <p:extLst>
       <p:ext uri="{BB962C8B-B14F-4D97-AF65-F5344CB8AC3E}">
-        <p14:creationId xmlns:p14="http://schemas.microsoft.com/office/powerpoint/2010/main" val="3373937242"/>
+        <p14:creationId xmlns:p14="http://schemas.microsoft.com/office/powerpoint/2010/main" val="3181993107"/>
       </p:ext>
     </p:extLst>
   </p:cSld>
@@ -11055,8 +11428,8 @@
           </a:p>
         </p:txBody>
       </p:sp>
-      <mc:AlternateContent xmlns:mc="http://schemas.openxmlformats.org/markup-compatibility/2006">
-        <mc:Choice xmlns:a14="http://schemas.microsoft.com/office/drawing/2010/main" Requires="a14">
+      <mc:AlternateContent xmlns:mc="http://schemas.openxmlformats.org/markup-compatibility/2006" xmlns:a14="http://schemas.microsoft.com/office/drawing/2010/main">
+        <mc:Choice Requires="a14">
           <p:sp>
             <p:nvSpPr>
               <p:cNvPr id="4" name="Content Placeholder 2">
@@ -11750,7 +12123,7 @@
             </p:txBody>
           </p:sp>
         </mc:Choice>
-        <mc:Fallback>
+        <mc:Fallback xmlns="">
           <p:sp>
             <p:nvSpPr>
               <p:cNvPr id="4" name="Content Placeholder 2">

</xml_diff>

<commit_message>
For the presentation in class
</commit_message>
<xml_diff>
--- a/docs/MLOps Final Project.pptx
+++ b/docs/MLOps Final Project.pptx
@@ -233,7 +233,7 @@
           <a:p>
             <a:fld id="{7C27A723-51FE-45AC-AC04-AE77775347B3}" type="datetimeFigureOut">
               <a:rPr lang="he-IL" smtClean="0"/>
-              <a:t>ג'/אדר א/תשפ"ד</a:t>
+              <a:t>ה'/אדר א/תשפ"ד</a:t>
             </a:fld>
             <a:endParaRPr lang="he-IL"/>
           </a:p>
@@ -1056,7 +1056,7 @@
           <a:p>
             <a:fld id="{48A87A34-81AB-432B-8DAE-1953F412C126}" type="datetimeFigureOut">
               <a:rPr lang="en-US" dirty="0"/>
-              <a:t>12-Feb-24</a:t>
+              <a:t>14-Feb-24</a:t>
             </a:fld>
             <a:endParaRPr lang="en-US" dirty="0"/>
           </a:p>
@@ -1363,7 +1363,7 @@
           <a:p>
             <a:fld id="{48A87A34-81AB-432B-8DAE-1953F412C126}" type="datetimeFigureOut">
               <a:rPr lang="en-US" dirty="0"/>
-              <a:t>12-Feb-24</a:t>
+              <a:t>14-Feb-24</a:t>
             </a:fld>
             <a:endParaRPr lang="en-US" dirty="0"/>
           </a:p>
@@ -1580,7 +1580,7 @@
           <a:p>
             <a:fld id="{48A87A34-81AB-432B-8DAE-1953F412C126}" type="datetimeFigureOut">
               <a:rPr lang="en-US" dirty="0"/>
-              <a:t>12-Feb-24</a:t>
+              <a:t>14-Feb-24</a:t>
             </a:fld>
             <a:endParaRPr lang="en-US" dirty="0"/>
           </a:p>
@@ -1866,7 +1866,7 @@
           <a:p>
             <a:fld id="{48A87A34-81AB-432B-8DAE-1953F412C126}" type="datetimeFigureOut">
               <a:rPr lang="en-US" dirty="0"/>
-              <a:t>12-Feb-24</a:t>
+              <a:t>14-Feb-24</a:t>
             </a:fld>
             <a:endParaRPr lang="en-US" dirty="0"/>
           </a:p>
@@ -2315,7 +2315,7 @@
           <a:p>
             <a:fld id="{48A87A34-81AB-432B-8DAE-1953F412C126}" type="datetimeFigureOut">
               <a:rPr lang="en-US" dirty="0"/>
-              <a:t>12-Feb-24</a:t>
+              <a:t>14-Feb-24</a:t>
             </a:fld>
             <a:endParaRPr lang="en-US" dirty="0"/>
           </a:p>
@@ -2886,7 +2886,7 @@
           <a:p>
             <a:fld id="{48A87A34-81AB-432B-8DAE-1953F412C126}" type="datetimeFigureOut">
               <a:rPr lang="en-US" dirty="0"/>
-              <a:t>12-Feb-24</a:t>
+              <a:t>14-Feb-24</a:t>
             </a:fld>
             <a:endParaRPr lang="en-US" dirty="0"/>
           </a:p>
@@ -3733,7 +3733,7 @@
           <a:p>
             <a:fld id="{48A87A34-81AB-432B-8DAE-1953F412C126}" type="datetimeFigureOut">
               <a:rPr lang="en-US" dirty="0"/>
-              <a:t>12-Feb-24</a:t>
+              <a:t>14-Feb-24</a:t>
             </a:fld>
             <a:endParaRPr lang="en-US" dirty="0"/>
           </a:p>
@@ -3933,7 +3933,7 @@
           <a:p>
             <a:fld id="{48A87A34-81AB-432B-8DAE-1953F412C126}" type="datetimeFigureOut">
               <a:rPr lang="en-US" dirty="0"/>
-              <a:t>12-Feb-24</a:t>
+              <a:t>14-Feb-24</a:t>
             </a:fld>
             <a:endParaRPr lang="en-US" dirty="0"/>
           </a:p>
@@ -4142,7 +4142,7 @@
           <a:p>
             <a:fld id="{48A87A34-81AB-432B-8DAE-1953F412C126}" type="datetimeFigureOut">
               <a:rPr lang="en-US" dirty="0"/>
-              <a:t>12-Feb-24</a:t>
+              <a:t>14-Feb-24</a:t>
             </a:fld>
             <a:endParaRPr lang="en-US" dirty="0"/>
           </a:p>
@@ -4351,7 +4351,7 @@
           <a:p>
             <a:fld id="{48A87A34-81AB-432B-8DAE-1953F412C126}" type="datetimeFigureOut">
               <a:rPr lang="en-US" dirty="0"/>
-              <a:t>12-Feb-24</a:t>
+              <a:t>14-Feb-24</a:t>
             </a:fld>
             <a:endParaRPr lang="en-US" dirty="0"/>
           </a:p>
@@ -4631,7 +4631,7 @@
           <a:p>
             <a:fld id="{48A87A34-81AB-432B-8DAE-1953F412C126}" type="datetimeFigureOut">
               <a:rPr lang="en-US" dirty="0"/>
-              <a:t>12-Feb-24</a:t>
+              <a:t>14-Feb-24</a:t>
             </a:fld>
             <a:endParaRPr lang="en-US" dirty="0"/>
           </a:p>
@@ -4893,7 +4893,7 @@
           <a:p>
             <a:fld id="{48A87A34-81AB-432B-8DAE-1953F412C126}" type="datetimeFigureOut">
               <a:rPr lang="en-US" dirty="0"/>
-              <a:t>12-Feb-24</a:t>
+              <a:t>14-Feb-24</a:t>
             </a:fld>
             <a:endParaRPr lang="en-US" dirty="0"/>
           </a:p>
@@ -5303,7 +5303,7 @@
           <a:p>
             <a:fld id="{48A87A34-81AB-432B-8DAE-1953F412C126}" type="datetimeFigureOut">
               <a:rPr lang="en-US" dirty="0"/>
-              <a:t>12-Feb-24</a:t>
+              <a:t>14-Feb-24</a:t>
             </a:fld>
             <a:endParaRPr lang="en-US" dirty="0"/>
           </a:p>
@@ -5446,7 +5446,7 @@
           <a:p>
             <a:fld id="{48A87A34-81AB-432B-8DAE-1953F412C126}" type="datetimeFigureOut">
               <a:rPr lang="en-US" dirty="0"/>
-              <a:t>12-Feb-24</a:t>
+              <a:t>14-Feb-24</a:t>
             </a:fld>
             <a:endParaRPr lang="en-US" dirty="0"/>
           </a:p>
@@ -5566,7 +5566,7 @@
           <a:p>
             <a:fld id="{48A87A34-81AB-432B-8DAE-1953F412C126}" type="datetimeFigureOut">
               <a:rPr lang="en-US" dirty="0"/>
-              <a:t>12-Feb-24</a:t>
+              <a:t>14-Feb-24</a:t>
             </a:fld>
             <a:endParaRPr lang="en-US" dirty="0"/>
           </a:p>
@@ -5840,7 +5840,7 @@
           <a:p>
             <a:fld id="{48A87A34-81AB-432B-8DAE-1953F412C126}" type="datetimeFigureOut">
               <a:rPr lang="en-US" dirty="0"/>
-              <a:t>12-Feb-24</a:t>
+              <a:t>14-Feb-24</a:t>
             </a:fld>
             <a:endParaRPr lang="en-US" dirty="0"/>
           </a:p>
@@ -6147,7 +6147,7 @@
           <a:p>
             <a:fld id="{48A87A34-81AB-432B-8DAE-1953F412C126}" type="datetimeFigureOut">
               <a:rPr lang="en-US" dirty="0"/>
-              <a:t>12-Feb-24</a:t>
+              <a:t>14-Feb-24</a:t>
             </a:fld>
             <a:endParaRPr lang="en-US" dirty="0"/>
           </a:p>
@@ -6394,7 +6394,7 @@
             <a:fld id="{48A87A34-81AB-432B-8DAE-1953F412C126}" type="datetimeFigureOut">
               <a:rPr lang="en-US" dirty="0"/>
               <a:pPr/>
-              <a:t>12-Feb-24</a:t>
+              <a:t>14-Feb-24</a:t>
             </a:fld>
             <a:endParaRPr lang="en-US" dirty="0"/>
           </a:p>
@@ -7126,7 +7126,7 @@
             </a:pPr>
             <a:r>
               <a:rPr lang="en-US" dirty="0"/>
-              <a:t>Y:	  ‘True’ = original model correctly predicted the original output</a:t>
+              <a:t>y:	  ‘True’ = original model correctly predicted the original output</a:t>
             </a:r>
           </a:p>
           <a:p>
@@ -7150,7 +7150,7 @@
             </a:pPr>
             <a:r>
               <a:rPr lang="en-US" dirty="0"/>
-              <a:t>Build the tree</a:t>
+              <a:t>Build the decision tree</a:t>
             </a:r>
           </a:p>
           <a:p>
@@ -8298,6 +8298,211 @@
           </a:p>
         </p:txBody>
       </p:sp>
+      <mc:AlternateContent xmlns:mc="http://schemas.openxmlformats.org/markup-compatibility/2006">
+        <mc:Choice xmlns:a14="http://schemas.microsoft.com/office/drawing/2010/main" Requires="a14">
+          <p:sp>
+            <p:nvSpPr>
+              <p:cNvPr id="7" name="TextBox 6">
+                <a:extLst>
+                  <a:ext uri="{FF2B5EF4-FFF2-40B4-BE49-F238E27FC236}">
+                    <a16:creationId xmlns:a16="http://schemas.microsoft.com/office/drawing/2014/main" id="{5E7ABAC6-E727-90B4-B178-B07C7AB5BA20}"/>
+                  </a:ext>
+                </a:extLst>
+              </p:cNvPr>
+              <p:cNvSpPr txBox="1"/>
+              <p:nvPr/>
+            </p:nvSpPr>
+            <p:spPr>
+              <a:xfrm>
+                <a:off x="9610759" y="2387413"/>
+                <a:ext cx="2229433" cy="475771"/>
+              </a:xfrm>
+              <a:prstGeom prst="rect">
+                <a:avLst/>
+              </a:prstGeom>
+              <a:noFill/>
+            </p:spPr>
+            <p:txBody>
+              <a:bodyPr wrap="square">
+                <a:spAutoFit/>
+              </a:bodyPr>
+              <a:lstStyle/>
+              <a:p>
+                <a:pPr/>
+                <a14:m>
+                  <m:oMathPara xmlns:m="http://schemas.openxmlformats.org/officeDocument/2006/math">
+                    <m:oMathParaPr>
+                      <m:jc m:val="centerGroup"/>
+                    </m:oMathParaPr>
+                    <m:oMath xmlns:m="http://schemas.openxmlformats.org/officeDocument/2006/math">
+                      <m:r>
+                        <a:rPr lang="en-US" sz="1200" i="1" smtClean="0">
+                          <a:latin typeface="Cambria Math" panose="02040503050406030204" pitchFamily="18" charset="0"/>
+                        </a:rPr>
+                        <m:t>𝐹</m:t>
+                      </m:r>
+                      <m:r>
+                        <a:rPr lang="en-US" sz="1200" i="1" smtClean="0">
+                          <a:latin typeface="Cambria Math" panose="02040503050406030204" pitchFamily="18" charset="0"/>
+                        </a:rPr>
+                        <m:t>2</m:t>
+                      </m:r>
+                      <m:r>
+                        <a:rPr lang="en-US" sz="1200" i="1" smtClean="0">
+                          <a:latin typeface="Cambria Math" panose="02040503050406030204" pitchFamily="18" charset="0"/>
+                        </a:rPr>
+                        <m:t>=</m:t>
+                      </m:r>
+                      <m:f>
+                        <m:fPr>
+                          <m:ctrlPr>
+                            <a:rPr lang="en-US" sz="1200" i="1" smtClean="0">
+                              <a:latin typeface="Cambria Math" panose="02040503050406030204" pitchFamily="18" charset="0"/>
+                            </a:rPr>
+                          </m:ctrlPr>
+                        </m:fPr>
+                        <m:num>
+                          <m:r>
+                            <a:rPr lang="en-US" sz="1200" i="1" smtClean="0">
+                              <a:latin typeface="Cambria Math" panose="02040503050406030204" pitchFamily="18" charset="0"/>
+                            </a:rPr>
+                            <m:t>5</m:t>
+                          </m:r>
+                          <m:r>
+                            <a:rPr lang="en-US" sz="1200" i="1" smtClean="0">
+                              <a:latin typeface="Cambria Math" panose="02040503050406030204" pitchFamily="18" charset="0"/>
+                            </a:rPr>
+                            <m:t> </m:t>
+                          </m:r>
+                          <m:r>
+                            <a:rPr lang="en-US" sz="1200" i="1" smtClean="0">
+                              <a:latin typeface="Cambria Math" panose="02040503050406030204" pitchFamily="18" charset="0"/>
+                            </a:rPr>
+                            <m:t>𝑇𝑃</m:t>
+                          </m:r>
+                        </m:num>
+                        <m:den>
+                          <m:r>
+                            <a:rPr lang="en-US" sz="1200" i="1" smtClean="0">
+                              <a:latin typeface="Cambria Math" panose="02040503050406030204" pitchFamily="18" charset="0"/>
+                            </a:rPr>
+                            <m:t>  </m:t>
+                          </m:r>
+                          <m:r>
+                            <a:rPr lang="en-US" sz="1200" i="1" smtClean="0">
+                              <a:latin typeface="Cambria Math" panose="02040503050406030204" pitchFamily="18" charset="0"/>
+                            </a:rPr>
+                            <m:t>5</m:t>
+                          </m:r>
+                          <m:r>
+                            <a:rPr lang="en-US" sz="1200" i="1" smtClean="0">
+                              <a:latin typeface="Cambria Math" panose="02040503050406030204" pitchFamily="18" charset="0"/>
+                            </a:rPr>
+                            <m:t> </m:t>
+                          </m:r>
+                          <m:r>
+                            <a:rPr lang="en-US" sz="1200" i="1" smtClean="0">
+                              <a:latin typeface="Cambria Math" panose="02040503050406030204" pitchFamily="18" charset="0"/>
+                            </a:rPr>
+                            <m:t>𝑇𝑃</m:t>
+                          </m:r>
+                          <m:r>
+                            <a:rPr lang="en-US" sz="1200" i="1" smtClean="0">
+                              <a:latin typeface="Cambria Math" panose="02040503050406030204" pitchFamily="18" charset="0"/>
+                            </a:rPr>
+                            <m:t>+(</m:t>
+                          </m:r>
+                          <m:r>
+                            <a:rPr lang="en-US" sz="1200" i="1" smtClean="0">
+                              <a:latin typeface="Cambria Math" panose="02040503050406030204" pitchFamily="18" charset="0"/>
+                            </a:rPr>
+                            <m:t>4</m:t>
+                          </m:r>
+                          <m:r>
+                            <a:rPr lang="en-US" sz="1200" i="1" smtClean="0">
+                              <a:latin typeface="Cambria Math" panose="02040503050406030204" pitchFamily="18" charset="0"/>
+                            </a:rPr>
+                            <m:t> </m:t>
+                          </m:r>
+                          <m:r>
+                            <a:rPr lang="en-US" sz="1200" i="1" smtClean="0">
+                              <a:latin typeface="Cambria Math" panose="02040503050406030204" pitchFamily="18" charset="0"/>
+                            </a:rPr>
+                            <m:t>𝐹𝑁</m:t>
+                          </m:r>
+                          <m:r>
+                            <a:rPr lang="en-US" sz="1200" i="1" smtClean="0">
+                              <a:latin typeface="Cambria Math" panose="02040503050406030204" pitchFamily="18" charset="0"/>
+                            </a:rPr>
+                            <m:t>+</m:t>
+                          </m:r>
+                          <m:r>
+                            <a:rPr lang="en-US" sz="1200" i="1" smtClean="0">
+                              <a:latin typeface="Cambria Math" panose="02040503050406030204" pitchFamily="18" charset="0"/>
+                            </a:rPr>
+                            <m:t>𝐹𝑃</m:t>
+                          </m:r>
+                          <m:r>
+                            <a:rPr lang="en-US" sz="1200" i="1" smtClean="0">
+                              <a:latin typeface="Cambria Math" panose="02040503050406030204" pitchFamily="18" charset="0"/>
+                            </a:rPr>
+                            <m:t>)  </m:t>
+                          </m:r>
+                        </m:den>
+                      </m:f>
+                    </m:oMath>
+                  </m:oMathPara>
+                </a14:m>
+                <a:endParaRPr lang="he-IL" sz="1200" dirty="0"/>
+              </a:p>
+            </p:txBody>
+          </p:sp>
+        </mc:Choice>
+        <mc:Fallback>
+          <p:sp>
+            <p:nvSpPr>
+              <p:cNvPr id="7" name="TextBox 6">
+                <a:extLst>
+                  <a:ext uri="{FF2B5EF4-FFF2-40B4-BE49-F238E27FC236}">
+                    <a16:creationId xmlns:a16="http://schemas.microsoft.com/office/drawing/2014/main" id="{5E7ABAC6-E727-90B4-B178-B07C7AB5BA20}"/>
+                  </a:ext>
+                </a:extLst>
+              </p:cNvPr>
+              <p:cNvSpPr txBox="1">
+                <a:spLocks noRot="1" noChangeAspect="1" noMove="1" noResize="1" noEditPoints="1" noAdjustHandles="1" noChangeArrowheads="1" noChangeShapeType="1" noTextEdit="1"/>
+              </p:cNvSpPr>
+              <p:nvPr/>
+            </p:nvSpPr>
+            <p:spPr>
+              <a:xfrm>
+                <a:off x="9610759" y="2387413"/>
+                <a:ext cx="2229433" cy="475771"/>
+              </a:xfrm>
+              <a:prstGeom prst="rect">
+                <a:avLst/>
+              </a:prstGeom>
+              <a:blipFill>
+                <a:blip r:embed="rId4"/>
+                <a:stretch>
+                  <a:fillRect b="-6410"/>
+                </a:stretch>
+              </a:blipFill>
+            </p:spPr>
+            <p:txBody>
+              <a:bodyPr/>
+              <a:lstStyle/>
+              <a:p>
+                <a:r>
+                  <a:rPr lang="he-IL">
+                    <a:noFill/>
+                  </a:rPr>
+                  <a:t> </a:t>
+                </a:r>
+              </a:p>
+            </p:txBody>
+          </p:sp>
+        </mc:Fallback>
+      </mc:AlternateContent>
     </p:spTree>
     <p:extLst>
       <p:ext uri="{BB962C8B-B14F-4D97-AF65-F5344CB8AC3E}">
@@ -8789,7 +8994,7 @@
 </file>
 
 <file path=ppt/slides/slide2.xml><?xml version="1.0" encoding="utf-8"?>
-<p:sld xmlns:a="http://schemas.openxmlformats.org/drawingml/2006/main" xmlns:r="http://schemas.openxmlformats.org/officeDocument/2006/relationships" xmlns:p="http://schemas.openxmlformats.org/presentationml/2006/main" show="0">
+<p:sld xmlns:a="http://schemas.openxmlformats.org/drawingml/2006/main" xmlns:r="http://schemas.openxmlformats.org/officeDocument/2006/relationships" xmlns:p="http://schemas.openxmlformats.org/presentationml/2006/main">
   <p:cSld>
     <p:spTree>
       <p:nvGrpSpPr>
@@ -22057,8 +22262,23 @@
                 <a:solidFill>
                   <a:srgbClr val="2E502E"/>
                 </a:solidFill>
+                <a:hlinkClick r:id="rId7">
+                  <a:extLst>
+                    <a:ext uri="{A12FA001-AC4F-418D-AE19-62706E023703}">
+                      <ahyp:hlinkClr xmlns:ahyp="http://schemas.microsoft.com/office/drawing/2018/hyperlinkcolor" val="tx"/>
+                    </a:ext>
+                  </a:extLst>
+                </a:hlinkClick>
               </a:rPr>
-              <a:t>“Automated extraction of data slices to test machine learning models”,</a:t>
+              <a:t>“Automated extraction of data slices to test machine learning models”</a:t>
+            </a:r>
+            <a:r>
+              <a:rPr lang="en-US" sz="2800" dirty="0">
+                <a:solidFill>
+                  <a:srgbClr val="2E502E"/>
+                </a:solidFill>
+              </a:rPr>
+              <a:t>,</a:t>
             </a:r>
           </a:p>
           <a:p>
@@ -22089,7 +22309,7 @@
           <p:nvPr/>
         </p:nvPicPr>
         <p:blipFill>
-          <a:blip r:embed="rId7">
+          <a:blip r:embed="rId8">
             <a:extLst>
               <a:ext uri="{28A0092B-C50C-407E-A947-70E740481C1C}">
                 <a14:useLocalDpi xmlns:a14="http://schemas.microsoft.com/office/drawing/2010/main" val="0"/>

</xml_diff>